<commit_message>
Add v1.1 del sistema + base de datos + docs
</commit_message>
<xml_diff>
--- a/Proyecto/Presentaciones/Avance del proyecto 5.pptx
+++ b/Proyecto/Presentaciones/Avance del proyecto 5.pptx
@@ -1,39 +1,39 @@
 
 <file path=ppt/presentation.xml><?xml version="1.0" encoding="utf-8"?>
-<p:presentation xmlns:a="http://schemas.openxmlformats.org/drawingml/2006/main" xmlns:r="http://schemas.openxmlformats.org/officeDocument/2006/relationships" xmlns:p="http://schemas.openxmlformats.org/presentationml/2006/main" strictFirstAndLastChars="0" embedTrueTypeFonts="1" saveSubsetFonts="1" autoCompressPictures="0">
+<p:presentation xmlns:a="http://schemas.openxmlformats.org/drawingml/2006/main" xmlns:r="http://schemas.openxmlformats.org/officeDocument/2006/relationships" xmlns:mc="http://schemas.openxmlformats.org/markup-compatibility/2006" xmlns:mv="urn:schemas-microsoft-com:mac:vml" xmlns:p="http://schemas.openxmlformats.org/presentationml/2006/main" xmlns:c="http://schemas.openxmlformats.org/drawingml/2006/chart" xmlns:dgm="http://schemas.openxmlformats.org/drawingml/2006/diagram" xmlns:o="urn:schemas-microsoft-com:office:office" xmlns:v="urn:schemas-microsoft-com:vml" xmlns:pvml="urn:schemas-microsoft-com:office:powerpoint" xmlns:com="http://schemas.openxmlformats.org/drawingml/2006/compatibility" xmlns:p14="http://schemas.microsoft.com/office/powerpoint/2010/main" xmlns:p15="http://schemas.microsoft.com/office/powerpoint/2012/main" autoCompressPictures="0" embedTrueTypeFonts="1" strictFirstAndLastChars="0" saveSubsetFonts="1">
   <p:sldMasterIdLst>
-    <p:sldMasterId id="2147483659" r:id="rId1"/>
+    <p:sldMasterId id="2147483659" r:id="rId4"/>
   </p:sldMasterIdLst>
   <p:notesMasterIdLst>
-    <p:notesMasterId r:id="rId9"/>
+    <p:notesMasterId r:id="rId5"/>
   </p:notesMasterIdLst>
   <p:sldIdLst>
-    <p:sldId id="256" r:id="rId2"/>
-    <p:sldId id="257" r:id="rId3"/>
-    <p:sldId id="261" r:id="rId4"/>
-    <p:sldId id="262" r:id="rId5"/>
-    <p:sldId id="258" r:id="rId6"/>
-    <p:sldId id="259" r:id="rId7"/>
-    <p:sldId id="260" r:id="rId8"/>
+    <p:sldId id="256" r:id="rId6"/>
+    <p:sldId id="257" r:id="rId7"/>
+    <p:sldId id="258" r:id="rId8"/>
+    <p:sldId id="259" r:id="rId9"/>
+    <p:sldId id="260" r:id="rId10"/>
   </p:sldIdLst>
-  <p:sldSz cx="9144000" cy="5143500" type="screen16x9"/>
+  <p:sldSz cy="5143500" cx="9144000"/>
   <p:notesSz cx="6858000" cy="9144000"/>
   <p:embeddedFontLst>
     <p:embeddedFont>
-      <p:font typeface="Lato" panose="020F0502020204030203" pitchFamily="34" charset="0"/>
-      <p:regular r:id="rId10"/>
-      <p:bold r:id="rId11"/>
+      <p:font typeface="Raleway"/>
+      <p:regular r:id="rId11"/>
+      <p:bold r:id="rId12"/>
+      <p:italic r:id="rId13"/>
+      <p:boldItalic r:id="rId14"/>
     </p:embeddedFont>
     <p:embeddedFont>
-      <p:font typeface="Raleway" panose="020B0604020202020204" charset="0"/>
-      <p:regular r:id="rId12"/>
-      <p:bold r:id="rId13"/>
-      <p:italic r:id="rId14"/>
-      <p:boldItalic r:id="rId15"/>
+      <p:font typeface="Lato"/>
+      <p:regular r:id="rId15"/>
+      <p:bold r:id="rId16"/>
+      <p:italic r:id="rId17"/>
+      <p:boldItalic r:id="rId18"/>
     </p:embeddedFont>
   </p:embeddedFontLst>
   <p:defaultTextStyle>
-    <a:defPPr marR="0" lvl="0" algn="l" rtl="0">
+    <a:defPPr lvl="0" marR="0" rtl="0" algn="l">
       <a:lnSpc>
         <a:spcPct val="100000"/>
       </a:lnSpc>
@@ -44,7 +44,7 @@
         <a:spcPts val="0"/>
       </a:spcAft>
     </a:defPPr>
-    <a:lvl1pPr marR="0" lvl="0" algn="l" rtl="0">
+    <a:lvl1pPr lvl="0" marR="0" rtl="0" algn="l">
       <a:lnSpc>
         <a:spcPct val="100000"/>
       </a:lnSpc>
@@ -58,7 +58,7 @@
         <a:srgbClr val="000000"/>
       </a:buClr>
       <a:buFont typeface="Arial"/>
-      <a:defRPr sz="1400" b="0" i="0" u="none" strike="noStrike" cap="none">
+      <a:defRPr b="0" i="0" sz="1400" u="none" cap="none" strike="noStrike">
         <a:solidFill>
           <a:srgbClr val="000000"/>
         </a:solidFill>
@@ -68,7 +68,7 @@
         <a:sym typeface="Arial"/>
       </a:defRPr>
     </a:lvl1pPr>
-    <a:lvl2pPr marR="0" lvl="1" algn="l" rtl="0">
+    <a:lvl2pPr lvl="1" marR="0" rtl="0" algn="l">
       <a:lnSpc>
         <a:spcPct val="100000"/>
       </a:lnSpc>
@@ -82,7 +82,7 @@
         <a:srgbClr val="000000"/>
       </a:buClr>
       <a:buFont typeface="Arial"/>
-      <a:defRPr sz="1400" b="0" i="0" u="none" strike="noStrike" cap="none">
+      <a:defRPr b="0" i="0" sz="1400" u="none" cap="none" strike="noStrike">
         <a:solidFill>
           <a:srgbClr val="000000"/>
         </a:solidFill>
@@ -92,7 +92,7 @@
         <a:sym typeface="Arial"/>
       </a:defRPr>
     </a:lvl2pPr>
-    <a:lvl3pPr marR="0" lvl="2" algn="l" rtl="0">
+    <a:lvl3pPr lvl="2" marR="0" rtl="0" algn="l">
       <a:lnSpc>
         <a:spcPct val="100000"/>
       </a:lnSpc>
@@ -106,7 +106,7 @@
         <a:srgbClr val="000000"/>
       </a:buClr>
       <a:buFont typeface="Arial"/>
-      <a:defRPr sz="1400" b="0" i="0" u="none" strike="noStrike" cap="none">
+      <a:defRPr b="0" i="0" sz="1400" u="none" cap="none" strike="noStrike">
         <a:solidFill>
           <a:srgbClr val="000000"/>
         </a:solidFill>
@@ -116,7 +116,7 @@
         <a:sym typeface="Arial"/>
       </a:defRPr>
     </a:lvl3pPr>
-    <a:lvl4pPr marR="0" lvl="3" algn="l" rtl="0">
+    <a:lvl4pPr lvl="3" marR="0" rtl="0" algn="l">
       <a:lnSpc>
         <a:spcPct val="100000"/>
       </a:lnSpc>
@@ -130,7 +130,7 @@
         <a:srgbClr val="000000"/>
       </a:buClr>
       <a:buFont typeface="Arial"/>
-      <a:defRPr sz="1400" b="0" i="0" u="none" strike="noStrike" cap="none">
+      <a:defRPr b="0" i="0" sz="1400" u="none" cap="none" strike="noStrike">
         <a:solidFill>
           <a:srgbClr val="000000"/>
         </a:solidFill>
@@ -140,7 +140,7 @@
         <a:sym typeface="Arial"/>
       </a:defRPr>
     </a:lvl4pPr>
-    <a:lvl5pPr marR="0" lvl="4" algn="l" rtl="0">
+    <a:lvl5pPr lvl="4" marR="0" rtl="0" algn="l">
       <a:lnSpc>
         <a:spcPct val="100000"/>
       </a:lnSpc>
@@ -154,7 +154,7 @@
         <a:srgbClr val="000000"/>
       </a:buClr>
       <a:buFont typeface="Arial"/>
-      <a:defRPr sz="1400" b="0" i="0" u="none" strike="noStrike" cap="none">
+      <a:defRPr b="0" i="0" sz="1400" u="none" cap="none" strike="noStrike">
         <a:solidFill>
           <a:srgbClr val="000000"/>
         </a:solidFill>
@@ -164,7 +164,7 @@
         <a:sym typeface="Arial"/>
       </a:defRPr>
     </a:lvl5pPr>
-    <a:lvl6pPr marR="0" lvl="5" algn="l" rtl="0">
+    <a:lvl6pPr lvl="5" marR="0" rtl="0" algn="l">
       <a:lnSpc>
         <a:spcPct val="100000"/>
       </a:lnSpc>
@@ -178,7 +178,7 @@
         <a:srgbClr val="000000"/>
       </a:buClr>
       <a:buFont typeface="Arial"/>
-      <a:defRPr sz="1400" b="0" i="0" u="none" strike="noStrike" cap="none">
+      <a:defRPr b="0" i="0" sz="1400" u="none" cap="none" strike="noStrike">
         <a:solidFill>
           <a:srgbClr val="000000"/>
         </a:solidFill>
@@ -188,7 +188,7 @@
         <a:sym typeface="Arial"/>
       </a:defRPr>
     </a:lvl6pPr>
-    <a:lvl7pPr marR="0" lvl="6" algn="l" rtl="0">
+    <a:lvl7pPr lvl="6" marR="0" rtl="0" algn="l">
       <a:lnSpc>
         <a:spcPct val="100000"/>
       </a:lnSpc>
@@ -202,7 +202,7 @@
         <a:srgbClr val="000000"/>
       </a:buClr>
       <a:buFont typeface="Arial"/>
-      <a:defRPr sz="1400" b="0" i="0" u="none" strike="noStrike" cap="none">
+      <a:defRPr b="0" i="0" sz="1400" u="none" cap="none" strike="noStrike">
         <a:solidFill>
           <a:srgbClr val="000000"/>
         </a:solidFill>
@@ -212,7 +212,7 @@
         <a:sym typeface="Arial"/>
       </a:defRPr>
     </a:lvl7pPr>
-    <a:lvl8pPr marR="0" lvl="7" algn="l" rtl="0">
+    <a:lvl8pPr lvl="7" marR="0" rtl="0" algn="l">
       <a:lnSpc>
         <a:spcPct val="100000"/>
       </a:lnSpc>
@@ -226,7 +226,7 @@
         <a:srgbClr val="000000"/>
       </a:buClr>
       <a:buFont typeface="Arial"/>
-      <a:defRPr sz="1400" b="0" i="0" u="none" strike="noStrike" cap="none">
+      <a:defRPr b="0" i="0" sz="1400" u="none" cap="none" strike="noStrike">
         <a:solidFill>
           <a:srgbClr val="000000"/>
         </a:solidFill>
@@ -236,7 +236,7 @@
         <a:sym typeface="Arial"/>
       </a:defRPr>
     </a:lvl8pPr>
-    <a:lvl9pPr marR="0" lvl="8" algn="l" rtl="0">
+    <a:lvl9pPr lvl="8" marR="0" rtl="0" algn="l">
       <a:lnSpc>
         <a:spcPct val="100000"/>
       </a:lnSpc>
@@ -250,7 +250,7 @@
         <a:srgbClr val="000000"/>
       </a:buClr>
       <a:buFont typeface="Arial"/>
-      <a:defRPr sz="1400" b="0" i="0" u="none" strike="noStrike" cap="none">
+      <a:defRPr b="0" i="0" sz="1400" u="none" cap="none" strike="noStrike">
         <a:solidFill>
           <a:srgbClr val="000000"/>
         </a:solidFill>
@@ -263,7 +263,7 @@
   </p:defaultTextStyle>
   <p:extLst>
     <p:ext uri="{EFAFB233-063F-42B5-8137-9DF3F51BA10A}">
-      <p15:sldGuideLst xmlns:p15="http://schemas.microsoft.com/office/powerpoint/2012/main">
+      <p15:sldGuideLst>
         <p15:guide id="1" orient="horz" pos="1620">
           <p15:clr>
             <a:srgbClr val="A4A3A4"/>
@@ -281,16 +281,11 @@
 </file>
 
 <file path=ppt/notesMasters/notesMaster1.xml><?xml version="1.0" encoding="utf-8"?>
-<p:notesMaster xmlns:a="http://schemas.openxmlformats.org/drawingml/2006/main" xmlns:r="http://schemas.openxmlformats.org/officeDocument/2006/relationships" xmlns:p="http://schemas.openxmlformats.org/presentationml/2006/main">
+<p:notesMaster xmlns:a="http://schemas.openxmlformats.org/drawingml/2006/main" xmlns:r="http://schemas.openxmlformats.org/officeDocument/2006/relationships" xmlns:mc="http://schemas.openxmlformats.org/markup-compatibility/2006" xmlns:mv="urn:schemas-microsoft-com:mac:vml" xmlns:p="http://schemas.openxmlformats.org/presentationml/2006/main" xmlns:c="http://schemas.openxmlformats.org/drawingml/2006/chart" xmlns:dgm="http://schemas.openxmlformats.org/drawingml/2006/diagram" xmlns:o="urn:schemas-microsoft-com:office:office" xmlns:v="urn:schemas-microsoft-com:vml" xmlns:pvml="urn:schemas-microsoft-com:office:powerpoint" xmlns:com="http://schemas.openxmlformats.org/drawingml/2006/compatibility" xmlns:p14="http://schemas.microsoft.com/office/powerpoint/2010/main" xmlns:p15="http://schemas.microsoft.com/office/powerpoint/2012/main">
   <p:cSld>
-    <p:bg>
-      <p:bgRef idx="1001">
-        <a:schemeClr val="bg1"/>
-      </p:bgRef>
-    </p:bg>
     <p:spTree>
       <p:nvGrpSpPr>
-        <p:cNvPr id="1" name="Shape 2"/>
+        <p:cNvPr id="2" name="Shape 2"/>
         <p:cNvGrpSpPr/>
         <p:nvPr/>
       </p:nvGrpSpPr>
@@ -305,11 +300,9 @@
       <p:sp>
         <p:nvSpPr>
           <p:cNvPr id="3" name="Google Shape;3;n"/>
-          <p:cNvSpPr>
-            <a:spLocks noGrp="1" noRot="1" noChangeAspect="1"/>
-          </p:cNvSpPr>
+          <p:cNvSpPr/>
           <p:nvPr>
-            <p:ph type="sldImg" idx="2"/>
+            <p:ph idx="2" type="sldImg"/>
           </p:nvPr>
         </p:nvSpPr>
         <p:spPr>
@@ -318,13 +311,9 @@
             <a:ext cx="6096075" cy="3429000"/>
           </a:xfrm>
           <a:custGeom>
-            <a:avLst/>
-            <a:gdLst/>
-            <a:ahLst/>
-            <a:cxnLst/>
-            <a:rect l="l" t="t" r="r" b="b"/>
+            <a:rect b="b" l="l" r="r" t="t"/>
             <a:pathLst>
-              <a:path w="120000" h="120000" extrusionOk="0">
+              <a:path extrusionOk="0" h="120000" w="120000">
                 <a:moveTo>
                   <a:pt x="0" y="0"/>
                 </a:moveTo>
@@ -342,25 +331,23 @@
             </a:pathLst>
           </a:custGeom>
           <a:noFill/>
-          <a:ln w="9525" cap="flat" cmpd="sng">
+          <a:ln cap="flat" cmpd="sng" w="9525">
             <a:solidFill>
               <a:srgbClr val="000000"/>
             </a:solidFill>
             <a:prstDash val="solid"/>
             <a:round/>
-            <a:headEnd type="none" w="sm" len="sm"/>
-            <a:tailEnd type="none" w="sm" len="sm"/>
+            <a:headEnd len="sm" w="sm" type="none"/>
+            <a:tailEnd len="sm" w="sm" type="none"/>
           </a:ln>
         </p:spPr>
       </p:sp>
       <p:sp>
         <p:nvSpPr>
           <p:cNvPr id="4" name="Google Shape;4;n"/>
-          <p:cNvSpPr txBox="1">
-            <a:spLocks noGrp="1"/>
-          </p:cNvSpPr>
+          <p:cNvSpPr txBox="1"/>
           <p:nvPr>
-            <p:ph type="body" idx="1"/>
+            <p:ph idx="1" type="body"/>
           </p:nvPr>
         </p:nvSpPr>
         <p:spPr>
@@ -377,9 +364,9 @@
           </a:ln>
         </p:spPr>
         <p:txBody>
-          <a:bodyPr spcFirstLastPara="1" wrap="square" lIns="91425" tIns="91425" rIns="91425" bIns="91425" anchor="t" anchorCtr="0"/>
+          <a:bodyPr anchorCtr="0" anchor="t" bIns="91425" lIns="91425" spcFirstLastPara="1" rIns="91425" wrap="square" tIns="91425"/>
           <a:lstStyle>
-            <a:lvl1pPr marL="457200" lvl="0" indent="-298450">
+            <a:lvl1pPr indent="-298450" lvl="0" marL="457200">
               <a:spcBef>
                 <a:spcPts val="0"/>
               </a:spcBef>
@@ -390,7 +377,7 @@
               <a:buChar char="●"/>
               <a:defRPr sz="1100"/>
             </a:lvl1pPr>
-            <a:lvl2pPr marL="914400" lvl="1" indent="-298450">
+            <a:lvl2pPr indent="-298450" lvl="1" marL="914400">
               <a:spcBef>
                 <a:spcPts val="0"/>
               </a:spcBef>
@@ -401,7 +388,7 @@
               <a:buChar char="○"/>
               <a:defRPr sz="1100"/>
             </a:lvl2pPr>
-            <a:lvl3pPr marL="1371600" lvl="2" indent="-298450">
+            <a:lvl3pPr indent="-298450" lvl="2" marL="1371600">
               <a:spcBef>
                 <a:spcPts val="0"/>
               </a:spcBef>
@@ -412,7 +399,7 @@
               <a:buChar char="■"/>
               <a:defRPr sz="1100"/>
             </a:lvl3pPr>
-            <a:lvl4pPr marL="1828800" lvl="3" indent="-298450">
+            <a:lvl4pPr indent="-298450" lvl="3" marL="1828800">
               <a:spcBef>
                 <a:spcPts val="0"/>
               </a:spcBef>
@@ -423,7 +410,7 @@
               <a:buChar char="●"/>
               <a:defRPr sz="1100"/>
             </a:lvl4pPr>
-            <a:lvl5pPr marL="2286000" lvl="4" indent="-298450">
+            <a:lvl5pPr indent="-298450" lvl="4" marL="2286000">
               <a:spcBef>
                 <a:spcPts val="0"/>
               </a:spcBef>
@@ -434,7 +421,7 @@
               <a:buChar char="○"/>
               <a:defRPr sz="1100"/>
             </a:lvl5pPr>
-            <a:lvl6pPr marL="2743200" lvl="5" indent="-298450">
+            <a:lvl6pPr indent="-298450" lvl="5" marL="2743200">
               <a:spcBef>
                 <a:spcPts val="0"/>
               </a:spcBef>
@@ -445,7 +432,7 @@
               <a:buChar char="■"/>
               <a:defRPr sz="1100"/>
             </a:lvl6pPr>
-            <a:lvl7pPr marL="3200400" lvl="6" indent="-298450">
+            <a:lvl7pPr indent="-298450" lvl="6" marL="3200400">
               <a:spcBef>
                 <a:spcPts val="0"/>
               </a:spcBef>
@@ -456,7 +443,7 @@
               <a:buChar char="●"/>
               <a:defRPr sz="1100"/>
             </a:lvl7pPr>
-            <a:lvl8pPr marL="3657600" lvl="7" indent="-298450">
+            <a:lvl8pPr indent="-298450" lvl="7" marL="3657600">
               <a:spcBef>
                 <a:spcPts val="0"/>
               </a:spcBef>
@@ -467,7 +454,7 @@
               <a:buChar char="○"/>
               <a:defRPr sz="1100"/>
             </a:lvl8pPr>
-            <a:lvl9pPr marL="4114800" lvl="8" indent="-298450">
+            <a:lvl9pPr indent="-298450" lvl="8" marL="4114800">
               <a:spcBef>
                 <a:spcPts val="0"/>
               </a:spcBef>
@@ -479,21 +466,14 @@
               <a:defRPr sz="1100"/>
             </a:lvl9pPr>
           </a:lstStyle>
-          <a:p>
-            <a:endParaRPr/>
-          </a:p>
+          <a:p/>
         </p:txBody>
       </p:sp>
     </p:spTree>
-    <p:extLst>
-      <p:ext uri="{BB962C8B-B14F-4D97-AF65-F5344CB8AC3E}">
-        <p14:creationId xmlns:p14="http://schemas.microsoft.com/office/powerpoint/2010/main" val="1864941498"/>
-      </p:ext>
-    </p:extLst>
   </p:cSld>
-  <p:clrMap bg1="lt1" tx1="dk1" bg2="dk2" tx2="lt2" accent1="accent1" accent2="accent2" accent3="accent3" accent4="accent4" accent5="accent5" accent6="accent6" hlink="hlink" folHlink="folHlink"/>
+  <p:clrMap accent1="accent1" accent2="accent2" accent3="accent3" accent4="accent4" accent5="accent5" accent6="accent6" bg1="lt1" bg2="dk2" tx1="dk1" tx2="lt2" folHlink="folHlink" hlink="hlink"/>
   <p:notesStyle>
-    <a:defPPr marR="0" lvl="0" algn="l" rtl="0">
+    <a:defPPr lvl="0" marR="0" rtl="0" algn="l">
       <a:lnSpc>
         <a:spcPct val="100000"/>
       </a:lnSpc>
@@ -504,7 +484,7 @@
         <a:spcPts val="0"/>
       </a:spcAft>
     </a:defPPr>
-    <a:lvl1pPr marR="0" lvl="0" algn="l" rtl="0">
+    <a:lvl1pPr lvl="0" marR="0" rtl="0" algn="l">
       <a:lnSpc>
         <a:spcPct val="100000"/>
       </a:lnSpc>
@@ -518,7 +498,7 @@
         <a:srgbClr val="000000"/>
       </a:buClr>
       <a:buFont typeface="Arial"/>
-      <a:defRPr sz="1400" b="0" i="0" u="none" strike="noStrike" cap="none">
+      <a:defRPr b="0" i="0" sz="1400" u="none" cap="none" strike="noStrike">
         <a:solidFill>
           <a:srgbClr val="000000"/>
         </a:solidFill>
@@ -528,7 +508,7 @@
         <a:sym typeface="Arial"/>
       </a:defRPr>
     </a:lvl1pPr>
-    <a:lvl2pPr marR="0" lvl="1" algn="l" rtl="0">
+    <a:lvl2pPr lvl="1" marR="0" rtl="0" algn="l">
       <a:lnSpc>
         <a:spcPct val="100000"/>
       </a:lnSpc>
@@ -542,7 +522,7 @@
         <a:srgbClr val="000000"/>
       </a:buClr>
       <a:buFont typeface="Arial"/>
-      <a:defRPr sz="1400" b="0" i="0" u="none" strike="noStrike" cap="none">
+      <a:defRPr b="0" i="0" sz="1400" u="none" cap="none" strike="noStrike">
         <a:solidFill>
           <a:srgbClr val="000000"/>
         </a:solidFill>
@@ -552,7 +532,7 @@
         <a:sym typeface="Arial"/>
       </a:defRPr>
     </a:lvl2pPr>
-    <a:lvl3pPr marR="0" lvl="2" algn="l" rtl="0">
+    <a:lvl3pPr lvl="2" marR="0" rtl="0" algn="l">
       <a:lnSpc>
         <a:spcPct val="100000"/>
       </a:lnSpc>
@@ -566,7 +546,7 @@
         <a:srgbClr val="000000"/>
       </a:buClr>
       <a:buFont typeface="Arial"/>
-      <a:defRPr sz="1400" b="0" i="0" u="none" strike="noStrike" cap="none">
+      <a:defRPr b="0" i="0" sz="1400" u="none" cap="none" strike="noStrike">
         <a:solidFill>
           <a:srgbClr val="000000"/>
         </a:solidFill>
@@ -576,7 +556,7 @@
         <a:sym typeface="Arial"/>
       </a:defRPr>
     </a:lvl3pPr>
-    <a:lvl4pPr marR="0" lvl="3" algn="l" rtl="0">
+    <a:lvl4pPr lvl="3" marR="0" rtl="0" algn="l">
       <a:lnSpc>
         <a:spcPct val="100000"/>
       </a:lnSpc>
@@ -590,7 +570,7 @@
         <a:srgbClr val="000000"/>
       </a:buClr>
       <a:buFont typeface="Arial"/>
-      <a:defRPr sz="1400" b="0" i="0" u="none" strike="noStrike" cap="none">
+      <a:defRPr b="0" i="0" sz="1400" u="none" cap="none" strike="noStrike">
         <a:solidFill>
           <a:srgbClr val="000000"/>
         </a:solidFill>
@@ -600,7 +580,7 @@
         <a:sym typeface="Arial"/>
       </a:defRPr>
     </a:lvl4pPr>
-    <a:lvl5pPr marR="0" lvl="4" algn="l" rtl="0">
+    <a:lvl5pPr lvl="4" marR="0" rtl="0" algn="l">
       <a:lnSpc>
         <a:spcPct val="100000"/>
       </a:lnSpc>
@@ -614,7 +594,7 @@
         <a:srgbClr val="000000"/>
       </a:buClr>
       <a:buFont typeface="Arial"/>
-      <a:defRPr sz="1400" b="0" i="0" u="none" strike="noStrike" cap="none">
+      <a:defRPr b="0" i="0" sz="1400" u="none" cap="none" strike="noStrike">
         <a:solidFill>
           <a:srgbClr val="000000"/>
         </a:solidFill>
@@ -624,7 +604,7 @@
         <a:sym typeface="Arial"/>
       </a:defRPr>
     </a:lvl5pPr>
-    <a:lvl6pPr marR="0" lvl="5" algn="l" rtl="0">
+    <a:lvl6pPr lvl="5" marR="0" rtl="0" algn="l">
       <a:lnSpc>
         <a:spcPct val="100000"/>
       </a:lnSpc>
@@ -638,7 +618,7 @@
         <a:srgbClr val="000000"/>
       </a:buClr>
       <a:buFont typeface="Arial"/>
-      <a:defRPr sz="1400" b="0" i="0" u="none" strike="noStrike" cap="none">
+      <a:defRPr b="0" i="0" sz="1400" u="none" cap="none" strike="noStrike">
         <a:solidFill>
           <a:srgbClr val="000000"/>
         </a:solidFill>
@@ -648,7 +628,7 @@
         <a:sym typeface="Arial"/>
       </a:defRPr>
     </a:lvl6pPr>
-    <a:lvl7pPr marR="0" lvl="6" algn="l" rtl="0">
+    <a:lvl7pPr lvl="6" marR="0" rtl="0" algn="l">
       <a:lnSpc>
         <a:spcPct val="100000"/>
       </a:lnSpc>
@@ -662,7 +642,7 @@
         <a:srgbClr val="000000"/>
       </a:buClr>
       <a:buFont typeface="Arial"/>
-      <a:defRPr sz="1400" b="0" i="0" u="none" strike="noStrike" cap="none">
+      <a:defRPr b="0" i="0" sz="1400" u="none" cap="none" strike="noStrike">
         <a:solidFill>
           <a:srgbClr val="000000"/>
         </a:solidFill>
@@ -672,7 +652,7 @@
         <a:sym typeface="Arial"/>
       </a:defRPr>
     </a:lvl7pPr>
-    <a:lvl8pPr marR="0" lvl="7" algn="l" rtl="0">
+    <a:lvl8pPr lvl="7" marR="0" rtl="0" algn="l">
       <a:lnSpc>
         <a:spcPct val="100000"/>
       </a:lnSpc>
@@ -686,7 +666,7 @@
         <a:srgbClr val="000000"/>
       </a:buClr>
       <a:buFont typeface="Arial"/>
-      <a:defRPr sz="1400" b="0" i="0" u="none" strike="noStrike" cap="none">
+      <a:defRPr b="0" i="0" sz="1400" u="none" cap="none" strike="noStrike">
         <a:solidFill>
           <a:srgbClr val="000000"/>
         </a:solidFill>
@@ -696,7 +676,7 @@
         <a:sym typeface="Arial"/>
       </a:defRPr>
     </a:lvl8pPr>
-    <a:lvl9pPr marR="0" lvl="8" algn="l" rtl="0">
+    <a:lvl9pPr lvl="8" marR="0" rtl="0" algn="l">
       <a:lnSpc>
         <a:spcPct val="100000"/>
       </a:lnSpc>
@@ -710,7 +690,7 @@
         <a:srgbClr val="000000"/>
       </a:buClr>
       <a:buFont typeface="Arial"/>
-      <a:defRPr sz="1400" b="0" i="0" u="none" strike="noStrike" cap="none">
+      <a:defRPr b="0" i="0" sz="1400" u="none" cap="none" strike="noStrike">
         <a:solidFill>
           <a:srgbClr val="000000"/>
         </a:solidFill>
@@ -725,11 +705,11 @@
 </file>
 
 <file path=ppt/notesSlides/notesSlide1.xml><?xml version="1.0" encoding="utf-8"?>
-<p:notes xmlns:a="http://schemas.openxmlformats.org/drawingml/2006/main" xmlns:r="http://schemas.openxmlformats.org/officeDocument/2006/relationships" xmlns:p="http://schemas.openxmlformats.org/presentationml/2006/main" showMasterSp="0" showMasterPhAnim="0">
+<p:notes xmlns:a="http://schemas.openxmlformats.org/drawingml/2006/main" xmlns:r="http://schemas.openxmlformats.org/officeDocument/2006/relationships" xmlns:mc="http://schemas.openxmlformats.org/markup-compatibility/2006" xmlns:mv="urn:schemas-microsoft-com:mac:vml" xmlns:p="http://schemas.openxmlformats.org/presentationml/2006/main" xmlns:c="http://schemas.openxmlformats.org/drawingml/2006/chart" xmlns:dgm="http://schemas.openxmlformats.org/drawingml/2006/diagram" xmlns:o="urn:schemas-microsoft-com:office:office" xmlns:v="urn:schemas-microsoft-com:vml" xmlns:pvml="urn:schemas-microsoft-com:office:powerpoint" xmlns:com="http://schemas.openxmlformats.org/drawingml/2006/compatibility" xmlns:p14="http://schemas.microsoft.com/office/powerpoint/2010/main" xmlns:p15="http://schemas.microsoft.com/office/powerpoint/2012/main" showMasterPhAnim="0" showMasterSp="0">
   <p:cSld>
     <p:spTree>
       <p:nvGrpSpPr>
-        <p:cNvPr id="1" name="Shape 68"/>
+        <p:cNvPr id="68" name="Shape 68"/>
         <p:cNvGrpSpPr/>
         <p:nvPr/>
       </p:nvGrpSpPr>
@@ -744,11 +724,9 @@
       <p:sp>
         <p:nvSpPr>
           <p:cNvPr id="69" name="Google Shape;69;p:notes"/>
-          <p:cNvSpPr>
-            <a:spLocks noGrp="1" noRot="1" noChangeAspect="1"/>
-          </p:cNvSpPr>
+          <p:cNvSpPr/>
           <p:nvPr>
-            <p:ph type="sldImg" idx="2"/>
+            <p:ph idx="2" type="sldImg"/>
           </p:nvPr>
         </p:nvSpPr>
         <p:spPr>
@@ -757,13 +735,9 @@
             <a:ext cx="6096075" cy="3429000"/>
           </a:xfrm>
           <a:custGeom>
-            <a:avLst/>
-            <a:gdLst/>
-            <a:ahLst/>
-            <a:cxnLst/>
-            <a:rect l="l" t="t" r="r" b="b"/>
+            <a:rect b="b" l="l" r="r" t="t"/>
             <a:pathLst>
-              <a:path w="120000" h="120000" extrusionOk="0">
+              <a:path extrusionOk="0" h="120000" w="120000">
                 <a:moveTo>
                   <a:pt x="0" y="0"/>
                 </a:moveTo>
@@ -785,11 +759,9 @@
       <p:sp>
         <p:nvSpPr>
           <p:cNvPr id="70" name="Google Shape;70;p:notes"/>
-          <p:cNvSpPr txBox="1">
-            <a:spLocks noGrp="1"/>
-          </p:cNvSpPr>
+          <p:cNvSpPr txBox="1"/>
           <p:nvPr>
-            <p:ph type="body" idx="1"/>
+            <p:ph idx="1" type="body"/>
           </p:nvPr>
         </p:nvSpPr>
         <p:spPr>
@@ -802,12 +774,12 @@
           </a:prstGeom>
         </p:spPr>
         <p:txBody>
-          <a:bodyPr spcFirstLastPara="1" wrap="square" lIns="91425" tIns="91425" rIns="91425" bIns="91425" anchor="t" anchorCtr="0">
+          <a:bodyPr anchorCtr="0" anchor="t" bIns="91425" lIns="91425" spcFirstLastPara="1" rIns="91425" wrap="square" tIns="91425">
             <a:noAutofit/>
           </a:bodyPr>
           <a:lstStyle/>
           <a:p>
-            <a:pPr marL="0" lvl="0" indent="0" algn="l" rtl="0">
+            <a:pPr indent="0" lvl="0" marL="0" rtl="0" algn="l">
               <a:spcBef>
                 <a:spcPts val="0"/>
               </a:spcBef>
@@ -816,16 +788,14 @@
               </a:spcAft>
               <a:buNone/>
             </a:pPr>
+            <a:r>
+              <a:t/>
+            </a:r>
             <a:endParaRPr/>
           </a:p>
         </p:txBody>
       </p:sp>
     </p:spTree>
-    <p:extLst>
-      <p:ext uri="{BB962C8B-B14F-4D97-AF65-F5344CB8AC3E}">
-        <p14:creationId xmlns:p14="http://schemas.microsoft.com/office/powerpoint/2010/main" val="361164102"/>
-      </p:ext>
-    </p:extLst>
   </p:cSld>
   <p:clrMapOvr>
     <a:masterClrMapping/>
@@ -834,11 +804,11 @@
 </file>
 
 <file path=ppt/notesSlides/notesSlide2.xml><?xml version="1.0" encoding="utf-8"?>
-<p:notes xmlns:a="http://schemas.openxmlformats.org/drawingml/2006/main" xmlns:r="http://schemas.openxmlformats.org/officeDocument/2006/relationships" xmlns:p="http://schemas.openxmlformats.org/presentationml/2006/main" showMasterSp="0" showMasterPhAnim="0">
+<p:notes xmlns:a="http://schemas.openxmlformats.org/drawingml/2006/main" xmlns:r="http://schemas.openxmlformats.org/officeDocument/2006/relationships" xmlns:mc="http://schemas.openxmlformats.org/markup-compatibility/2006" xmlns:mv="urn:schemas-microsoft-com:mac:vml" xmlns:p="http://schemas.openxmlformats.org/presentationml/2006/main" xmlns:c="http://schemas.openxmlformats.org/drawingml/2006/chart" xmlns:dgm="http://schemas.openxmlformats.org/drawingml/2006/diagram" xmlns:o="urn:schemas-microsoft-com:office:office" xmlns:v="urn:schemas-microsoft-com:vml" xmlns:pvml="urn:schemas-microsoft-com:office:powerpoint" xmlns:com="http://schemas.openxmlformats.org/drawingml/2006/compatibility" xmlns:p14="http://schemas.microsoft.com/office/powerpoint/2010/main" xmlns:p15="http://schemas.microsoft.com/office/powerpoint/2012/main" showMasterPhAnim="0" showMasterSp="0">
   <p:cSld>
     <p:spTree>
       <p:nvGrpSpPr>
-        <p:cNvPr id="1" name="Shape 74"/>
+        <p:cNvPr id="74" name="Shape 74"/>
         <p:cNvGrpSpPr/>
         <p:nvPr/>
       </p:nvGrpSpPr>
@@ -853,11 +823,9 @@
       <p:sp>
         <p:nvSpPr>
           <p:cNvPr id="75" name="Google Shape;75;g512343d575_0_63:notes"/>
-          <p:cNvSpPr>
-            <a:spLocks noGrp="1" noRot="1" noChangeAspect="1"/>
-          </p:cNvSpPr>
+          <p:cNvSpPr/>
           <p:nvPr>
-            <p:ph type="sldImg" idx="2"/>
+            <p:ph idx="2" type="sldImg"/>
           </p:nvPr>
         </p:nvSpPr>
         <p:spPr>
@@ -866,13 +834,9 @@
             <a:ext cx="6096000" cy="3429000"/>
           </a:xfrm>
           <a:custGeom>
-            <a:avLst/>
-            <a:gdLst/>
-            <a:ahLst/>
-            <a:cxnLst/>
-            <a:rect l="l" t="t" r="r" b="b"/>
+            <a:rect b="b" l="l" r="r" t="t"/>
             <a:pathLst>
-              <a:path w="120000" h="120000" extrusionOk="0">
+              <a:path extrusionOk="0" h="120000" w="120000">
                 <a:moveTo>
                   <a:pt x="0" y="0"/>
                 </a:moveTo>
@@ -894,11 +858,9 @@
       <p:sp>
         <p:nvSpPr>
           <p:cNvPr id="76" name="Google Shape;76;g512343d575_0_63:notes"/>
-          <p:cNvSpPr txBox="1">
-            <a:spLocks noGrp="1"/>
-          </p:cNvSpPr>
+          <p:cNvSpPr txBox="1"/>
           <p:nvPr>
-            <p:ph type="body" idx="1"/>
+            <p:ph idx="1" type="body"/>
           </p:nvPr>
         </p:nvSpPr>
         <p:spPr>
@@ -911,12 +873,12 @@
           </a:prstGeom>
         </p:spPr>
         <p:txBody>
-          <a:bodyPr spcFirstLastPara="1" wrap="square" lIns="91425" tIns="91425" rIns="91425" bIns="91425" anchor="t" anchorCtr="0">
+          <a:bodyPr anchorCtr="0" anchor="t" bIns="91425" lIns="91425" spcFirstLastPara="1" rIns="91425" wrap="square" tIns="91425">
             <a:noAutofit/>
           </a:bodyPr>
           <a:lstStyle/>
           <a:p>
-            <a:pPr marL="0" lvl="0" indent="0" algn="l" rtl="0">
+            <a:pPr indent="0" lvl="0" marL="0" rtl="0" algn="l">
               <a:spcBef>
                 <a:spcPts val="0"/>
               </a:spcBef>
@@ -925,16 +887,14 @@
               </a:spcAft>
               <a:buNone/>
             </a:pPr>
+            <a:r>
+              <a:t/>
+            </a:r>
             <a:endParaRPr/>
           </a:p>
         </p:txBody>
       </p:sp>
     </p:spTree>
-    <p:extLst>
-      <p:ext uri="{BB962C8B-B14F-4D97-AF65-F5344CB8AC3E}">
-        <p14:creationId xmlns:p14="http://schemas.microsoft.com/office/powerpoint/2010/main" val="3735174139"/>
-      </p:ext>
-    </p:extLst>
   </p:cSld>
   <p:clrMapOvr>
     <a:masterClrMapping/>
@@ -943,229 +903,11 @@
 </file>
 
 <file path=ppt/notesSlides/notesSlide3.xml><?xml version="1.0" encoding="utf-8"?>
-<p:notes xmlns:a="http://schemas.openxmlformats.org/drawingml/2006/main" xmlns:r="http://schemas.openxmlformats.org/officeDocument/2006/relationships" xmlns:p="http://schemas.openxmlformats.org/presentationml/2006/main" showMasterSp="0" showMasterPhAnim="0">
+<p:notes xmlns:a="http://schemas.openxmlformats.org/drawingml/2006/main" xmlns:r="http://schemas.openxmlformats.org/officeDocument/2006/relationships" xmlns:mc="http://schemas.openxmlformats.org/markup-compatibility/2006" xmlns:mv="urn:schemas-microsoft-com:mac:vml" xmlns:p="http://schemas.openxmlformats.org/presentationml/2006/main" xmlns:c="http://schemas.openxmlformats.org/drawingml/2006/chart" xmlns:dgm="http://schemas.openxmlformats.org/drawingml/2006/diagram" xmlns:o="urn:schemas-microsoft-com:office:office" xmlns:v="urn:schemas-microsoft-com:vml" xmlns:pvml="urn:schemas-microsoft-com:office:powerpoint" xmlns:com="http://schemas.openxmlformats.org/drawingml/2006/compatibility" xmlns:p14="http://schemas.microsoft.com/office/powerpoint/2010/main" xmlns:p15="http://schemas.microsoft.com/office/powerpoint/2012/main" showMasterPhAnim="0" showMasterSp="0">
   <p:cSld>
     <p:spTree>
       <p:nvGrpSpPr>
-        <p:cNvPr id="1" name="Shape 74"/>
-        <p:cNvGrpSpPr/>
-        <p:nvPr/>
-      </p:nvGrpSpPr>
-      <p:grpSpPr>
-        <a:xfrm>
-          <a:off x="0" y="0"/>
-          <a:ext cx="0" cy="0"/>
-          <a:chOff x="0" y="0"/>
-          <a:chExt cx="0" cy="0"/>
-        </a:xfrm>
-      </p:grpSpPr>
-      <p:sp>
-        <p:nvSpPr>
-          <p:cNvPr id="75" name="Google Shape;75;g512343d575_0_63:notes"/>
-          <p:cNvSpPr>
-            <a:spLocks noGrp="1" noRot="1" noChangeAspect="1"/>
-          </p:cNvSpPr>
-          <p:nvPr>
-            <p:ph type="sldImg" idx="2"/>
-          </p:nvPr>
-        </p:nvSpPr>
-        <p:spPr>
-          <a:xfrm>
-            <a:off x="381000" y="685800"/>
-            <a:ext cx="6096000" cy="3429000"/>
-          </a:xfrm>
-          <a:custGeom>
-            <a:avLst/>
-            <a:gdLst/>
-            <a:ahLst/>
-            <a:cxnLst/>
-            <a:rect l="l" t="t" r="r" b="b"/>
-            <a:pathLst>
-              <a:path w="120000" h="120000" extrusionOk="0">
-                <a:moveTo>
-                  <a:pt x="0" y="0"/>
-                </a:moveTo>
-                <a:lnTo>
-                  <a:pt x="120000" y="0"/>
-                </a:lnTo>
-                <a:lnTo>
-                  <a:pt x="120000" y="120000"/>
-                </a:lnTo>
-                <a:lnTo>
-                  <a:pt x="0" y="120000"/>
-                </a:lnTo>
-                <a:close/>
-              </a:path>
-            </a:pathLst>
-          </a:custGeom>
-        </p:spPr>
-      </p:sp>
-      <p:sp>
-        <p:nvSpPr>
-          <p:cNvPr id="76" name="Google Shape;76;g512343d575_0_63:notes"/>
-          <p:cNvSpPr txBox="1">
-            <a:spLocks noGrp="1"/>
-          </p:cNvSpPr>
-          <p:nvPr>
-            <p:ph type="body" idx="1"/>
-          </p:nvPr>
-        </p:nvSpPr>
-        <p:spPr>
-          <a:xfrm>
-            <a:off x="685800" y="4343400"/>
-            <a:ext cx="5486400" cy="4114800"/>
-          </a:xfrm>
-          <a:prstGeom prst="rect">
-            <a:avLst/>
-          </a:prstGeom>
-        </p:spPr>
-        <p:txBody>
-          <a:bodyPr spcFirstLastPara="1" wrap="square" lIns="91425" tIns="91425" rIns="91425" bIns="91425" anchor="t" anchorCtr="0">
-            <a:noAutofit/>
-          </a:bodyPr>
-          <a:lstStyle/>
-          <a:p>
-            <a:pPr marL="0" lvl="0" indent="0" algn="l" rtl="0">
-              <a:spcBef>
-                <a:spcPts val="0"/>
-              </a:spcBef>
-              <a:spcAft>
-                <a:spcPts val="0"/>
-              </a:spcAft>
-              <a:buNone/>
-            </a:pPr>
-            <a:endParaRPr/>
-          </a:p>
-        </p:txBody>
-      </p:sp>
-    </p:spTree>
-    <p:extLst>
-      <p:ext uri="{BB962C8B-B14F-4D97-AF65-F5344CB8AC3E}">
-        <p14:creationId xmlns:p14="http://schemas.microsoft.com/office/powerpoint/2010/main" val="413588570"/>
-      </p:ext>
-    </p:extLst>
-  </p:cSld>
-  <p:clrMapOvr>
-    <a:masterClrMapping/>
-  </p:clrMapOvr>
-</p:notes>
-</file>
-
-<file path=ppt/notesSlides/notesSlide4.xml><?xml version="1.0" encoding="utf-8"?>
-<p:notes xmlns:a="http://schemas.openxmlformats.org/drawingml/2006/main" xmlns:r="http://schemas.openxmlformats.org/officeDocument/2006/relationships" xmlns:p="http://schemas.openxmlformats.org/presentationml/2006/main" showMasterSp="0" showMasterPhAnim="0">
-  <p:cSld>
-    <p:spTree>
-      <p:nvGrpSpPr>
-        <p:cNvPr id="1" name="Shape 74"/>
-        <p:cNvGrpSpPr/>
-        <p:nvPr/>
-      </p:nvGrpSpPr>
-      <p:grpSpPr>
-        <a:xfrm>
-          <a:off x="0" y="0"/>
-          <a:ext cx="0" cy="0"/>
-          <a:chOff x="0" y="0"/>
-          <a:chExt cx="0" cy="0"/>
-        </a:xfrm>
-      </p:grpSpPr>
-      <p:sp>
-        <p:nvSpPr>
-          <p:cNvPr id="75" name="Google Shape;75;g512343d575_0_63:notes"/>
-          <p:cNvSpPr>
-            <a:spLocks noGrp="1" noRot="1" noChangeAspect="1"/>
-          </p:cNvSpPr>
-          <p:nvPr>
-            <p:ph type="sldImg" idx="2"/>
-          </p:nvPr>
-        </p:nvSpPr>
-        <p:spPr>
-          <a:xfrm>
-            <a:off x="381000" y="685800"/>
-            <a:ext cx="6096000" cy="3429000"/>
-          </a:xfrm>
-          <a:custGeom>
-            <a:avLst/>
-            <a:gdLst/>
-            <a:ahLst/>
-            <a:cxnLst/>
-            <a:rect l="l" t="t" r="r" b="b"/>
-            <a:pathLst>
-              <a:path w="120000" h="120000" extrusionOk="0">
-                <a:moveTo>
-                  <a:pt x="0" y="0"/>
-                </a:moveTo>
-                <a:lnTo>
-                  <a:pt x="120000" y="0"/>
-                </a:lnTo>
-                <a:lnTo>
-                  <a:pt x="120000" y="120000"/>
-                </a:lnTo>
-                <a:lnTo>
-                  <a:pt x="0" y="120000"/>
-                </a:lnTo>
-                <a:close/>
-              </a:path>
-            </a:pathLst>
-          </a:custGeom>
-        </p:spPr>
-      </p:sp>
-      <p:sp>
-        <p:nvSpPr>
-          <p:cNvPr id="76" name="Google Shape;76;g512343d575_0_63:notes"/>
-          <p:cNvSpPr txBox="1">
-            <a:spLocks noGrp="1"/>
-          </p:cNvSpPr>
-          <p:nvPr>
-            <p:ph type="body" idx="1"/>
-          </p:nvPr>
-        </p:nvSpPr>
-        <p:spPr>
-          <a:xfrm>
-            <a:off x="685800" y="4343400"/>
-            <a:ext cx="5486400" cy="4114800"/>
-          </a:xfrm>
-          <a:prstGeom prst="rect">
-            <a:avLst/>
-          </a:prstGeom>
-        </p:spPr>
-        <p:txBody>
-          <a:bodyPr spcFirstLastPara="1" wrap="square" lIns="91425" tIns="91425" rIns="91425" bIns="91425" anchor="t" anchorCtr="0">
-            <a:noAutofit/>
-          </a:bodyPr>
-          <a:lstStyle/>
-          <a:p>
-            <a:pPr marL="0" lvl="0" indent="0" algn="l" rtl="0">
-              <a:spcBef>
-                <a:spcPts val="0"/>
-              </a:spcBef>
-              <a:spcAft>
-                <a:spcPts val="0"/>
-              </a:spcAft>
-              <a:buNone/>
-            </a:pPr>
-            <a:endParaRPr/>
-          </a:p>
-        </p:txBody>
-      </p:sp>
-    </p:spTree>
-    <p:extLst>
-      <p:ext uri="{BB962C8B-B14F-4D97-AF65-F5344CB8AC3E}">
-        <p14:creationId xmlns:p14="http://schemas.microsoft.com/office/powerpoint/2010/main" val="2925553286"/>
-      </p:ext>
-    </p:extLst>
-  </p:cSld>
-  <p:clrMapOvr>
-    <a:masterClrMapping/>
-  </p:clrMapOvr>
-</p:notes>
-</file>
-
-<file path=ppt/notesSlides/notesSlide5.xml><?xml version="1.0" encoding="utf-8"?>
-<p:notes xmlns:a="http://schemas.openxmlformats.org/drawingml/2006/main" xmlns:r="http://schemas.openxmlformats.org/officeDocument/2006/relationships" xmlns:p="http://schemas.openxmlformats.org/presentationml/2006/main" showMasterSp="0" showMasterPhAnim="0">
-  <p:cSld>
-    <p:spTree>
-      <p:nvGrpSpPr>
-        <p:cNvPr id="1" name="Shape 80"/>
+        <p:cNvPr id="80" name="Shape 80"/>
         <p:cNvGrpSpPr/>
         <p:nvPr/>
       </p:nvGrpSpPr>
@@ -1180,11 +922,9 @@
       <p:sp>
         <p:nvSpPr>
           <p:cNvPr id="81" name="Google Shape;81;g512343d575_1_8:notes"/>
-          <p:cNvSpPr>
-            <a:spLocks noGrp="1" noRot="1" noChangeAspect="1"/>
-          </p:cNvSpPr>
+          <p:cNvSpPr/>
           <p:nvPr>
-            <p:ph type="sldImg" idx="2"/>
+            <p:ph idx="2" type="sldImg"/>
           </p:nvPr>
         </p:nvSpPr>
         <p:spPr>
@@ -1193,13 +933,9 @@
             <a:ext cx="6096000" cy="3429000"/>
           </a:xfrm>
           <a:custGeom>
-            <a:avLst/>
-            <a:gdLst/>
-            <a:ahLst/>
-            <a:cxnLst/>
-            <a:rect l="l" t="t" r="r" b="b"/>
+            <a:rect b="b" l="l" r="r" t="t"/>
             <a:pathLst>
-              <a:path w="120000" h="120000" extrusionOk="0">
+              <a:path extrusionOk="0" h="120000" w="120000">
                 <a:moveTo>
                   <a:pt x="0" y="0"/>
                 </a:moveTo>
@@ -1221,11 +957,9 @@
       <p:sp>
         <p:nvSpPr>
           <p:cNvPr id="82" name="Google Shape;82;g512343d575_1_8:notes"/>
-          <p:cNvSpPr txBox="1">
-            <a:spLocks noGrp="1"/>
-          </p:cNvSpPr>
+          <p:cNvSpPr txBox="1"/>
           <p:nvPr>
-            <p:ph type="body" idx="1"/>
+            <p:ph idx="1" type="body"/>
           </p:nvPr>
         </p:nvSpPr>
         <p:spPr>
@@ -1238,12 +972,12 @@
           </a:prstGeom>
         </p:spPr>
         <p:txBody>
-          <a:bodyPr spcFirstLastPara="1" wrap="square" lIns="91425" tIns="91425" rIns="91425" bIns="91425" anchor="t" anchorCtr="0">
+          <a:bodyPr anchorCtr="0" anchor="t" bIns="91425" lIns="91425" spcFirstLastPara="1" rIns="91425" wrap="square" tIns="91425">
             <a:noAutofit/>
           </a:bodyPr>
           <a:lstStyle/>
           <a:p>
-            <a:pPr marL="0" lvl="0" indent="0" algn="l" rtl="0">
+            <a:pPr indent="0" lvl="0" marL="0" rtl="0" algn="l">
               <a:spcBef>
                 <a:spcPts val="0"/>
               </a:spcBef>
@@ -1252,16 +986,14 @@
               </a:spcAft>
               <a:buNone/>
             </a:pPr>
+            <a:r>
+              <a:t/>
+            </a:r>
             <a:endParaRPr/>
           </a:p>
         </p:txBody>
       </p:sp>
     </p:spTree>
-    <p:extLst>
-      <p:ext uri="{BB962C8B-B14F-4D97-AF65-F5344CB8AC3E}">
-        <p14:creationId xmlns:p14="http://schemas.microsoft.com/office/powerpoint/2010/main" val="535971168"/>
-      </p:ext>
-    </p:extLst>
   </p:cSld>
   <p:clrMapOvr>
     <a:masterClrMapping/>
@@ -1269,12 +1001,12 @@
 </p:notes>
 </file>
 
-<file path=ppt/notesSlides/notesSlide6.xml><?xml version="1.0" encoding="utf-8"?>
-<p:notes xmlns:a="http://schemas.openxmlformats.org/drawingml/2006/main" xmlns:r="http://schemas.openxmlformats.org/officeDocument/2006/relationships" xmlns:p="http://schemas.openxmlformats.org/presentationml/2006/main" showMasterSp="0" showMasterPhAnim="0">
+<file path=ppt/notesSlides/notesSlide4.xml><?xml version="1.0" encoding="utf-8"?>
+<p:notes xmlns:a="http://schemas.openxmlformats.org/drawingml/2006/main" xmlns:r="http://schemas.openxmlformats.org/officeDocument/2006/relationships" xmlns:mc="http://schemas.openxmlformats.org/markup-compatibility/2006" xmlns:mv="urn:schemas-microsoft-com:mac:vml" xmlns:p="http://schemas.openxmlformats.org/presentationml/2006/main" xmlns:c="http://schemas.openxmlformats.org/drawingml/2006/chart" xmlns:dgm="http://schemas.openxmlformats.org/drawingml/2006/diagram" xmlns:o="urn:schemas-microsoft-com:office:office" xmlns:v="urn:schemas-microsoft-com:vml" xmlns:pvml="urn:schemas-microsoft-com:office:powerpoint" xmlns:com="http://schemas.openxmlformats.org/drawingml/2006/compatibility" xmlns:p14="http://schemas.microsoft.com/office/powerpoint/2010/main" xmlns:p15="http://schemas.microsoft.com/office/powerpoint/2012/main" showMasterPhAnim="0" showMasterSp="0">
   <p:cSld>
     <p:spTree>
       <p:nvGrpSpPr>
-        <p:cNvPr id="1" name="Shape 87"/>
+        <p:cNvPr id="87" name="Shape 87"/>
         <p:cNvGrpSpPr/>
         <p:nvPr/>
       </p:nvGrpSpPr>
@@ -1289,11 +1021,9 @@
       <p:sp>
         <p:nvSpPr>
           <p:cNvPr id="88" name="Google Shape;88;g512343d575_1_0:notes"/>
-          <p:cNvSpPr>
-            <a:spLocks noGrp="1" noRot="1" noChangeAspect="1"/>
-          </p:cNvSpPr>
+          <p:cNvSpPr/>
           <p:nvPr>
-            <p:ph type="sldImg" idx="2"/>
+            <p:ph idx="2" type="sldImg"/>
           </p:nvPr>
         </p:nvSpPr>
         <p:spPr>
@@ -1302,13 +1032,9 @@
             <a:ext cx="6096000" cy="3429000"/>
           </a:xfrm>
           <a:custGeom>
-            <a:avLst/>
-            <a:gdLst/>
-            <a:ahLst/>
-            <a:cxnLst/>
-            <a:rect l="l" t="t" r="r" b="b"/>
+            <a:rect b="b" l="l" r="r" t="t"/>
             <a:pathLst>
-              <a:path w="120000" h="120000" extrusionOk="0">
+              <a:path extrusionOk="0" h="120000" w="120000">
                 <a:moveTo>
                   <a:pt x="0" y="0"/>
                 </a:moveTo>
@@ -1330,11 +1056,9 @@
       <p:sp>
         <p:nvSpPr>
           <p:cNvPr id="89" name="Google Shape;89;g512343d575_1_0:notes"/>
-          <p:cNvSpPr txBox="1">
-            <a:spLocks noGrp="1"/>
-          </p:cNvSpPr>
+          <p:cNvSpPr txBox="1"/>
           <p:nvPr>
-            <p:ph type="body" idx="1"/>
+            <p:ph idx="1" type="body"/>
           </p:nvPr>
         </p:nvSpPr>
         <p:spPr>
@@ -1347,12 +1071,12 @@
           </a:prstGeom>
         </p:spPr>
         <p:txBody>
-          <a:bodyPr spcFirstLastPara="1" wrap="square" lIns="91425" tIns="91425" rIns="91425" bIns="91425" anchor="t" anchorCtr="0">
+          <a:bodyPr anchorCtr="0" anchor="t" bIns="91425" lIns="91425" spcFirstLastPara="1" rIns="91425" wrap="square" tIns="91425">
             <a:noAutofit/>
           </a:bodyPr>
           <a:lstStyle/>
           <a:p>
-            <a:pPr marL="0" lvl="0" indent="0" algn="l" rtl="0">
+            <a:pPr indent="0" lvl="0" marL="0" rtl="0" algn="l">
               <a:spcBef>
                 <a:spcPts val="0"/>
               </a:spcBef>
@@ -1361,16 +1085,14 @@
               </a:spcAft>
               <a:buNone/>
             </a:pPr>
+            <a:r>
+              <a:t/>
+            </a:r>
             <a:endParaRPr/>
           </a:p>
         </p:txBody>
       </p:sp>
     </p:spTree>
-    <p:extLst>
-      <p:ext uri="{BB962C8B-B14F-4D97-AF65-F5344CB8AC3E}">
-        <p14:creationId xmlns:p14="http://schemas.microsoft.com/office/powerpoint/2010/main" val="1954257791"/>
-      </p:ext>
-    </p:extLst>
   </p:cSld>
   <p:clrMapOvr>
     <a:masterClrMapping/>
@@ -1378,12 +1100,12 @@
 </p:notes>
 </file>
 
-<file path=ppt/notesSlides/notesSlide7.xml><?xml version="1.0" encoding="utf-8"?>
-<p:notes xmlns:a="http://schemas.openxmlformats.org/drawingml/2006/main" xmlns:r="http://schemas.openxmlformats.org/officeDocument/2006/relationships" xmlns:p="http://schemas.openxmlformats.org/presentationml/2006/main" showMasterSp="0" showMasterPhAnim="0">
+<file path=ppt/notesSlides/notesSlide5.xml><?xml version="1.0" encoding="utf-8"?>
+<p:notes xmlns:a="http://schemas.openxmlformats.org/drawingml/2006/main" xmlns:r="http://schemas.openxmlformats.org/officeDocument/2006/relationships" xmlns:mc="http://schemas.openxmlformats.org/markup-compatibility/2006" xmlns:mv="urn:schemas-microsoft-com:mac:vml" xmlns:p="http://schemas.openxmlformats.org/presentationml/2006/main" xmlns:c="http://schemas.openxmlformats.org/drawingml/2006/chart" xmlns:dgm="http://schemas.openxmlformats.org/drawingml/2006/diagram" xmlns:o="urn:schemas-microsoft-com:office:office" xmlns:v="urn:schemas-microsoft-com:vml" xmlns:pvml="urn:schemas-microsoft-com:office:powerpoint" xmlns:com="http://schemas.openxmlformats.org/drawingml/2006/compatibility" xmlns:p14="http://schemas.microsoft.com/office/powerpoint/2010/main" xmlns:p15="http://schemas.microsoft.com/office/powerpoint/2012/main" showMasterPhAnim="0" showMasterSp="0">
   <p:cSld>
     <p:spTree>
       <p:nvGrpSpPr>
-        <p:cNvPr id="1" name="Shape 93"/>
+        <p:cNvPr id="93" name="Shape 93"/>
         <p:cNvGrpSpPr/>
         <p:nvPr/>
       </p:nvGrpSpPr>
@@ -1398,11 +1120,9 @@
       <p:sp>
         <p:nvSpPr>
           <p:cNvPr id="94" name="Google Shape;94;g512343d575_0_68:notes"/>
-          <p:cNvSpPr>
-            <a:spLocks noGrp="1" noRot="1" noChangeAspect="1"/>
-          </p:cNvSpPr>
+          <p:cNvSpPr/>
           <p:nvPr>
-            <p:ph type="sldImg" idx="2"/>
+            <p:ph idx="2" type="sldImg"/>
           </p:nvPr>
         </p:nvSpPr>
         <p:spPr>
@@ -1411,13 +1131,9 @@
             <a:ext cx="6096000" cy="3429000"/>
           </a:xfrm>
           <a:custGeom>
-            <a:avLst/>
-            <a:gdLst/>
-            <a:ahLst/>
-            <a:cxnLst/>
-            <a:rect l="l" t="t" r="r" b="b"/>
+            <a:rect b="b" l="l" r="r" t="t"/>
             <a:pathLst>
-              <a:path w="120000" h="120000" extrusionOk="0">
+              <a:path extrusionOk="0" h="120000" w="120000">
                 <a:moveTo>
                   <a:pt x="0" y="0"/>
                 </a:moveTo>
@@ -1439,11 +1155,9 @@
       <p:sp>
         <p:nvSpPr>
           <p:cNvPr id="95" name="Google Shape;95;g512343d575_0_68:notes"/>
-          <p:cNvSpPr txBox="1">
-            <a:spLocks noGrp="1"/>
-          </p:cNvSpPr>
+          <p:cNvSpPr txBox="1"/>
           <p:nvPr>
-            <p:ph type="body" idx="1"/>
+            <p:ph idx="1" type="body"/>
           </p:nvPr>
         </p:nvSpPr>
         <p:spPr>
@@ -1456,12 +1170,12 @@
           </a:prstGeom>
         </p:spPr>
         <p:txBody>
-          <a:bodyPr spcFirstLastPara="1" wrap="square" lIns="91425" tIns="91425" rIns="91425" bIns="91425" anchor="t" anchorCtr="0">
+          <a:bodyPr anchorCtr="0" anchor="t" bIns="91425" lIns="91425" spcFirstLastPara="1" rIns="91425" wrap="square" tIns="91425">
             <a:noAutofit/>
           </a:bodyPr>
           <a:lstStyle/>
           <a:p>
-            <a:pPr marL="0" lvl="0" indent="0" algn="l" rtl="0">
+            <a:pPr indent="0" lvl="0" marL="0" rtl="0" algn="l">
               <a:spcBef>
                 <a:spcPts val="0"/>
               </a:spcBef>
@@ -1470,16 +1184,14 @@
               </a:spcAft>
               <a:buNone/>
             </a:pPr>
+            <a:r>
+              <a:t/>
+            </a:r>
             <a:endParaRPr/>
           </a:p>
         </p:txBody>
       </p:sp>
     </p:spTree>
-    <p:extLst>
-      <p:ext uri="{BB962C8B-B14F-4D97-AF65-F5344CB8AC3E}">
-        <p14:creationId xmlns:p14="http://schemas.microsoft.com/office/powerpoint/2010/main" val="3284443764"/>
-      </p:ext>
-    </p:extLst>
   </p:cSld>
   <p:clrMapOvr>
     <a:masterClrMapping/>
@@ -1488,19 +1200,18 @@
 </file>
 
 <file path=ppt/slideLayouts/slideLayout1.xml><?xml version="1.0" encoding="utf-8"?>
-<p:sldLayout xmlns:a="http://schemas.openxmlformats.org/drawingml/2006/main" xmlns:r="http://schemas.openxmlformats.org/officeDocument/2006/relationships" xmlns:p="http://schemas.openxmlformats.org/presentationml/2006/main" matchingName="Title slide" type="title">
+<p:sldLayout xmlns:a="http://schemas.openxmlformats.org/drawingml/2006/main" xmlns:r="http://schemas.openxmlformats.org/officeDocument/2006/relationships" xmlns:mc="http://schemas.openxmlformats.org/markup-compatibility/2006" xmlns:mv="urn:schemas-microsoft-com:mac:vml" xmlns:p="http://schemas.openxmlformats.org/presentationml/2006/main" xmlns:c="http://schemas.openxmlformats.org/drawingml/2006/chart" xmlns:dgm="http://schemas.openxmlformats.org/drawingml/2006/diagram" xmlns:o="urn:schemas-microsoft-com:office:office" xmlns:v="urn:schemas-microsoft-com:vml" xmlns:pvml="urn:schemas-microsoft-com:office:powerpoint" xmlns:com="http://schemas.openxmlformats.org/drawingml/2006/compatibility" xmlns:p14="http://schemas.microsoft.com/office/powerpoint/2010/main" xmlns:p15="http://schemas.microsoft.com/office/powerpoint/2012/main" matchingName="Title slide" type="title">
   <p:cSld name="TITLE">
     <p:bg>
       <p:bgPr>
         <a:solidFill>
           <a:schemeClr val="dk1"/>
         </a:solidFill>
-        <a:effectLst/>
       </p:bgPr>
     </p:bg>
     <p:spTree>
       <p:nvGrpSpPr>
-        <p:cNvPr id="1" name="Shape 9"/>
+        <p:cNvPr id="9" name="Shape 9"/>
         <p:cNvGrpSpPr/>
         <p:nvPr/>
       </p:nvGrpSpPr>
@@ -1527,14 +1238,14 @@
             <a:avLst/>
           </a:prstGeom>
           <a:noFill/>
-          <a:ln w="38100" cap="flat" cmpd="sng">
+          <a:ln cap="flat" cmpd="sng" w="38100">
             <a:solidFill>
               <a:schemeClr val="lt1"/>
             </a:solidFill>
             <a:prstDash val="solid"/>
             <a:round/>
-            <a:headEnd type="none" w="sm" len="sm"/>
-            <a:tailEnd type="none" w="sm" len="sm"/>
+            <a:headEnd len="sm" w="sm" type="none"/>
+            <a:tailEnd len="sm" w="sm" type="none"/>
           </a:ln>
         </p:spPr>
       </p:cxnSp>
@@ -1553,14 +1264,14 @@
             <a:avLst/>
           </a:prstGeom>
           <a:noFill/>
-          <a:ln w="19050" cap="flat" cmpd="sng">
+          <a:ln cap="flat" cmpd="sng" w="19050">
             <a:solidFill>
               <a:schemeClr val="lt1"/>
             </a:solidFill>
             <a:prstDash val="solid"/>
             <a:round/>
-            <a:headEnd type="none" w="sm" len="sm"/>
-            <a:tailEnd type="none" w="sm" len="sm"/>
+            <a:headEnd len="sm" w="sm" type="none"/>
+            <a:tailEnd len="sm" w="sm" type="none"/>
           </a:ln>
         </p:spPr>
       </p:cxnSp>
@@ -1579,23 +1290,21 @@
             <a:avLst/>
           </a:prstGeom>
           <a:noFill/>
-          <a:ln w="19050" cap="flat" cmpd="sng">
+          <a:ln cap="flat" cmpd="sng" w="19050">
             <a:solidFill>
               <a:schemeClr val="lt1"/>
             </a:solidFill>
             <a:prstDash val="solid"/>
             <a:round/>
-            <a:headEnd type="none" w="sm" len="sm"/>
-            <a:tailEnd type="none" w="sm" len="sm"/>
+            <a:headEnd len="sm" w="sm" type="none"/>
+            <a:tailEnd len="sm" w="sm" type="none"/>
           </a:ln>
         </p:spPr>
       </p:cxnSp>
       <p:sp>
         <p:nvSpPr>
           <p:cNvPr id="13" name="Google Shape;13;p2"/>
-          <p:cNvSpPr txBox="1">
-            <a:spLocks noGrp="1"/>
-          </p:cNvSpPr>
+          <p:cNvSpPr txBox="1"/>
           <p:nvPr>
             <p:ph type="ctrTitle"/>
           </p:nvPr>
@@ -1610,7 +1319,7 @@
           </a:prstGeom>
         </p:spPr>
         <p:txBody>
-          <a:bodyPr spcFirstLastPara="1" wrap="square" lIns="91425" tIns="91425" rIns="91425" bIns="91425" anchor="t" anchorCtr="0"/>
+          <a:bodyPr anchorCtr="0" anchor="t" bIns="91425" lIns="91425" spcFirstLastPara="1" rIns="91425" wrap="square" tIns="91425"/>
           <a:lstStyle>
             <a:lvl1pPr lvl="0">
               <a:spcBef>
@@ -1775,19 +1484,15 @@
               </a:defRPr>
             </a:lvl9pPr>
           </a:lstStyle>
-          <a:p>
-            <a:endParaRPr/>
-          </a:p>
+          <a:p/>
         </p:txBody>
       </p:sp>
       <p:sp>
         <p:nvSpPr>
           <p:cNvPr id="14" name="Google Shape;14;p2"/>
-          <p:cNvSpPr txBox="1">
-            <a:spLocks noGrp="1"/>
-          </p:cNvSpPr>
+          <p:cNvSpPr txBox="1"/>
           <p:nvPr>
-            <p:ph type="subTitle" idx="1"/>
+            <p:ph idx="1" type="subTitle"/>
           </p:nvPr>
         </p:nvSpPr>
         <p:spPr>
@@ -1800,7 +1505,7 @@
           </a:prstGeom>
         </p:spPr>
         <p:txBody>
-          <a:bodyPr spcFirstLastPara="1" wrap="square" lIns="91425" tIns="91425" rIns="91425" bIns="91425" anchor="b" anchorCtr="0"/>
+          <a:bodyPr anchorCtr="0" anchor="b" bIns="91425" lIns="91425" spcFirstLastPara="1" rIns="91425" wrap="square" tIns="91425"/>
           <a:lstStyle>
             <a:lvl1pPr lvl="0">
               <a:lnSpc>
@@ -1992,19 +1697,15 @@
               </a:defRPr>
             </a:lvl9pPr>
           </a:lstStyle>
-          <a:p>
-            <a:endParaRPr/>
-          </a:p>
+          <a:p/>
         </p:txBody>
       </p:sp>
       <p:sp>
         <p:nvSpPr>
           <p:cNvPr id="15" name="Google Shape;15;p2"/>
-          <p:cNvSpPr txBox="1">
-            <a:spLocks noGrp="1"/>
-          </p:cNvSpPr>
+          <p:cNvSpPr txBox="1"/>
           <p:nvPr>
-            <p:ph type="sldNum" idx="12"/>
+            <p:ph idx="12" type="sldNum"/>
           </p:nvPr>
         </p:nvSpPr>
         <p:spPr>
@@ -2017,7 +1718,7 @@
           </a:prstGeom>
         </p:spPr>
         <p:txBody>
-          <a:bodyPr spcFirstLastPara="1" wrap="square" lIns="91425" tIns="91425" rIns="91425" bIns="91425" anchor="ctr" anchorCtr="0">
+          <a:bodyPr anchorCtr="0" anchor="ctr" bIns="91425" lIns="91425" spcFirstLastPara="1" rIns="91425" wrap="square" tIns="91425">
             <a:noAutofit/>
           </a:bodyPr>
           <a:lstStyle>
@@ -2095,7 +1796,7 @@
             </a:lvl9pPr>
           </a:lstStyle>
           <a:p>
-            <a:pPr marL="0" lvl="0" indent="0" algn="r" rtl="0">
+            <a:pPr indent="0" lvl="0" marL="0" rtl="0" algn="r">
               <a:spcBef>
                 <a:spcPts val="0"/>
               </a:spcBef>
@@ -2121,11 +1822,11 @@
 </file>
 
 <file path=ppt/slideLayouts/slideLayout10.xml><?xml version="1.0" encoding="utf-8"?>
-<p:sldLayout xmlns:a="http://schemas.openxmlformats.org/drawingml/2006/main" xmlns:r="http://schemas.openxmlformats.org/officeDocument/2006/relationships" xmlns:p="http://schemas.openxmlformats.org/presentationml/2006/main" matchingName="Big number">
+<p:sldLayout xmlns:a="http://schemas.openxmlformats.org/drawingml/2006/main" xmlns:r="http://schemas.openxmlformats.org/officeDocument/2006/relationships" xmlns:mc="http://schemas.openxmlformats.org/markup-compatibility/2006" xmlns:mv="urn:schemas-microsoft-com:mac:vml" xmlns:p="http://schemas.openxmlformats.org/presentationml/2006/main" xmlns:c="http://schemas.openxmlformats.org/drawingml/2006/chart" xmlns:dgm="http://schemas.openxmlformats.org/drawingml/2006/diagram" xmlns:o="urn:schemas-microsoft-com:office:office" xmlns:v="urn:schemas-microsoft-com:vml" xmlns:pvml="urn:schemas-microsoft-com:office:powerpoint" xmlns:com="http://schemas.openxmlformats.org/drawingml/2006/compatibility" xmlns:p14="http://schemas.microsoft.com/office/powerpoint/2010/main" xmlns:p15="http://schemas.microsoft.com/office/powerpoint/2012/main" matchingName="Big number">
   <p:cSld name="BIG_NUMBER">
     <p:spTree>
       <p:nvGrpSpPr>
-        <p:cNvPr id="1" name="Shape 60"/>
+        <p:cNvPr id="60" name="Shape 60"/>
         <p:cNvGrpSpPr/>
         <p:nvPr/>
       </p:nvGrpSpPr>
@@ -2152,14 +1853,14 @@
             <a:avLst/>
           </a:prstGeom>
           <a:noFill/>
-          <a:ln w="19050" cap="flat" cmpd="sng">
+          <a:ln cap="flat" cmpd="sng" w="19050">
             <a:solidFill>
               <a:schemeClr val="dk2"/>
             </a:solidFill>
             <a:prstDash val="solid"/>
             <a:round/>
-            <a:headEnd type="none" w="sm" len="sm"/>
-            <a:tailEnd type="none" w="sm" len="sm"/>
+            <a:headEnd len="sm" w="sm" type="none"/>
+            <a:tailEnd len="sm" w="sm" type="none"/>
           </a:ln>
         </p:spPr>
       </p:cxnSp>
@@ -2178,25 +1879,23 @@
             <a:avLst/>
           </a:prstGeom>
           <a:noFill/>
-          <a:ln w="38100" cap="flat" cmpd="sng">
+          <a:ln cap="flat" cmpd="sng" w="38100">
             <a:solidFill>
               <a:schemeClr val="dk2"/>
             </a:solidFill>
             <a:prstDash val="solid"/>
             <a:round/>
-            <a:headEnd type="none" w="sm" len="sm"/>
-            <a:tailEnd type="none" w="sm" len="sm"/>
+            <a:headEnd len="sm" w="sm" type="none"/>
+            <a:tailEnd len="sm" w="sm" type="none"/>
           </a:ln>
         </p:spPr>
       </p:cxnSp>
       <p:sp>
         <p:nvSpPr>
           <p:cNvPr id="63" name="Google Shape;63;p11"/>
-          <p:cNvSpPr txBox="1">
-            <a:spLocks noGrp="1"/>
-          </p:cNvSpPr>
+          <p:cNvSpPr txBox="1"/>
           <p:nvPr>
-            <p:ph type="title" hasCustomPrompt="1"/>
+            <p:ph hasCustomPrompt="1" type="title"/>
           </p:nvPr>
         </p:nvSpPr>
         <p:spPr>
@@ -2209,7 +1908,7 @@
           </a:prstGeom>
         </p:spPr>
         <p:txBody>
-          <a:bodyPr spcFirstLastPara="1" wrap="square" lIns="91425" tIns="91425" rIns="91425" bIns="91425" anchor="ctr" anchorCtr="0"/>
+          <a:bodyPr anchorCtr="0" anchor="ctr" bIns="91425" lIns="91425" spcFirstLastPara="1" rIns="91425" wrap="square" tIns="91425"/>
           <a:lstStyle>
             <a:lvl1pPr lvl="0" algn="ctr">
               <a:spcBef>
@@ -2429,11 +2128,9 @@
       <p:sp>
         <p:nvSpPr>
           <p:cNvPr id="64" name="Google Shape;64;p11"/>
-          <p:cNvSpPr txBox="1">
-            <a:spLocks noGrp="1"/>
-          </p:cNvSpPr>
+          <p:cNvSpPr txBox="1"/>
           <p:nvPr>
-            <p:ph type="body" idx="1"/>
+            <p:ph idx="1" type="body"/>
           </p:nvPr>
         </p:nvSpPr>
         <p:spPr>
@@ -2446,9 +2143,9 @@
           </a:prstGeom>
         </p:spPr>
         <p:txBody>
-          <a:bodyPr spcFirstLastPara="1" wrap="square" lIns="91425" tIns="91425" rIns="91425" bIns="91425" anchor="t" anchorCtr="0"/>
+          <a:bodyPr anchorCtr="0" anchor="t" bIns="91425" lIns="91425" spcFirstLastPara="1" rIns="91425" wrap="square" tIns="91425"/>
           <a:lstStyle>
-            <a:lvl1pPr marL="457200" lvl="0" indent="-342900" algn="ctr">
+            <a:lvl1pPr indent="-342900" lvl="0" marL="457200" algn="ctr">
               <a:spcBef>
                 <a:spcPts val="0"/>
               </a:spcBef>
@@ -2459,7 +2156,7 @@
               <a:buChar char="●"/>
               <a:defRPr/>
             </a:lvl1pPr>
-            <a:lvl2pPr marL="914400" lvl="1" indent="-317500" algn="ctr">
+            <a:lvl2pPr indent="-317500" lvl="1" marL="914400" algn="ctr">
               <a:spcBef>
                 <a:spcPts val="1600"/>
               </a:spcBef>
@@ -2470,7 +2167,7 @@
               <a:buChar char="○"/>
               <a:defRPr/>
             </a:lvl2pPr>
-            <a:lvl3pPr marL="1371600" lvl="2" indent="-317500" algn="ctr">
+            <a:lvl3pPr indent="-317500" lvl="2" marL="1371600" algn="ctr">
               <a:spcBef>
                 <a:spcPts val="1600"/>
               </a:spcBef>
@@ -2481,7 +2178,7 @@
               <a:buChar char="■"/>
               <a:defRPr/>
             </a:lvl3pPr>
-            <a:lvl4pPr marL="1828800" lvl="3" indent="-317500" algn="ctr">
+            <a:lvl4pPr indent="-317500" lvl="3" marL="1828800" algn="ctr">
               <a:spcBef>
                 <a:spcPts val="1600"/>
               </a:spcBef>
@@ -2492,7 +2189,7 @@
               <a:buChar char="●"/>
               <a:defRPr/>
             </a:lvl4pPr>
-            <a:lvl5pPr marL="2286000" lvl="4" indent="-317500" algn="ctr">
+            <a:lvl5pPr indent="-317500" lvl="4" marL="2286000" algn="ctr">
               <a:spcBef>
                 <a:spcPts val="1600"/>
               </a:spcBef>
@@ -2503,7 +2200,7 @@
               <a:buChar char="○"/>
               <a:defRPr/>
             </a:lvl5pPr>
-            <a:lvl6pPr marL="2743200" lvl="5" indent="-317500" algn="ctr">
+            <a:lvl6pPr indent="-317500" lvl="5" marL="2743200" algn="ctr">
               <a:spcBef>
                 <a:spcPts val="1600"/>
               </a:spcBef>
@@ -2514,7 +2211,7 @@
               <a:buChar char="■"/>
               <a:defRPr/>
             </a:lvl6pPr>
-            <a:lvl7pPr marL="3200400" lvl="6" indent="-317500" algn="ctr">
+            <a:lvl7pPr indent="-317500" lvl="6" marL="3200400" algn="ctr">
               <a:spcBef>
                 <a:spcPts val="1600"/>
               </a:spcBef>
@@ -2525,7 +2222,7 @@
               <a:buChar char="●"/>
               <a:defRPr/>
             </a:lvl7pPr>
-            <a:lvl8pPr marL="3657600" lvl="7" indent="-317500" algn="ctr">
+            <a:lvl8pPr indent="-317500" lvl="7" marL="3657600" algn="ctr">
               <a:spcBef>
                 <a:spcPts val="1600"/>
               </a:spcBef>
@@ -2536,7 +2233,7 @@
               <a:buChar char="○"/>
               <a:defRPr/>
             </a:lvl8pPr>
-            <a:lvl9pPr marL="4114800" lvl="8" indent="-317500" algn="ctr">
+            <a:lvl9pPr indent="-317500" lvl="8" marL="4114800" algn="ctr">
               <a:spcBef>
                 <a:spcPts val="1600"/>
               </a:spcBef>
@@ -2548,19 +2245,15 @@
               <a:defRPr/>
             </a:lvl9pPr>
           </a:lstStyle>
-          <a:p>
-            <a:endParaRPr/>
-          </a:p>
+          <a:p/>
         </p:txBody>
       </p:sp>
       <p:sp>
         <p:nvSpPr>
           <p:cNvPr id="65" name="Google Shape;65;p11"/>
-          <p:cNvSpPr txBox="1">
-            <a:spLocks noGrp="1"/>
-          </p:cNvSpPr>
+          <p:cNvSpPr txBox="1"/>
           <p:nvPr>
-            <p:ph type="sldNum" idx="12"/>
+            <p:ph idx="12" type="sldNum"/>
           </p:nvPr>
         </p:nvSpPr>
         <p:spPr>
@@ -2573,7 +2266,7 @@
           </a:prstGeom>
         </p:spPr>
         <p:txBody>
-          <a:bodyPr spcFirstLastPara="1" wrap="square" lIns="91425" tIns="91425" rIns="91425" bIns="91425" anchor="ctr" anchorCtr="0">
+          <a:bodyPr anchorCtr="0" anchor="ctr" bIns="91425" lIns="91425" spcFirstLastPara="1" rIns="91425" wrap="square" tIns="91425">
             <a:noAutofit/>
           </a:bodyPr>
           <a:lstStyle>
@@ -2615,7 +2308,7 @@
             </a:lvl9pPr>
           </a:lstStyle>
           <a:p>
-            <a:pPr marL="0" lvl="0" indent="0" algn="r" rtl="0">
+            <a:pPr indent="0" lvl="0" marL="0" rtl="0" algn="r">
               <a:spcBef>
                 <a:spcPts val="0"/>
               </a:spcBef>
@@ -2641,11 +2334,11 @@
 </file>
 
 <file path=ppt/slideLayouts/slideLayout11.xml><?xml version="1.0" encoding="utf-8"?>
-<p:sldLayout xmlns:a="http://schemas.openxmlformats.org/drawingml/2006/main" xmlns:r="http://schemas.openxmlformats.org/officeDocument/2006/relationships" xmlns:p="http://schemas.openxmlformats.org/presentationml/2006/main" matchingName="Blank" type="blank">
+<p:sldLayout xmlns:a="http://schemas.openxmlformats.org/drawingml/2006/main" xmlns:r="http://schemas.openxmlformats.org/officeDocument/2006/relationships" xmlns:mc="http://schemas.openxmlformats.org/markup-compatibility/2006" xmlns:mv="urn:schemas-microsoft-com:mac:vml" xmlns:p="http://schemas.openxmlformats.org/presentationml/2006/main" xmlns:c="http://schemas.openxmlformats.org/drawingml/2006/chart" xmlns:dgm="http://schemas.openxmlformats.org/drawingml/2006/diagram" xmlns:o="urn:schemas-microsoft-com:office:office" xmlns:v="urn:schemas-microsoft-com:vml" xmlns:pvml="urn:schemas-microsoft-com:office:powerpoint" xmlns:com="http://schemas.openxmlformats.org/drawingml/2006/compatibility" xmlns:p14="http://schemas.microsoft.com/office/powerpoint/2010/main" xmlns:p15="http://schemas.microsoft.com/office/powerpoint/2012/main" matchingName="Blank" type="blank">
   <p:cSld name="BLANK">
     <p:spTree>
       <p:nvGrpSpPr>
-        <p:cNvPr id="1" name="Shape 66"/>
+        <p:cNvPr id="66" name="Shape 66"/>
         <p:cNvGrpSpPr/>
         <p:nvPr/>
       </p:nvGrpSpPr>
@@ -2660,11 +2353,9 @@
       <p:sp>
         <p:nvSpPr>
           <p:cNvPr id="67" name="Google Shape;67;p12"/>
-          <p:cNvSpPr txBox="1">
-            <a:spLocks noGrp="1"/>
-          </p:cNvSpPr>
+          <p:cNvSpPr txBox="1"/>
           <p:nvPr>
-            <p:ph type="sldNum" idx="12"/>
+            <p:ph idx="12" type="sldNum"/>
           </p:nvPr>
         </p:nvSpPr>
         <p:spPr>
@@ -2677,7 +2368,7 @@
           </a:prstGeom>
         </p:spPr>
         <p:txBody>
-          <a:bodyPr spcFirstLastPara="1" wrap="square" lIns="91425" tIns="91425" rIns="91425" bIns="91425" anchor="ctr" anchorCtr="0">
+          <a:bodyPr anchorCtr="0" anchor="ctr" bIns="91425" lIns="91425" spcFirstLastPara="1" rIns="91425" wrap="square" tIns="91425">
             <a:noAutofit/>
           </a:bodyPr>
           <a:lstStyle>
@@ -2719,7 +2410,7 @@
             </a:lvl9pPr>
           </a:lstStyle>
           <a:p>
-            <a:pPr marL="0" lvl="0" indent="0" algn="r" rtl="0">
+            <a:pPr indent="0" lvl="0" marL="0" rtl="0" algn="r">
               <a:spcBef>
                 <a:spcPts val="0"/>
               </a:spcBef>
@@ -2745,19 +2436,18 @@
 </file>
 
 <file path=ppt/slideLayouts/slideLayout2.xml><?xml version="1.0" encoding="utf-8"?>
-<p:sldLayout xmlns:a="http://schemas.openxmlformats.org/drawingml/2006/main" xmlns:r="http://schemas.openxmlformats.org/officeDocument/2006/relationships" xmlns:p="http://schemas.openxmlformats.org/presentationml/2006/main" matchingName="Section header" type="secHead">
+<p:sldLayout xmlns:a="http://schemas.openxmlformats.org/drawingml/2006/main" xmlns:r="http://schemas.openxmlformats.org/officeDocument/2006/relationships" xmlns:mc="http://schemas.openxmlformats.org/markup-compatibility/2006" xmlns:mv="urn:schemas-microsoft-com:mac:vml" xmlns:p="http://schemas.openxmlformats.org/presentationml/2006/main" xmlns:c="http://schemas.openxmlformats.org/drawingml/2006/chart" xmlns:dgm="http://schemas.openxmlformats.org/drawingml/2006/diagram" xmlns:o="urn:schemas-microsoft-com:office:office" xmlns:v="urn:schemas-microsoft-com:vml" xmlns:pvml="urn:schemas-microsoft-com:office:powerpoint" xmlns:com="http://schemas.openxmlformats.org/drawingml/2006/compatibility" xmlns:p14="http://schemas.microsoft.com/office/powerpoint/2010/main" xmlns:p15="http://schemas.microsoft.com/office/powerpoint/2012/main" matchingName="Section header" type="secHead">
   <p:cSld name="SECTION_HEADER">
     <p:bg>
       <p:bgPr>
         <a:solidFill>
           <a:schemeClr val="dk1"/>
         </a:solidFill>
-        <a:effectLst/>
       </p:bgPr>
     </p:bg>
     <p:spTree>
       <p:nvGrpSpPr>
-        <p:cNvPr id="1" name="Shape 16"/>
+        <p:cNvPr id="16" name="Shape 16"/>
         <p:cNvGrpSpPr/>
         <p:nvPr/>
       </p:nvGrpSpPr>
@@ -2784,14 +2474,14 @@
             <a:avLst/>
           </a:prstGeom>
           <a:noFill/>
-          <a:ln w="38100" cap="flat" cmpd="sng">
+          <a:ln cap="flat" cmpd="sng" w="38100">
             <a:solidFill>
               <a:schemeClr val="lt1"/>
             </a:solidFill>
             <a:prstDash val="solid"/>
             <a:round/>
-            <a:headEnd type="none" w="sm" len="sm"/>
-            <a:tailEnd type="none" w="sm" len="sm"/>
+            <a:headEnd len="sm" w="sm" type="none"/>
+            <a:tailEnd len="sm" w="sm" type="none"/>
           </a:ln>
         </p:spPr>
       </p:cxnSp>
@@ -2810,23 +2500,21 @@
             <a:avLst/>
           </a:prstGeom>
           <a:noFill/>
-          <a:ln w="19050" cap="flat" cmpd="sng">
+          <a:ln cap="flat" cmpd="sng" w="19050">
             <a:solidFill>
               <a:schemeClr val="lt1"/>
             </a:solidFill>
             <a:prstDash val="solid"/>
             <a:round/>
-            <a:headEnd type="none" w="sm" len="sm"/>
-            <a:tailEnd type="none" w="sm" len="sm"/>
+            <a:headEnd len="sm" w="sm" type="none"/>
+            <a:tailEnd len="sm" w="sm" type="none"/>
           </a:ln>
         </p:spPr>
       </p:cxnSp>
       <p:sp>
         <p:nvSpPr>
           <p:cNvPr id="19" name="Google Shape;19;p3"/>
-          <p:cNvSpPr txBox="1">
-            <a:spLocks noGrp="1"/>
-          </p:cNvSpPr>
+          <p:cNvSpPr txBox="1"/>
           <p:nvPr>
             <p:ph type="title"/>
           </p:nvPr>
@@ -2841,7 +2529,7 @@
           </a:prstGeom>
         </p:spPr>
         <p:txBody>
-          <a:bodyPr spcFirstLastPara="1" wrap="square" lIns="91425" tIns="91425" rIns="91425" bIns="91425" anchor="ctr" anchorCtr="0"/>
+          <a:bodyPr anchorCtr="0" anchor="ctr" bIns="91425" lIns="91425" spcFirstLastPara="1" rIns="91425" wrap="square" tIns="91425"/>
           <a:lstStyle>
             <a:lvl1pPr lvl="0" algn="ctr">
               <a:spcBef>
@@ -3006,19 +2694,15 @@
               </a:defRPr>
             </a:lvl9pPr>
           </a:lstStyle>
-          <a:p>
-            <a:endParaRPr/>
-          </a:p>
+          <a:p/>
         </p:txBody>
       </p:sp>
       <p:sp>
         <p:nvSpPr>
           <p:cNvPr id="20" name="Google Shape;20;p3"/>
-          <p:cNvSpPr txBox="1">
-            <a:spLocks noGrp="1"/>
-          </p:cNvSpPr>
+          <p:cNvSpPr txBox="1"/>
           <p:nvPr>
-            <p:ph type="sldNum" idx="12"/>
+            <p:ph idx="12" type="sldNum"/>
           </p:nvPr>
         </p:nvSpPr>
         <p:spPr>
@@ -3031,7 +2715,7 @@
           </a:prstGeom>
         </p:spPr>
         <p:txBody>
-          <a:bodyPr spcFirstLastPara="1" wrap="square" lIns="91425" tIns="91425" rIns="91425" bIns="91425" anchor="ctr" anchorCtr="0">
+          <a:bodyPr anchorCtr="0" anchor="ctr" bIns="91425" lIns="91425" spcFirstLastPara="1" rIns="91425" wrap="square" tIns="91425">
             <a:noAutofit/>
           </a:bodyPr>
           <a:lstStyle>
@@ -3109,7 +2793,7 @@
             </a:lvl9pPr>
           </a:lstStyle>
           <a:p>
-            <a:pPr marL="0" lvl="0" indent="0" algn="r" rtl="0">
+            <a:pPr indent="0" lvl="0" marL="0" rtl="0" algn="r">
               <a:spcBef>
                 <a:spcPts val="0"/>
               </a:spcBef>
@@ -3135,11 +2819,11 @@
 </file>
 
 <file path=ppt/slideLayouts/slideLayout3.xml><?xml version="1.0" encoding="utf-8"?>
-<p:sldLayout xmlns:a="http://schemas.openxmlformats.org/drawingml/2006/main" xmlns:r="http://schemas.openxmlformats.org/officeDocument/2006/relationships" xmlns:p="http://schemas.openxmlformats.org/presentationml/2006/main" matchingName="Title and body" type="tx">
+<p:sldLayout xmlns:a="http://schemas.openxmlformats.org/drawingml/2006/main" xmlns:r="http://schemas.openxmlformats.org/officeDocument/2006/relationships" xmlns:mc="http://schemas.openxmlformats.org/markup-compatibility/2006" xmlns:mv="urn:schemas-microsoft-com:mac:vml" xmlns:p="http://schemas.openxmlformats.org/presentationml/2006/main" xmlns:c="http://schemas.openxmlformats.org/drawingml/2006/chart" xmlns:dgm="http://schemas.openxmlformats.org/drawingml/2006/diagram" xmlns:o="urn:schemas-microsoft-com:office:office" xmlns:v="urn:schemas-microsoft-com:vml" xmlns:pvml="urn:schemas-microsoft-com:office:powerpoint" xmlns:com="http://schemas.openxmlformats.org/drawingml/2006/compatibility" xmlns:p14="http://schemas.microsoft.com/office/powerpoint/2010/main" xmlns:p15="http://schemas.microsoft.com/office/powerpoint/2012/main" matchingName="Title and body" type="tx">
   <p:cSld name="TITLE_AND_BODY">
     <p:spTree>
       <p:nvGrpSpPr>
-        <p:cNvPr id="1" name="Shape 21"/>
+        <p:cNvPr id="21" name="Shape 21"/>
         <p:cNvGrpSpPr/>
         <p:nvPr/>
       </p:nvGrpSpPr>
@@ -3166,14 +2850,14 @@
             <a:avLst/>
           </a:prstGeom>
           <a:noFill/>
-          <a:ln w="38100" cap="flat" cmpd="sng">
+          <a:ln cap="flat" cmpd="sng" w="38100">
             <a:solidFill>
               <a:schemeClr val="dk2"/>
             </a:solidFill>
             <a:prstDash val="solid"/>
             <a:round/>
-            <a:headEnd type="none" w="sm" len="sm"/>
-            <a:tailEnd type="none" w="sm" len="sm"/>
+            <a:headEnd len="sm" w="sm" type="none"/>
+            <a:tailEnd len="sm" w="sm" type="none"/>
           </a:ln>
         </p:spPr>
       </p:cxnSp>
@@ -3192,14 +2876,14 @@
             <a:avLst/>
           </a:prstGeom>
           <a:noFill/>
-          <a:ln w="19050" cap="flat" cmpd="sng">
+          <a:ln cap="flat" cmpd="sng" w="19050">
             <a:solidFill>
               <a:schemeClr val="dk2"/>
             </a:solidFill>
             <a:prstDash val="solid"/>
             <a:round/>
-            <a:headEnd type="none" w="sm" len="sm"/>
-            <a:tailEnd type="none" w="sm" len="sm"/>
+            <a:headEnd len="sm" w="sm" type="none"/>
+            <a:tailEnd len="sm" w="sm" type="none"/>
           </a:ln>
         </p:spPr>
       </p:cxnSp>
@@ -3218,23 +2902,21 @@
             <a:avLst/>
           </a:prstGeom>
           <a:noFill/>
-          <a:ln w="19050" cap="flat" cmpd="sng">
+          <a:ln cap="flat" cmpd="sng" w="19050">
             <a:solidFill>
               <a:schemeClr val="dk2"/>
             </a:solidFill>
             <a:prstDash val="solid"/>
             <a:round/>
-            <a:headEnd type="none" w="sm" len="sm"/>
-            <a:tailEnd type="none" w="sm" len="sm"/>
+            <a:headEnd len="sm" w="sm" type="none"/>
+            <a:tailEnd len="sm" w="sm" type="none"/>
           </a:ln>
         </p:spPr>
       </p:cxnSp>
       <p:sp>
         <p:nvSpPr>
           <p:cNvPr id="25" name="Google Shape;25;p4"/>
-          <p:cNvSpPr txBox="1">
-            <a:spLocks noGrp="1"/>
-          </p:cNvSpPr>
+          <p:cNvSpPr txBox="1"/>
           <p:nvPr>
             <p:ph type="title"/>
           </p:nvPr>
@@ -3249,7 +2931,7 @@
           </a:prstGeom>
         </p:spPr>
         <p:txBody>
-          <a:bodyPr spcFirstLastPara="1" wrap="square" lIns="91425" tIns="91425" rIns="91425" bIns="91425" anchor="t" anchorCtr="0"/>
+          <a:bodyPr anchorCtr="0" anchor="t" bIns="91425" lIns="91425" spcFirstLastPara="1" rIns="91425" wrap="square" tIns="91425"/>
           <a:lstStyle>
             <a:lvl1pPr lvl="0">
               <a:spcBef>
@@ -3351,19 +3033,15 @@
               <a:defRPr/>
             </a:lvl9pPr>
           </a:lstStyle>
-          <a:p>
-            <a:endParaRPr/>
-          </a:p>
+          <a:p/>
         </p:txBody>
       </p:sp>
       <p:sp>
         <p:nvSpPr>
           <p:cNvPr id="26" name="Google Shape;26;p4"/>
-          <p:cNvSpPr txBox="1">
-            <a:spLocks noGrp="1"/>
-          </p:cNvSpPr>
+          <p:cNvSpPr txBox="1"/>
           <p:nvPr>
-            <p:ph type="body" idx="1"/>
+            <p:ph idx="1" type="body"/>
           </p:nvPr>
         </p:nvSpPr>
         <p:spPr>
@@ -3376,9 +3054,9 @@
           </a:prstGeom>
         </p:spPr>
         <p:txBody>
-          <a:bodyPr spcFirstLastPara="1" wrap="square" lIns="91425" tIns="91425" rIns="91425" bIns="91425" anchor="t" anchorCtr="0"/>
+          <a:bodyPr anchorCtr="0" anchor="t" bIns="91425" lIns="91425" spcFirstLastPara="1" rIns="91425" wrap="square" tIns="91425"/>
           <a:lstStyle>
-            <a:lvl1pPr marL="457200" lvl="0" indent="-342900">
+            <a:lvl1pPr indent="-342900" lvl="0" marL="457200">
               <a:spcBef>
                 <a:spcPts val="0"/>
               </a:spcBef>
@@ -3389,7 +3067,7 @@
               <a:buChar char="●"/>
               <a:defRPr/>
             </a:lvl1pPr>
-            <a:lvl2pPr marL="914400" lvl="1" indent="-317500">
+            <a:lvl2pPr indent="-317500" lvl="1" marL="914400">
               <a:spcBef>
                 <a:spcPts val="1600"/>
               </a:spcBef>
@@ -3400,7 +3078,7 @@
               <a:buChar char="○"/>
               <a:defRPr/>
             </a:lvl2pPr>
-            <a:lvl3pPr marL="1371600" lvl="2" indent="-317500">
+            <a:lvl3pPr indent="-317500" lvl="2" marL="1371600">
               <a:spcBef>
                 <a:spcPts val="1600"/>
               </a:spcBef>
@@ -3411,7 +3089,7 @@
               <a:buChar char="■"/>
               <a:defRPr/>
             </a:lvl3pPr>
-            <a:lvl4pPr marL="1828800" lvl="3" indent="-317500">
+            <a:lvl4pPr indent="-317500" lvl="3" marL="1828800">
               <a:spcBef>
                 <a:spcPts val="1600"/>
               </a:spcBef>
@@ -3422,7 +3100,7 @@
               <a:buChar char="●"/>
               <a:defRPr/>
             </a:lvl4pPr>
-            <a:lvl5pPr marL="2286000" lvl="4" indent="-317500">
+            <a:lvl5pPr indent="-317500" lvl="4" marL="2286000">
               <a:spcBef>
                 <a:spcPts val="1600"/>
               </a:spcBef>
@@ -3433,7 +3111,7 @@
               <a:buChar char="○"/>
               <a:defRPr/>
             </a:lvl5pPr>
-            <a:lvl6pPr marL="2743200" lvl="5" indent="-317500">
+            <a:lvl6pPr indent="-317500" lvl="5" marL="2743200">
               <a:spcBef>
                 <a:spcPts val="1600"/>
               </a:spcBef>
@@ -3444,7 +3122,7 @@
               <a:buChar char="■"/>
               <a:defRPr/>
             </a:lvl6pPr>
-            <a:lvl7pPr marL="3200400" lvl="6" indent="-317500">
+            <a:lvl7pPr indent="-317500" lvl="6" marL="3200400">
               <a:spcBef>
                 <a:spcPts val="1600"/>
               </a:spcBef>
@@ -3455,7 +3133,7 @@
               <a:buChar char="●"/>
               <a:defRPr/>
             </a:lvl7pPr>
-            <a:lvl8pPr marL="3657600" lvl="7" indent="-317500">
+            <a:lvl8pPr indent="-317500" lvl="7" marL="3657600">
               <a:spcBef>
                 <a:spcPts val="1600"/>
               </a:spcBef>
@@ -3466,7 +3144,7 @@
               <a:buChar char="○"/>
               <a:defRPr/>
             </a:lvl8pPr>
-            <a:lvl9pPr marL="4114800" lvl="8" indent="-317500">
+            <a:lvl9pPr indent="-317500" lvl="8" marL="4114800">
               <a:spcBef>
                 <a:spcPts val="1600"/>
               </a:spcBef>
@@ -3478,19 +3156,15 @@
               <a:defRPr/>
             </a:lvl9pPr>
           </a:lstStyle>
-          <a:p>
-            <a:endParaRPr/>
-          </a:p>
+          <a:p/>
         </p:txBody>
       </p:sp>
       <p:sp>
         <p:nvSpPr>
           <p:cNvPr id="27" name="Google Shape;27;p4"/>
-          <p:cNvSpPr txBox="1">
-            <a:spLocks noGrp="1"/>
-          </p:cNvSpPr>
+          <p:cNvSpPr txBox="1"/>
           <p:nvPr>
-            <p:ph type="sldNum" idx="12"/>
+            <p:ph idx="12" type="sldNum"/>
           </p:nvPr>
         </p:nvSpPr>
         <p:spPr>
@@ -3503,7 +3177,7 @@
           </a:prstGeom>
         </p:spPr>
         <p:txBody>
-          <a:bodyPr spcFirstLastPara="1" wrap="square" lIns="91425" tIns="91425" rIns="91425" bIns="91425" anchor="ctr" anchorCtr="0">
+          <a:bodyPr anchorCtr="0" anchor="ctr" bIns="91425" lIns="91425" spcFirstLastPara="1" rIns="91425" wrap="square" tIns="91425">
             <a:noAutofit/>
           </a:bodyPr>
           <a:lstStyle>
@@ -3545,7 +3219,7 @@
             </a:lvl9pPr>
           </a:lstStyle>
           <a:p>
-            <a:pPr marL="0" lvl="0" indent="0" algn="r" rtl="0">
+            <a:pPr indent="0" lvl="0" marL="0" rtl="0" algn="r">
               <a:spcBef>
                 <a:spcPts val="0"/>
               </a:spcBef>
@@ -3571,11 +3245,11 @@
 </file>
 
 <file path=ppt/slideLayouts/slideLayout4.xml><?xml version="1.0" encoding="utf-8"?>
-<p:sldLayout xmlns:a="http://schemas.openxmlformats.org/drawingml/2006/main" xmlns:r="http://schemas.openxmlformats.org/officeDocument/2006/relationships" xmlns:p="http://schemas.openxmlformats.org/presentationml/2006/main" matchingName="Title and two columns" type="twoColTx">
+<p:sldLayout xmlns:a="http://schemas.openxmlformats.org/drawingml/2006/main" xmlns:r="http://schemas.openxmlformats.org/officeDocument/2006/relationships" xmlns:mc="http://schemas.openxmlformats.org/markup-compatibility/2006" xmlns:mv="urn:schemas-microsoft-com:mac:vml" xmlns:p="http://schemas.openxmlformats.org/presentationml/2006/main" xmlns:c="http://schemas.openxmlformats.org/drawingml/2006/chart" xmlns:dgm="http://schemas.openxmlformats.org/drawingml/2006/diagram" xmlns:o="urn:schemas-microsoft-com:office:office" xmlns:v="urn:schemas-microsoft-com:vml" xmlns:pvml="urn:schemas-microsoft-com:office:powerpoint" xmlns:com="http://schemas.openxmlformats.org/drawingml/2006/compatibility" xmlns:p14="http://schemas.microsoft.com/office/powerpoint/2010/main" xmlns:p15="http://schemas.microsoft.com/office/powerpoint/2012/main" matchingName="Title and two columns" type="twoColTx">
   <p:cSld name="TITLE_AND_TWO_COLUMNS">
     <p:spTree>
       <p:nvGrpSpPr>
-        <p:cNvPr id="1" name="Shape 28"/>
+        <p:cNvPr id="28" name="Shape 28"/>
         <p:cNvGrpSpPr/>
         <p:nvPr/>
       </p:nvGrpSpPr>
@@ -3602,14 +3276,14 @@
             <a:avLst/>
           </a:prstGeom>
           <a:noFill/>
-          <a:ln w="38100" cap="flat" cmpd="sng">
+          <a:ln cap="flat" cmpd="sng" w="38100">
             <a:solidFill>
               <a:schemeClr val="dk2"/>
             </a:solidFill>
             <a:prstDash val="solid"/>
             <a:round/>
-            <a:headEnd type="none" w="sm" len="sm"/>
-            <a:tailEnd type="none" w="sm" len="sm"/>
+            <a:headEnd len="sm" w="sm" type="none"/>
+            <a:tailEnd len="sm" w="sm" type="none"/>
           </a:ln>
         </p:spPr>
       </p:cxnSp>
@@ -3628,14 +3302,14 @@
             <a:avLst/>
           </a:prstGeom>
           <a:noFill/>
-          <a:ln w="19050" cap="flat" cmpd="sng">
+          <a:ln cap="flat" cmpd="sng" w="19050">
             <a:solidFill>
               <a:schemeClr val="dk2"/>
             </a:solidFill>
             <a:prstDash val="solid"/>
             <a:round/>
-            <a:headEnd type="none" w="sm" len="sm"/>
-            <a:tailEnd type="none" w="sm" len="sm"/>
+            <a:headEnd len="sm" w="sm" type="none"/>
+            <a:tailEnd len="sm" w="sm" type="none"/>
           </a:ln>
         </p:spPr>
       </p:cxnSp>
@@ -3654,23 +3328,21 @@
             <a:avLst/>
           </a:prstGeom>
           <a:noFill/>
-          <a:ln w="19050" cap="flat" cmpd="sng">
+          <a:ln cap="flat" cmpd="sng" w="19050">
             <a:solidFill>
               <a:schemeClr val="dk2"/>
             </a:solidFill>
             <a:prstDash val="solid"/>
             <a:round/>
-            <a:headEnd type="none" w="sm" len="sm"/>
-            <a:tailEnd type="none" w="sm" len="sm"/>
+            <a:headEnd len="sm" w="sm" type="none"/>
+            <a:tailEnd len="sm" w="sm" type="none"/>
           </a:ln>
         </p:spPr>
       </p:cxnSp>
       <p:sp>
         <p:nvSpPr>
           <p:cNvPr id="32" name="Google Shape;32;p5"/>
-          <p:cNvSpPr txBox="1">
-            <a:spLocks noGrp="1"/>
-          </p:cNvSpPr>
+          <p:cNvSpPr txBox="1"/>
           <p:nvPr>
             <p:ph type="title"/>
           </p:nvPr>
@@ -3685,7 +3357,7 @@
           </a:prstGeom>
         </p:spPr>
         <p:txBody>
-          <a:bodyPr spcFirstLastPara="1" wrap="square" lIns="91425" tIns="91425" rIns="91425" bIns="91425" anchor="t" anchorCtr="0"/>
+          <a:bodyPr anchorCtr="0" anchor="t" bIns="91425" lIns="91425" spcFirstLastPara="1" rIns="91425" wrap="square" tIns="91425"/>
           <a:lstStyle>
             <a:lvl1pPr lvl="0">
               <a:spcBef>
@@ -3787,19 +3459,15 @@
               <a:defRPr/>
             </a:lvl9pPr>
           </a:lstStyle>
-          <a:p>
-            <a:endParaRPr/>
-          </a:p>
+          <a:p/>
         </p:txBody>
       </p:sp>
       <p:sp>
         <p:nvSpPr>
           <p:cNvPr id="33" name="Google Shape;33;p5"/>
-          <p:cNvSpPr txBox="1">
-            <a:spLocks noGrp="1"/>
-          </p:cNvSpPr>
+          <p:cNvSpPr txBox="1"/>
           <p:nvPr>
-            <p:ph type="body" idx="1"/>
+            <p:ph idx="1" type="body"/>
           </p:nvPr>
         </p:nvSpPr>
         <p:spPr>
@@ -3812,9 +3480,9 @@
           </a:prstGeom>
         </p:spPr>
         <p:txBody>
-          <a:bodyPr spcFirstLastPara="1" wrap="square" lIns="91425" tIns="91425" rIns="91425" bIns="91425" anchor="t" anchorCtr="0"/>
+          <a:bodyPr anchorCtr="0" anchor="t" bIns="91425" lIns="91425" spcFirstLastPara="1" rIns="91425" wrap="square" tIns="91425"/>
           <a:lstStyle>
-            <a:lvl1pPr marL="457200" lvl="0" indent="-317500">
+            <a:lvl1pPr indent="-317500" lvl="0" marL="457200">
               <a:spcBef>
                 <a:spcPts val="0"/>
               </a:spcBef>
@@ -3825,7 +3493,7 @@
               <a:buChar char="●"/>
               <a:defRPr sz="1400"/>
             </a:lvl1pPr>
-            <a:lvl2pPr marL="914400" lvl="1" indent="-304800">
+            <a:lvl2pPr indent="-304800" lvl="1" marL="914400">
               <a:spcBef>
                 <a:spcPts val="1600"/>
               </a:spcBef>
@@ -3836,7 +3504,7 @@
               <a:buChar char="○"/>
               <a:defRPr sz="1200"/>
             </a:lvl2pPr>
-            <a:lvl3pPr marL="1371600" lvl="2" indent="-304800">
+            <a:lvl3pPr indent="-304800" lvl="2" marL="1371600">
               <a:spcBef>
                 <a:spcPts val="1600"/>
               </a:spcBef>
@@ -3847,7 +3515,7 @@
               <a:buChar char="■"/>
               <a:defRPr sz="1200"/>
             </a:lvl3pPr>
-            <a:lvl4pPr marL="1828800" lvl="3" indent="-304800">
+            <a:lvl4pPr indent="-304800" lvl="3" marL="1828800">
               <a:spcBef>
                 <a:spcPts val="1600"/>
               </a:spcBef>
@@ -3858,7 +3526,7 @@
               <a:buChar char="●"/>
               <a:defRPr sz="1200"/>
             </a:lvl4pPr>
-            <a:lvl5pPr marL="2286000" lvl="4" indent="-304800">
+            <a:lvl5pPr indent="-304800" lvl="4" marL="2286000">
               <a:spcBef>
                 <a:spcPts val="1600"/>
               </a:spcBef>
@@ -3869,7 +3537,7 @@
               <a:buChar char="○"/>
               <a:defRPr sz="1200"/>
             </a:lvl5pPr>
-            <a:lvl6pPr marL="2743200" lvl="5" indent="-304800">
+            <a:lvl6pPr indent="-304800" lvl="5" marL="2743200">
               <a:spcBef>
                 <a:spcPts val="1600"/>
               </a:spcBef>
@@ -3880,7 +3548,7 @@
               <a:buChar char="■"/>
               <a:defRPr sz="1200"/>
             </a:lvl6pPr>
-            <a:lvl7pPr marL="3200400" lvl="6" indent="-304800">
+            <a:lvl7pPr indent="-304800" lvl="6" marL="3200400">
               <a:spcBef>
                 <a:spcPts val="1600"/>
               </a:spcBef>
@@ -3891,7 +3559,7 @@
               <a:buChar char="●"/>
               <a:defRPr sz="1200"/>
             </a:lvl7pPr>
-            <a:lvl8pPr marL="3657600" lvl="7" indent="-304800">
+            <a:lvl8pPr indent="-304800" lvl="7" marL="3657600">
               <a:spcBef>
                 <a:spcPts val="1600"/>
               </a:spcBef>
@@ -3902,7 +3570,7 @@
               <a:buChar char="○"/>
               <a:defRPr sz="1200"/>
             </a:lvl8pPr>
-            <a:lvl9pPr marL="4114800" lvl="8" indent="-304800">
+            <a:lvl9pPr indent="-304800" lvl="8" marL="4114800">
               <a:spcBef>
                 <a:spcPts val="1600"/>
               </a:spcBef>
@@ -3914,19 +3582,15 @@
               <a:defRPr sz="1200"/>
             </a:lvl9pPr>
           </a:lstStyle>
-          <a:p>
-            <a:endParaRPr/>
-          </a:p>
+          <a:p/>
         </p:txBody>
       </p:sp>
       <p:sp>
         <p:nvSpPr>
           <p:cNvPr id="34" name="Google Shape;34;p5"/>
-          <p:cNvSpPr txBox="1">
-            <a:spLocks noGrp="1"/>
-          </p:cNvSpPr>
+          <p:cNvSpPr txBox="1"/>
           <p:nvPr>
-            <p:ph type="body" idx="2"/>
+            <p:ph idx="2" type="body"/>
           </p:nvPr>
         </p:nvSpPr>
         <p:spPr>
@@ -3939,9 +3603,9 @@
           </a:prstGeom>
         </p:spPr>
         <p:txBody>
-          <a:bodyPr spcFirstLastPara="1" wrap="square" lIns="91425" tIns="91425" rIns="91425" bIns="91425" anchor="t" anchorCtr="0"/>
+          <a:bodyPr anchorCtr="0" anchor="t" bIns="91425" lIns="91425" spcFirstLastPara="1" rIns="91425" wrap="square" tIns="91425"/>
           <a:lstStyle>
-            <a:lvl1pPr marL="457200" lvl="0" indent="-317500">
+            <a:lvl1pPr indent="-317500" lvl="0" marL="457200">
               <a:spcBef>
                 <a:spcPts val="0"/>
               </a:spcBef>
@@ -3952,7 +3616,7 @@
               <a:buChar char="●"/>
               <a:defRPr sz="1400"/>
             </a:lvl1pPr>
-            <a:lvl2pPr marL="914400" lvl="1" indent="-304800">
+            <a:lvl2pPr indent="-304800" lvl="1" marL="914400">
               <a:spcBef>
                 <a:spcPts val="1600"/>
               </a:spcBef>
@@ -3963,7 +3627,7 @@
               <a:buChar char="○"/>
               <a:defRPr sz="1200"/>
             </a:lvl2pPr>
-            <a:lvl3pPr marL="1371600" lvl="2" indent="-304800">
+            <a:lvl3pPr indent="-304800" lvl="2" marL="1371600">
               <a:spcBef>
                 <a:spcPts val="1600"/>
               </a:spcBef>
@@ -3974,7 +3638,7 @@
               <a:buChar char="■"/>
               <a:defRPr sz="1200"/>
             </a:lvl3pPr>
-            <a:lvl4pPr marL="1828800" lvl="3" indent="-304800">
+            <a:lvl4pPr indent="-304800" lvl="3" marL="1828800">
               <a:spcBef>
                 <a:spcPts val="1600"/>
               </a:spcBef>
@@ -3985,7 +3649,7 @@
               <a:buChar char="●"/>
               <a:defRPr sz="1200"/>
             </a:lvl4pPr>
-            <a:lvl5pPr marL="2286000" lvl="4" indent="-304800">
+            <a:lvl5pPr indent="-304800" lvl="4" marL="2286000">
               <a:spcBef>
                 <a:spcPts val="1600"/>
               </a:spcBef>
@@ -3996,7 +3660,7 @@
               <a:buChar char="○"/>
               <a:defRPr sz="1200"/>
             </a:lvl5pPr>
-            <a:lvl6pPr marL="2743200" lvl="5" indent="-304800">
+            <a:lvl6pPr indent="-304800" lvl="5" marL="2743200">
               <a:spcBef>
                 <a:spcPts val="1600"/>
               </a:spcBef>
@@ -4007,7 +3671,7 @@
               <a:buChar char="■"/>
               <a:defRPr sz="1200"/>
             </a:lvl6pPr>
-            <a:lvl7pPr marL="3200400" lvl="6" indent="-304800">
+            <a:lvl7pPr indent="-304800" lvl="6" marL="3200400">
               <a:spcBef>
                 <a:spcPts val="1600"/>
               </a:spcBef>
@@ -4018,7 +3682,7 @@
               <a:buChar char="●"/>
               <a:defRPr sz="1200"/>
             </a:lvl7pPr>
-            <a:lvl8pPr marL="3657600" lvl="7" indent="-304800">
+            <a:lvl8pPr indent="-304800" lvl="7" marL="3657600">
               <a:spcBef>
                 <a:spcPts val="1600"/>
               </a:spcBef>
@@ -4029,7 +3693,7 @@
               <a:buChar char="○"/>
               <a:defRPr sz="1200"/>
             </a:lvl8pPr>
-            <a:lvl9pPr marL="4114800" lvl="8" indent="-304800">
+            <a:lvl9pPr indent="-304800" lvl="8" marL="4114800">
               <a:spcBef>
                 <a:spcPts val="1600"/>
               </a:spcBef>
@@ -4041,19 +3705,15 @@
               <a:defRPr sz="1200"/>
             </a:lvl9pPr>
           </a:lstStyle>
-          <a:p>
-            <a:endParaRPr/>
-          </a:p>
+          <a:p/>
         </p:txBody>
       </p:sp>
       <p:sp>
         <p:nvSpPr>
           <p:cNvPr id="35" name="Google Shape;35;p5"/>
-          <p:cNvSpPr txBox="1">
-            <a:spLocks noGrp="1"/>
-          </p:cNvSpPr>
+          <p:cNvSpPr txBox="1"/>
           <p:nvPr>
-            <p:ph type="sldNum" idx="12"/>
+            <p:ph idx="12" type="sldNum"/>
           </p:nvPr>
         </p:nvSpPr>
         <p:spPr>
@@ -4066,7 +3726,7 @@
           </a:prstGeom>
         </p:spPr>
         <p:txBody>
-          <a:bodyPr spcFirstLastPara="1" wrap="square" lIns="91425" tIns="91425" rIns="91425" bIns="91425" anchor="ctr" anchorCtr="0">
+          <a:bodyPr anchorCtr="0" anchor="ctr" bIns="91425" lIns="91425" spcFirstLastPara="1" rIns="91425" wrap="square" tIns="91425">
             <a:noAutofit/>
           </a:bodyPr>
           <a:lstStyle>
@@ -4108,7 +3768,7 @@
             </a:lvl9pPr>
           </a:lstStyle>
           <a:p>
-            <a:pPr marL="0" lvl="0" indent="0" algn="r" rtl="0">
+            <a:pPr indent="0" lvl="0" marL="0" rtl="0" algn="r">
               <a:spcBef>
                 <a:spcPts val="0"/>
               </a:spcBef>
@@ -4134,11 +3794,11 @@
 </file>
 
 <file path=ppt/slideLayouts/slideLayout5.xml><?xml version="1.0" encoding="utf-8"?>
-<p:sldLayout xmlns:a="http://schemas.openxmlformats.org/drawingml/2006/main" xmlns:r="http://schemas.openxmlformats.org/officeDocument/2006/relationships" xmlns:p="http://schemas.openxmlformats.org/presentationml/2006/main" matchingName="Title only" type="titleOnly">
+<p:sldLayout xmlns:a="http://schemas.openxmlformats.org/drawingml/2006/main" xmlns:r="http://schemas.openxmlformats.org/officeDocument/2006/relationships" xmlns:mc="http://schemas.openxmlformats.org/markup-compatibility/2006" xmlns:mv="urn:schemas-microsoft-com:mac:vml" xmlns:p="http://schemas.openxmlformats.org/presentationml/2006/main" xmlns:c="http://schemas.openxmlformats.org/drawingml/2006/chart" xmlns:dgm="http://schemas.openxmlformats.org/drawingml/2006/diagram" xmlns:o="urn:schemas-microsoft-com:office:office" xmlns:v="urn:schemas-microsoft-com:vml" xmlns:pvml="urn:schemas-microsoft-com:office:powerpoint" xmlns:com="http://schemas.openxmlformats.org/drawingml/2006/compatibility" xmlns:p14="http://schemas.microsoft.com/office/powerpoint/2010/main" xmlns:p15="http://schemas.microsoft.com/office/powerpoint/2012/main" matchingName="Title only" type="titleOnly">
   <p:cSld name="TITLE_ONLY">
     <p:spTree>
       <p:nvGrpSpPr>
-        <p:cNvPr id="1" name="Shape 36"/>
+        <p:cNvPr id="36" name="Shape 36"/>
         <p:cNvGrpSpPr/>
         <p:nvPr/>
       </p:nvGrpSpPr>
@@ -4153,9 +3813,7 @@
       <p:sp>
         <p:nvSpPr>
           <p:cNvPr id="37" name="Google Shape;37;p6"/>
-          <p:cNvSpPr txBox="1">
-            <a:spLocks noGrp="1"/>
-          </p:cNvSpPr>
+          <p:cNvSpPr txBox="1"/>
           <p:nvPr>
             <p:ph type="title"/>
           </p:nvPr>
@@ -4170,7 +3828,7 @@
           </a:prstGeom>
         </p:spPr>
         <p:txBody>
-          <a:bodyPr spcFirstLastPara="1" wrap="square" lIns="91425" tIns="91425" rIns="91425" bIns="91425" anchor="t" anchorCtr="0"/>
+          <a:bodyPr anchorCtr="0" anchor="t" bIns="91425" lIns="91425" spcFirstLastPara="1" rIns="91425" wrap="square" tIns="91425"/>
           <a:lstStyle>
             <a:lvl1pPr lvl="0">
               <a:spcBef>
@@ -4272,19 +3930,15 @@
               <a:defRPr/>
             </a:lvl9pPr>
           </a:lstStyle>
-          <a:p>
-            <a:endParaRPr/>
-          </a:p>
+          <a:p/>
         </p:txBody>
       </p:sp>
       <p:sp>
         <p:nvSpPr>
           <p:cNvPr id="38" name="Google Shape;38;p6"/>
-          <p:cNvSpPr txBox="1">
-            <a:spLocks noGrp="1"/>
-          </p:cNvSpPr>
+          <p:cNvSpPr txBox="1"/>
           <p:nvPr>
-            <p:ph type="sldNum" idx="12"/>
+            <p:ph idx="12" type="sldNum"/>
           </p:nvPr>
         </p:nvSpPr>
         <p:spPr>
@@ -4297,7 +3951,7 @@
           </a:prstGeom>
         </p:spPr>
         <p:txBody>
-          <a:bodyPr spcFirstLastPara="1" wrap="square" lIns="91425" tIns="91425" rIns="91425" bIns="91425" anchor="ctr" anchorCtr="0">
+          <a:bodyPr anchorCtr="0" anchor="ctr" bIns="91425" lIns="91425" spcFirstLastPara="1" rIns="91425" wrap="square" tIns="91425">
             <a:noAutofit/>
           </a:bodyPr>
           <a:lstStyle>
@@ -4339,7 +3993,7 @@
             </a:lvl9pPr>
           </a:lstStyle>
           <a:p>
-            <a:pPr marL="0" lvl="0" indent="0" algn="r" rtl="0">
+            <a:pPr indent="0" lvl="0" marL="0" rtl="0" algn="r">
               <a:spcBef>
                 <a:spcPts val="0"/>
               </a:spcBef>
@@ -4365,11 +4019,11 @@
 </file>
 
 <file path=ppt/slideLayouts/slideLayout6.xml><?xml version="1.0" encoding="utf-8"?>
-<p:sldLayout xmlns:a="http://schemas.openxmlformats.org/drawingml/2006/main" xmlns:r="http://schemas.openxmlformats.org/officeDocument/2006/relationships" xmlns:p="http://schemas.openxmlformats.org/presentationml/2006/main" matchingName="One column text">
+<p:sldLayout xmlns:a="http://schemas.openxmlformats.org/drawingml/2006/main" xmlns:r="http://schemas.openxmlformats.org/officeDocument/2006/relationships" xmlns:mc="http://schemas.openxmlformats.org/markup-compatibility/2006" xmlns:mv="urn:schemas-microsoft-com:mac:vml" xmlns:p="http://schemas.openxmlformats.org/presentationml/2006/main" xmlns:c="http://schemas.openxmlformats.org/drawingml/2006/chart" xmlns:dgm="http://schemas.openxmlformats.org/drawingml/2006/diagram" xmlns:o="urn:schemas-microsoft-com:office:office" xmlns:v="urn:schemas-microsoft-com:vml" xmlns:pvml="urn:schemas-microsoft-com:office:powerpoint" xmlns:com="http://schemas.openxmlformats.org/drawingml/2006/compatibility" xmlns:p14="http://schemas.microsoft.com/office/powerpoint/2010/main" xmlns:p15="http://schemas.microsoft.com/office/powerpoint/2012/main" matchingName="One column text">
   <p:cSld name="ONE_COLUMN_TEXT">
     <p:spTree>
       <p:nvGrpSpPr>
-        <p:cNvPr id="1" name="Shape 39"/>
+        <p:cNvPr id="39" name="Shape 39"/>
         <p:cNvGrpSpPr/>
         <p:nvPr/>
       </p:nvGrpSpPr>
@@ -4396,23 +4050,21 @@
             <a:avLst/>
           </a:prstGeom>
           <a:noFill/>
-          <a:ln w="19050" cap="flat" cmpd="sng">
+          <a:ln cap="flat" cmpd="sng" w="19050">
             <a:solidFill>
               <a:schemeClr val="dk2"/>
             </a:solidFill>
             <a:prstDash val="solid"/>
             <a:round/>
-            <a:headEnd type="none" w="sm" len="sm"/>
-            <a:tailEnd type="none" w="sm" len="sm"/>
+            <a:headEnd len="sm" w="sm" type="none"/>
+            <a:tailEnd len="sm" w="sm" type="none"/>
           </a:ln>
         </p:spPr>
       </p:cxnSp>
       <p:sp>
         <p:nvSpPr>
           <p:cNvPr id="41" name="Google Shape;41;p7"/>
-          <p:cNvSpPr txBox="1">
-            <a:spLocks noGrp="1"/>
-          </p:cNvSpPr>
+          <p:cNvSpPr txBox="1"/>
           <p:nvPr>
             <p:ph type="title"/>
           </p:nvPr>
@@ -4427,7 +4079,7 @@
           </a:prstGeom>
         </p:spPr>
         <p:txBody>
-          <a:bodyPr spcFirstLastPara="1" wrap="square" lIns="91425" tIns="91425" rIns="91425" bIns="91425" anchor="b" anchorCtr="0"/>
+          <a:bodyPr anchorCtr="0" anchor="b" bIns="91425" lIns="91425" spcFirstLastPara="1" rIns="91425" wrap="square" tIns="91425"/>
           <a:lstStyle>
             <a:lvl1pPr lvl="0">
               <a:spcBef>
@@ -4529,19 +4181,15 @@
               <a:defRPr sz="2400"/>
             </a:lvl9pPr>
           </a:lstStyle>
-          <a:p>
-            <a:endParaRPr/>
-          </a:p>
+          <a:p/>
         </p:txBody>
       </p:sp>
       <p:sp>
         <p:nvSpPr>
           <p:cNvPr id="42" name="Google Shape;42;p7"/>
-          <p:cNvSpPr txBox="1">
-            <a:spLocks noGrp="1"/>
-          </p:cNvSpPr>
+          <p:cNvSpPr txBox="1"/>
           <p:nvPr>
-            <p:ph type="body" idx="1"/>
+            <p:ph idx="1" type="body"/>
           </p:nvPr>
         </p:nvSpPr>
         <p:spPr>
@@ -4554,9 +4202,9 @@
           </a:prstGeom>
         </p:spPr>
         <p:txBody>
-          <a:bodyPr spcFirstLastPara="1" wrap="square" lIns="91425" tIns="91425" rIns="91425" bIns="91425" anchor="t" anchorCtr="0"/>
+          <a:bodyPr anchorCtr="0" anchor="t" bIns="91425" lIns="91425" spcFirstLastPara="1" rIns="91425" wrap="square" tIns="91425"/>
           <a:lstStyle>
-            <a:lvl1pPr marL="457200" lvl="0" indent="-304800">
+            <a:lvl1pPr indent="-304800" lvl="0" marL="457200">
               <a:spcBef>
                 <a:spcPts val="0"/>
               </a:spcBef>
@@ -4567,7 +4215,7 @@
               <a:buChar char="●"/>
               <a:defRPr sz="1200"/>
             </a:lvl1pPr>
-            <a:lvl2pPr marL="914400" lvl="1" indent="-304800">
+            <a:lvl2pPr indent="-304800" lvl="1" marL="914400">
               <a:spcBef>
                 <a:spcPts val="1600"/>
               </a:spcBef>
@@ -4578,7 +4226,7 @@
               <a:buChar char="○"/>
               <a:defRPr sz="1200"/>
             </a:lvl2pPr>
-            <a:lvl3pPr marL="1371600" lvl="2" indent="-304800">
+            <a:lvl3pPr indent="-304800" lvl="2" marL="1371600">
               <a:spcBef>
                 <a:spcPts val="1600"/>
               </a:spcBef>
@@ -4589,7 +4237,7 @@
               <a:buChar char="■"/>
               <a:defRPr sz="1200"/>
             </a:lvl3pPr>
-            <a:lvl4pPr marL="1828800" lvl="3" indent="-304800">
+            <a:lvl4pPr indent="-304800" lvl="3" marL="1828800">
               <a:spcBef>
                 <a:spcPts val="1600"/>
               </a:spcBef>
@@ -4600,7 +4248,7 @@
               <a:buChar char="●"/>
               <a:defRPr sz="1200"/>
             </a:lvl4pPr>
-            <a:lvl5pPr marL="2286000" lvl="4" indent="-304800">
+            <a:lvl5pPr indent="-304800" lvl="4" marL="2286000">
               <a:spcBef>
                 <a:spcPts val="1600"/>
               </a:spcBef>
@@ -4611,7 +4259,7 @@
               <a:buChar char="○"/>
               <a:defRPr sz="1200"/>
             </a:lvl5pPr>
-            <a:lvl6pPr marL="2743200" lvl="5" indent="-304800">
+            <a:lvl6pPr indent="-304800" lvl="5" marL="2743200">
               <a:spcBef>
                 <a:spcPts val="1600"/>
               </a:spcBef>
@@ -4622,7 +4270,7 @@
               <a:buChar char="■"/>
               <a:defRPr sz="1200"/>
             </a:lvl6pPr>
-            <a:lvl7pPr marL="3200400" lvl="6" indent="-304800">
+            <a:lvl7pPr indent="-304800" lvl="6" marL="3200400">
               <a:spcBef>
                 <a:spcPts val="1600"/>
               </a:spcBef>
@@ -4633,7 +4281,7 @@
               <a:buChar char="●"/>
               <a:defRPr sz="1200"/>
             </a:lvl7pPr>
-            <a:lvl8pPr marL="3657600" lvl="7" indent="-304800">
+            <a:lvl8pPr indent="-304800" lvl="7" marL="3657600">
               <a:spcBef>
                 <a:spcPts val="1600"/>
               </a:spcBef>
@@ -4644,7 +4292,7 @@
               <a:buChar char="○"/>
               <a:defRPr sz="1200"/>
             </a:lvl8pPr>
-            <a:lvl9pPr marL="4114800" lvl="8" indent="-304800">
+            <a:lvl9pPr indent="-304800" lvl="8" marL="4114800">
               <a:spcBef>
                 <a:spcPts val="1600"/>
               </a:spcBef>
@@ -4656,19 +4304,15 @@
               <a:defRPr sz="1200"/>
             </a:lvl9pPr>
           </a:lstStyle>
-          <a:p>
-            <a:endParaRPr/>
-          </a:p>
+          <a:p/>
         </p:txBody>
       </p:sp>
       <p:sp>
         <p:nvSpPr>
           <p:cNvPr id="43" name="Google Shape;43;p7"/>
-          <p:cNvSpPr txBox="1">
-            <a:spLocks noGrp="1"/>
-          </p:cNvSpPr>
+          <p:cNvSpPr txBox="1"/>
           <p:nvPr>
-            <p:ph type="sldNum" idx="12"/>
+            <p:ph idx="12" type="sldNum"/>
           </p:nvPr>
         </p:nvSpPr>
         <p:spPr>
@@ -4681,7 +4325,7 @@
           </a:prstGeom>
         </p:spPr>
         <p:txBody>
-          <a:bodyPr spcFirstLastPara="1" wrap="square" lIns="91425" tIns="91425" rIns="91425" bIns="91425" anchor="ctr" anchorCtr="0">
+          <a:bodyPr anchorCtr="0" anchor="ctr" bIns="91425" lIns="91425" spcFirstLastPara="1" rIns="91425" wrap="square" tIns="91425">
             <a:noAutofit/>
           </a:bodyPr>
           <a:lstStyle>
@@ -4723,7 +4367,7 @@
             </a:lvl9pPr>
           </a:lstStyle>
           <a:p>
-            <a:pPr marL="0" lvl="0" indent="0" algn="r" rtl="0">
+            <a:pPr indent="0" lvl="0" marL="0" rtl="0" algn="r">
               <a:spcBef>
                 <a:spcPts val="0"/>
               </a:spcBef>
@@ -4749,19 +4393,18 @@
 </file>
 
 <file path=ppt/slideLayouts/slideLayout7.xml><?xml version="1.0" encoding="utf-8"?>
-<p:sldLayout xmlns:a="http://schemas.openxmlformats.org/drawingml/2006/main" xmlns:r="http://schemas.openxmlformats.org/officeDocument/2006/relationships" xmlns:p="http://schemas.openxmlformats.org/presentationml/2006/main" matchingName="Main point">
+<p:sldLayout xmlns:a="http://schemas.openxmlformats.org/drawingml/2006/main" xmlns:r="http://schemas.openxmlformats.org/officeDocument/2006/relationships" xmlns:mc="http://schemas.openxmlformats.org/markup-compatibility/2006" xmlns:mv="urn:schemas-microsoft-com:mac:vml" xmlns:p="http://schemas.openxmlformats.org/presentationml/2006/main" xmlns:c="http://schemas.openxmlformats.org/drawingml/2006/chart" xmlns:dgm="http://schemas.openxmlformats.org/drawingml/2006/diagram" xmlns:o="urn:schemas-microsoft-com:office:office" xmlns:v="urn:schemas-microsoft-com:vml" xmlns:pvml="urn:schemas-microsoft-com:office:powerpoint" xmlns:com="http://schemas.openxmlformats.org/drawingml/2006/compatibility" xmlns:p14="http://schemas.microsoft.com/office/powerpoint/2010/main" xmlns:p15="http://schemas.microsoft.com/office/powerpoint/2012/main" matchingName="Main point">
   <p:cSld name="MAIN_POINT">
     <p:bg>
       <p:bgPr>
         <a:solidFill>
           <a:schemeClr val="lt2"/>
         </a:solidFill>
-        <a:effectLst/>
       </p:bgPr>
     </p:bg>
     <p:spTree>
       <p:nvGrpSpPr>
-        <p:cNvPr id="1" name="Shape 44"/>
+        <p:cNvPr id="44" name="Shape 44"/>
         <p:cNvGrpSpPr/>
         <p:nvPr/>
       </p:nvGrpSpPr>
@@ -4788,23 +4431,21 @@
             <a:avLst/>
           </a:prstGeom>
           <a:noFill/>
-          <a:ln w="19050" cap="flat" cmpd="sng">
+          <a:ln cap="flat" cmpd="sng" w="19050">
             <a:solidFill>
               <a:schemeClr val="lt1"/>
             </a:solidFill>
             <a:prstDash val="solid"/>
             <a:round/>
-            <a:headEnd type="none" w="sm" len="sm"/>
-            <a:tailEnd type="none" w="sm" len="sm"/>
+            <a:headEnd len="sm" w="sm" type="none"/>
+            <a:tailEnd len="sm" w="sm" type="none"/>
           </a:ln>
         </p:spPr>
       </p:cxnSp>
       <p:sp>
         <p:nvSpPr>
           <p:cNvPr id="46" name="Google Shape;46;p8"/>
-          <p:cNvSpPr txBox="1">
-            <a:spLocks noGrp="1"/>
-          </p:cNvSpPr>
+          <p:cNvSpPr txBox="1"/>
           <p:nvPr>
             <p:ph type="title"/>
           </p:nvPr>
@@ -4819,7 +4460,7 @@
           </a:prstGeom>
         </p:spPr>
         <p:txBody>
-          <a:bodyPr spcFirstLastPara="1" wrap="square" lIns="91425" tIns="91425" rIns="91425" bIns="91425" anchor="ctr" anchorCtr="0"/>
+          <a:bodyPr anchorCtr="0" anchor="ctr" bIns="91425" lIns="91425" spcFirstLastPara="1" rIns="91425" wrap="square" tIns="91425"/>
           <a:lstStyle>
             <a:lvl1pPr lvl="0">
               <a:spcBef>
@@ -4984,19 +4625,15 @@
               </a:defRPr>
             </a:lvl9pPr>
           </a:lstStyle>
-          <a:p>
-            <a:endParaRPr/>
-          </a:p>
+          <a:p/>
         </p:txBody>
       </p:sp>
       <p:sp>
         <p:nvSpPr>
           <p:cNvPr id="47" name="Google Shape;47;p8"/>
-          <p:cNvSpPr txBox="1">
-            <a:spLocks noGrp="1"/>
-          </p:cNvSpPr>
+          <p:cNvSpPr txBox="1"/>
           <p:nvPr>
-            <p:ph type="sldNum" idx="12"/>
+            <p:ph idx="12" type="sldNum"/>
           </p:nvPr>
         </p:nvSpPr>
         <p:spPr>
@@ -5009,7 +4646,7 @@
           </a:prstGeom>
         </p:spPr>
         <p:txBody>
-          <a:bodyPr spcFirstLastPara="1" wrap="square" lIns="91425" tIns="91425" rIns="91425" bIns="91425" anchor="ctr" anchorCtr="0">
+          <a:bodyPr anchorCtr="0" anchor="ctr" bIns="91425" lIns="91425" spcFirstLastPara="1" rIns="91425" wrap="square" tIns="91425">
             <a:noAutofit/>
           </a:bodyPr>
           <a:lstStyle>
@@ -5087,7 +4724,7 @@
             </a:lvl9pPr>
           </a:lstStyle>
           <a:p>
-            <a:pPr marL="0" lvl="0" indent="0" algn="r" rtl="0">
+            <a:pPr indent="0" lvl="0" marL="0" rtl="0" algn="r">
               <a:spcBef>
                 <a:spcPts val="0"/>
               </a:spcBef>
@@ -5113,11 +4750,11 @@
 </file>
 
 <file path=ppt/slideLayouts/slideLayout8.xml><?xml version="1.0" encoding="utf-8"?>
-<p:sldLayout xmlns:a="http://schemas.openxmlformats.org/drawingml/2006/main" xmlns:r="http://schemas.openxmlformats.org/officeDocument/2006/relationships" xmlns:p="http://schemas.openxmlformats.org/presentationml/2006/main" matchingName="Section title and description">
+<p:sldLayout xmlns:a="http://schemas.openxmlformats.org/drawingml/2006/main" xmlns:r="http://schemas.openxmlformats.org/officeDocument/2006/relationships" xmlns:mc="http://schemas.openxmlformats.org/markup-compatibility/2006" xmlns:mv="urn:schemas-microsoft-com:mac:vml" xmlns:p="http://schemas.openxmlformats.org/presentationml/2006/main" xmlns:c="http://schemas.openxmlformats.org/drawingml/2006/chart" xmlns:dgm="http://schemas.openxmlformats.org/drawingml/2006/diagram" xmlns:o="urn:schemas-microsoft-com:office:office" xmlns:v="urn:schemas-microsoft-com:vml" xmlns:pvml="urn:schemas-microsoft-com:office:powerpoint" xmlns:com="http://schemas.openxmlformats.org/drawingml/2006/compatibility" xmlns:p14="http://schemas.microsoft.com/office/powerpoint/2010/main" xmlns:p15="http://schemas.microsoft.com/office/powerpoint/2012/main" matchingName="Section title and description">
   <p:cSld name="SECTION_TITLE_AND_DESCRIPTION">
     <p:spTree>
       <p:nvGrpSpPr>
-        <p:cNvPr id="1" name="Shape 48"/>
+        <p:cNvPr id="48" name="Shape 48"/>
         <p:cNvGrpSpPr/>
         <p:nvPr/>
       </p:nvGrpSpPr>
@@ -5151,12 +4788,12 @@
           </a:ln>
         </p:spPr>
         <p:txBody>
-          <a:bodyPr spcFirstLastPara="1" wrap="square" lIns="91425" tIns="91425" rIns="91425" bIns="91425" anchor="ctr" anchorCtr="0">
+          <a:bodyPr anchorCtr="0" anchor="ctr" bIns="91425" lIns="91425" spcFirstLastPara="1" rIns="91425" wrap="square" tIns="91425">
             <a:noAutofit/>
           </a:bodyPr>
           <a:lstStyle/>
           <a:p>
-            <a:pPr marL="0" lvl="0" indent="0" algn="l" rtl="0">
+            <a:pPr indent="0" lvl="0" marL="0" rtl="0" algn="l">
               <a:spcBef>
                 <a:spcPts val="0"/>
               </a:spcBef>
@@ -5165,6 +4802,9 @@
               </a:spcAft>
               <a:buNone/>
             </a:pPr>
+            <a:r>
+              <a:t/>
+            </a:r>
             <a:endParaRPr/>
           </a:p>
         </p:txBody>
@@ -5184,23 +4824,21 @@
             <a:avLst/>
           </a:prstGeom>
           <a:noFill/>
-          <a:ln w="19050" cap="flat" cmpd="sng">
+          <a:ln cap="flat" cmpd="sng" w="19050">
             <a:solidFill>
               <a:schemeClr val="lt1"/>
             </a:solidFill>
             <a:prstDash val="solid"/>
             <a:round/>
-            <a:headEnd type="none" w="sm" len="sm"/>
-            <a:tailEnd type="none" w="sm" len="sm"/>
+            <a:headEnd len="sm" w="sm" type="none"/>
+            <a:tailEnd len="sm" w="sm" type="none"/>
           </a:ln>
         </p:spPr>
       </p:cxnSp>
       <p:sp>
         <p:nvSpPr>
           <p:cNvPr id="51" name="Google Shape;51;p9"/>
-          <p:cNvSpPr txBox="1">
-            <a:spLocks noGrp="1"/>
-          </p:cNvSpPr>
+          <p:cNvSpPr txBox="1"/>
           <p:nvPr>
             <p:ph type="title"/>
           </p:nvPr>
@@ -5215,7 +4853,7 @@
           </a:prstGeom>
         </p:spPr>
         <p:txBody>
-          <a:bodyPr spcFirstLastPara="1" wrap="square" lIns="91425" tIns="91425" rIns="91425" bIns="91425" anchor="b" anchorCtr="0"/>
+          <a:bodyPr anchorCtr="0" anchor="b" bIns="91425" lIns="91425" spcFirstLastPara="1" rIns="91425" wrap="square" tIns="91425"/>
           <a:lstStyle>
             <a:lvl1pPr lvl="0" algn="ctr">
               <a:spcBef>
@@ -5380,19 +5018,15 @@
               </a:defRPr>
             </a:lvl9pPr>
           </a:lstStyle>
-          <a:p>
-            <a:endParaRPr/>
-          </a:p>
+          <a:p/>
         </p:txBody>
       </p:sp>
       <p:sp>
         <p:nvSpPr>
           <p:cNvPr id="52" name="Google Shape;52;p9"/>
-          <p:cNvSpPr txBox="1">
-            <a:spLocks noGrp="1"/>
-          </p:cNvSpPr>
+          <p:cNvSpPr txBox="1"/>
           <p:nvPr>
-            <p:ph type="subTitle" idx="1"/>
+            <p:ph idx="1" type="subTitle"/>
           </p:nvPr>
         </p:nvSpPr>
         <p:spPr>
@@ -5405,7 +5039,7 @@
           </a:prstGeom>
         </p:spPr>
         <p:txBody>
-          <a:bodyPr spcFirstLastPara="1" wrap="square" lIns="91425" tIns="91425" rIns="91425" bIns="91425" anchor="t" anchorCtr="0"/>
+          <a:bodyPr anchorCtr="0" anchor="t" bIns="91425" lIns="91425" spcFirstLastPara="1" rIns="91425" wrap="square" tIns="91425"/>
           <a:lstStyle>
             <a:lvl1pPr lvl="0" algn="ctr">
               <a:lnSpc>
@@ -5534,19 +5168,15 @@
               <a:defRPr sz="2100"/>
             </a:lvl9pPr>
           </a:lstStyle>
-          <a:p>
-            <a:endParaRPr/>
-          </a:p>
+          <a:p/>
         </p:txBody>
       </p:sp>
       <p:sp>
         <p:nvSpPr>
           <p:cNvPr id="53" name="Google Shape;53;p9"/>
-          <p:cNvSpPr txBox="1">
-            <a:spLocks noGrp="1"/>
-          </p:cNvSpPr>
+          <p:cNvSpPr txBox="1"/>
           <p:nvPr>
-            <p:ph type="body" idx="2"/>
+            <p:ph idx="2" type="body"/>
           </p:nvPr>
         </p:nvSpPr>
         <p:spPr>
@@ -5559,9 +5189,9 @@
           </a:prstGeom>
         </p:spPr>
         <p:txBody>
-          <a:bodyPr spcFirstLastPara="1" wrap="square" lIns="91425" tIns="91425" rIns="91425" bIns="91425" anchor="ctr" anchorCtr="0"/>
+          <a:bodyPr anchorCtr="0" anchor="ctr" bIns="91425" lIns="91425" spcFirstLastPara="1" rIns="91425" wrap="square" tIns="91425"/>
           <a:lstStyle>
-            <a:lvl1pPr marL="457200" lvl="0" indent="-342900">
+            <a:lvl1pPr indent="-342900" lvl="0" marL="457200">
               <a:spcBef>
                 <a:spcPts val="0"/>
               </a:spcBef>
@@ -5579,7 +5209,7 @@
                 </a:solidFill>
               </a:defRPr>
             </a:lvl1pPr>
-            <a:lvl2pPr marL="914400" lvl="1" indent="-317500">
+            <a:lvl2pPr indent="-317500" lvl="1" marL="914400">
               <a:spcBef>
                 <a:spcPts val="1600"/>
               </a:spcBef>
@@ -5597,7 +5227,7 @@
                 </a:solidFill>
               </a:defRPr>
             </a:lvl2pPr>
-            <a:lvl3pPr marL="1371600" lvl="2" indent="-317500">
+            <a:lvl3pPr indent="-317500" lvl="2" marL="1371600">
               <a:spcBef>
                 <a:spcPts val="1600"/>
               </a:spcBef>
@@ -5615,7 +5245,7 @@
                 </a:solidFill>
               </a:defRPr>
             </a:lvl3pPr>
-            <a:lvl4pPr marL="1828800" lvl="3" indent="-317500">
+            <a:lvl4pPr indent="-317500" lvl="3" marL="1828800">
               <a:spcBef>
                 <a:spcPts val="1600"/>
               </a:spcBef>
@@ -5633,7 +5263,7 @@
                 </a:solidFill>
               </a:defRPr>
             </a:lvl4pPr>
-            <a:lvl5pPr marL="2286000" lvl="4" indent="-317500">
+            <a:lvl5pPr indent="-317500" lvl="4" marL="2286000">
               <a:spcBef>
                 <a:spcPts val="1600"/>
               </a:spcBef>
@@ -5651,7 +5281,7 @@
                 </a:solidFill>
               </a:defRPr>
             </a:lvl5pPr>
-            <a:lvl6pPr marL="2743200" lvl="5" indent="-317500">
+            <a:lvl6pPr indent="-317500" lvl="5" marL="2743200">
               <a:spcBef>
                 <a:spcPts val="1600"/>
               </a:spcBef>
@@ -5669,7 +5299,7 @@
                 </a:solidFill>
               </a:defRPr>
             </a:lvl6pPr>
-            <a:lvl7pPr marL="3200400" lvl="6" indent="-317500">
+            <a:lvl7pPr indent="-317500" lvl="6" marL="3200400">
               <a:spcBef>
                 <a:spcPts val="1600"/>
               </a:spcBef>
@@ -5687,7 +5317,7 @@
                 </a:solidFill>
               </a:defRPr>
             </a:lvl7pPr>
-            <a:lvl8pPr marL="3657600" lvl="7" indent="-317500">
+            <a:lvl8pPr indent="-317500" lvl="7" marL="3657600">
               <a:spcBef>
                 <a:spcPts val="1600"/>
               </a:spcBef>
@@ -5705,7 +5335,7 @@
                 </a:solidFill>
               </a:defRPr>
             </a:lvl8pPr>
-            <a:lvl9pPr marL="4114800" lvl="8" indent="-317500">
+            <a:lvl9pPr indent="-317500" lvl="8" marL="4114800">
               <a:spcBef>
                 <a:spcPts val="1600"/>
               </a:spcBef>
@@ -5724,19 +5354,15 @@
               </a:defRPr>
             </a:lvl9pPr>
           </a:lstStyle>
-          <a:p>
-            <a:endParaRPr/>
-          </a:p>
+          <a:p/>
         </p:txBody>
       </p:sp>
       <p:sp>
         <p:nvSpPr>
           <p:cNvPr id="54" name="Google Shape;54;p9"/>
-          <p:cNvSpPr txBox="1">
-            <a:spLocks noGrp="1"/>
-          </p:cNvSpPr>
+          <p:cNvSpPr txBox="1"/>
           <p:nvPr>
-            <p:ph type="sldNum" idx="12"/>
+            <p:ph idx="12" type="sldNum"/>
           </p:nvPr>
         </p:nvSpPr>
         <p:spPr>
@@ -5749,7 +5375,7 @@
           </a:prstGeom>
         </p:spPr>
         <p:txBody>
-          <a:bodyPr spcFirstLastPara="1" wrap="square" lIns="91425" tIns="91425" rIns="91425" bIns="91425" anchor="ctr" anchorCtr="0">
+          <a:bodyPr anchorCtr="0" anchor="ctr" bIns="91425" lIns="91425" spcFirstLastPara="1" rIns="91425" wrap="square" tIns="91425">
             <a:noAutofit/>
           </a:bodyPr>
           <a:lstStyle>
@@ -5827,7 +5453,7 @@
             </a:lvl9pPr>
           </a:lstStyle>
           <a:p>
-            <a:pPr marL="0" lvl="0" indent="0" algn="r" rtl="0">
+            <a:pPr indent="0" lvl="0" marL="0" rtl="0" algn="r">
               <a:spcBef>
                 <a:spcPts val="0"/>
               </a:spcBef>
@@ -5853,11 +5479,11 @@
 </file>
 
 <file path=ppt/slideLayouts/slideLayout9.xml><?xml version="1.0" encoding="utf-8"?>
-<p:sldLayout xmlns:a="http://schemas.openxmlformats.org/drawingml/2006/main" xmlns:r="http://schemas.openxmlformats.org/officeDocument/2006/relationships" xmlns:p="http://schemas.openxmlformats.org/presentationml/2006/main" matchingName="Caption">
+<p:sldLayout xmlns:a="http://schemas.openxmlformats.org/drawingml/2006/main" xmlns:r="http://schemas.openxmlformats.org/officeDocument/2006/relationships" xmlns:mc="http://schemas.openxmlformats.org/markup-compatibility/2006" xmlns:mv="urn:schemas-microsoft-com:mac:vml" xmlns:p="http://schemas.openxmlformats.org/presentationml/2006/main" xmlns:c="http://schemas.openxmlformats.org/drawingml/2006/chart" xmlns:dgm="http://schemas.openxmlformats.org/drawingml/2006/diagram" xmlns:o="urn:schemas-microsoft-com:office:office" xmlns:v="urn:schemas-microsoft-com:vml" xmlns:pvml="urn:schemas-microsoft-com:office:powerpoint" xmlns:com="http://schemas.openxmlformats.org/drawingml/2006/compatibility" xmlns:p14="http://schemas.microsoft.com/office/powerpoint/2010/main" xmlns:p15="http://schemas.microsoft.com/office/powerpoint/2012/main" matchingName="Caption">
   <p:cSld name="CAPTION_ONLY">
     <p:spTree>
       <p:nvGrpSpPr>
-        <p:cNvPr id="1" name="Shape 55"/>
+        <p:cNvPr id="55" name="Shape 55"/>
         <p:cNvGrpSpPr/>
         <p:nvPr/>
       </p:nvGrpSpPr>
@@ -5884,14 +5510,14 @@
             <a:avLst/>
           </a:prstGeom>
           <a:noFill/>
-          <a:ln w="19050" cap="flat" cmpd="sng">
+          <a:ln cap="flat" cmpd="sng" w="19050">
             <a:solidFill>
               <a:schemeClr val="dk2"/>
             </a:solidFill>
             <a:prstDash val="solid"/>
             <a:round/>
-            <a:headEnd type="none" w="sm" len="sm"/>
-            <a:tailEnd type="none" w="sm" len="sm"/>
+            <a:headEnd len="sm" w="sm" type="none"/>
+            <a:tailEnd len="sm" w="sm" type="none"/>
           </a:ln>
         </p:spPr>
       </p:cxnSp>
@@ -5910,25 +5536,23 @@
             <a:avLst/>
           </a:prstGeom>
           <a:noFill/>
-          <a:ln w="19050" cap="flat" cmpd="sng">
+          <a:ln cap="flat" cmpd="sng" w="19050">
             <a:solidFill>
               <a:schemeClr val="dk2"/>
             </a:solidFill>
             <a:prstDash val="solid"/>
             <a:round/>
-            <a:headEnd type="none" w="sm" len="sm"/>
-            <a:tailEnd type="none" w="sm" len="sm"/>
+            <a:headEnd len="sm" w="sm" type="none"/>
+            <a:tailEnd len="sm" w="sm" type="none"/>
           </a:ln>
         </p:spPr>
       </p:cxnSp>
       <p:sp>
         <p:nvSpPr>
           <p:cNvPr id="58" name="Google Shape;58;p10"/>
-          <p:cNvSpPr txBox="1">
-            <a:spLocks noGrp="1"/>
-          </p:cNvSpPr>
+          <p:cNvSpPr txBox="1"/>
           <p:nvPr>
-            <p:ph type="body" idx="1"/>
+            <p:ph idx="1" type="body"/>
           </p:nvPr>
         </p:nvSpPr>
         <p:spPr>
@@ -5941,9 +5565,9 @@
           </a:prstGeom>
         </p:spPr>
         <p:txBody>
-          <a:bodyPr spcFirstLastPara="1" wrap="square" lIns="91425" tIns="91425" rIns="91425" bIns="91425" anchor="ctr" anchorCtr="0"/>
+          <a:bodyPr anchorCtr="0" anchor="ctr" bIns="91425" lIns="91425" spcFirstLastPara="1" rIns="91425" wrap="square" tIns="91425"/>
           <a:lstStyle>
-            <a:lvl1pPr marL="457200" lvl="0" indent="-228600">
+            <a:lvl1pPr indent="-228600" lvl="0" marL="457200">
               <a:lnSpc>
                 <a:spcPct val="100000"/>
               </a:lnSpc>
@@ -5958,19 +5582,15 @@
               <a:defRPr/>
             </a:lvl1pPr>
           </a:lstStyle>
-          <a:p>
-            <a:endParaRPr/>
-          </a:p>
+          <a:p/>
         </p:txBody>
       </p:sp>
       <p:sp>
         <p:nvSpPr>
           <p:cNvPr id="59" name="Google Shape;59;p10"/>
-          <p:cNvSpPr txBox="1">
-            <a:spLocks noGrp="1"/>
-          </p:cNvSpPr>
+          <p:cNvSpPr txBox="1"/>
           <p:nvPr>
-            <p:ph type="sldNum" idx="12"/>
+            <p:ph idx="12" type="sldNum"/>
           </p:nvPr>
         </p:nvSpPr>
         <p:spPr>
@@ -5983,7 +5603,7 @@
           </a:prstGeom>
         </p:spPr>
         <p:txBody>
-          <a:bodyPr spcFirstLastPara="1" wrap="square" lIns="91425" tIns="91425" rIns="91425" bIns="91425" anchor="ctr" anchorCtr="0">
+          <a:bodyPr anchorCtr="0" anchor="ctr" bIns="91425" lIns="91425" spcFirstLastPara="1" rIns="91425" wrap="square" tIns="91425">
             <a:noAutofit/>
           </a:bodyPr>
           <a:lstStyle>
@@ -6025,7 +5645,7 @@
             </a:lvl9pPr>
           </a:lstStyle>
           <a:p>
-            <a:pPr marL="0" lvl="0" indent="0" algn="r" rtl="0">
+            <a:pPr indent="0" lvl="0" marL="0" rtl="0" algn="r">
               <a:spcBef>
                 <a:spcPts val="0"/>
               </a:spcBef>
@@ -6051,19 +5671,18 @@
 </file>
 
 <file path=ppt/slideMasters/slideMaster1.xml><?xml version="1.0" encoding="utf-8"?>
-<p:sldMaster xmlns:a="http://schemas.openxmlformats.org/drawingml/2006/main" xmlns:r="http://schemas.openxmlformats.org/officeDocument/2006/relationships" xmlns:p="http://schemas.openxmlformats.org/presentationml/2006/main">
+<p:sldMaster xmlns:a="http://schemas.openxmlformats.org/drawingml/2006/main" xmlns:r="http://schemas.openxmlformats.org/officeDocument/2006/relationships" xmlns:mc="http://schemas.openxmlformats.org/markup-compatibility/2006" xmlns:mv="urn:schemas-microsoft-com:mac:vml" xmlns:p="http://schemas.openxmlformats.org/presentationml/2006/main" xmlns:c="http://schemas.openxmlformats.org/drawingml/2006/chart" xmlns:dgm="http://schemas.openxmlformats.org/drawingml/2006/diagram" xmlns:o="urn:schemas-microsoft-com:office:office" xmlns:v="urn:schemas-microsoft-com:vml" xmlns:pvml="urn:schemas-microsoft-com:office:powerpoint" xmlns:com="http://schemas.openxmlformats.org/drawingml/2006/compatibility" xmlns:p14="http://schemas.microsoft.com/office/powerpoint/2010/main" xmlns:p15="http://schemas.microsoft.com/office/powerpoint/2012/main">
   <p:cSld name="swiss-2">
     <p:bg>
       <p:bgPr>
         <a:solidFill>
           <a:schemeClr val="lt1"/>
         </a:solidFill>
-        <a:effectLst/>
       </p:bgPr>
     </p:bg>
     <p:spTree>
       <p:nvGrpSpPr>
-        <p:cNvPr id="1" name="Shape 5"/>
+        <p:cNvPr id="5" name="Shape 5"/>
         <p:cNvGrpSpPr/>
         <p:nvPr/>
       </p:nvGrpSpPr>
@@ -6078,9 +5697,7 @@
       <p:sp>
         <p:nvSpPr>
           <p:cNvPr id="6" name="Google Shape;6;p1"/>
-          <p:cNvSpPr txBox="1">
-            <a:spLocks noGrp="1"/>
-          </p:cNvSpPr>
+          <p:cNvSpPr txBox="1"/>
           <p:nvPr>
             <p:ph type="title"/>
           </p:nvPr>
@@ -6099,7 +5716,7 @@
           </a:ln>
         </p:spPr>
         <p:txBody>
-          <a:bodyPr spcFirstLastPara="1" wrap="square" lIns="91425" tIns="91425" rIns="91425" bIns="91425" anchor="t" anchorCtr="0"/>
+          <a:bodyPr anchorCtr="0" anchor="t" bIns="91425" lIns="91425" spcFirstLastPara="1" rIns="91425" wrap="square" tIns="91425"/>
           <a:lstStyle>
             <a:lvl1pPr lvl="0">
               <a:spcBef>
@@ -6114,7 +5731,7 @@
               <a:buSzPts val="3000"/>
               <a:buFont typeface="Raleway"/>
               <a:buNone/>
-              <a:defRPr sz="3000" b="1">
+              <a:defRPr b="1" sz="3000">
                 <a:solidFill>
                   <a:schemeClr val="dk2"/>
                 </a:solidFill>
@@ -6137,7 +5754,7 @@
               <a:buSzPts val="3000"/>
               <a:buFont typeface="Raleway"/>
               <a:buNone/>
-              <a:defRPr sz="3000" b="1">
+              <a:defRPr b="1" sz="3000">
                 <a:solidFill>
                   <a:schemeClr val="dk2"/>
                 </a:solidFill>
@@ -6160,7 +5777,7 @@
               <a:buSzPts val="3000"/>
               <a:buFont typeface="Raleway"/>
               <a:buNone/>
-              <a:defRPr sz="3000" b="1">
+              <a:defRPr b="1" sz="3000">
                 <a:solidFill>
                   <a:schemeClr val="dk2"/>
                 </a:solidFill>
@@ -6183,7 +5800,7 @@
               <a:buSzPts val="3000"/>
               <a:buFont typeface="Raleway"/>
               <a:buNone/>
-              <a:defRPr sz="3000" b="1">
+              <a:defRPr b="1" sz="3000">
                 <a:solidFill>
                   <a:schemeClr val="dk2"/>
                 </a:solidFill>
@@ -6206,7 +5823,7 @@
               <a:buSzPts val="3000"/>
               <a:buFont typeface="Raleway"/>
               <a:buNone/>
-              <a:defRPr sz="3000" b="1">
+              <a:defRPr b="1" sz="3000">
                 <a:solidFill>
                   <a:schemeClr val="dk2"/>
                 </a:solidFill>
@@ -6229,7 +5846,7 @@
               <a:buSzPts val="3000"/>
               <a:buFont typeface="Raleway"/>
               <a:buNone/>
-              <a:defRPr sz="3000" b="1">
+              <a:defRPr b="1" sz="3000">
                 <a:solidFill>
                   <a:schemeClr val="dk2"/>
                 </a:solidFill>
@@ -6252,7 +5869,7 @@
               <a:buSzPts val="3000"/>
               <a:buFont typeface="Raleway"/>
               <a:buNone/>
-              <a:defRPr sz="3000" b="1">
+              <a:defRPr b="1" sz="3000">
                 <a:solidFill>
                   <a:schemeClr val="dk2"/>
                 </a:solidFill>
@@ -6275,7 +5892,7 @@
               <a:buSzPts val="3000"/>
               <a:buFont typeface="Raleway"/>
               <a:buNone/>
-              <a:defRPr sz="3000" b="1">
+              <a:defRPr b="1" sz="3000">
                 <a:solidFill>
                   <a:schemeClr val="dk2"/>
                 </a:solidFill>
@@ -6298,7 +5915,7 @@
               <a:buSzPts val="3000"/>
               <a:buFont typeface="Raleway"/>
               <a:buNone/>
-              <a:defRPr sz="3000" b="1">
+              <a:defRPr b="1" sz="3000">
                 <a:solidFill>
                   <a:schemeClr val="dk2"/>
                 </a:solidFill>
@@ -6309,19 +5926,15 @@
               </a:defRPr>
             </a:lvl9pPr>
           </a:lstStyle>
-          <a:p>
-            <a:endParaRPr/>
-          </a:p>
+          <a:p/>
         </p:txBody>
       </p:sp>
       <p:sp>
         <p:nvSpPr>
           <p:cNvPr id="7" name="Google Shape;7;p1"/>
-          <p:cNvSpPr txBox="1">
-            <a:spLocks noGrp="1"/>
-          </p:cNvSpPr>
+          <p:cNvSpPr txBox="1"/>
           <p:nvPr>
-            <p:ph type="body" idx="1"/>
+            <p:ph idx="1" type="body"/>
           </p:nvPr>
         </p:nvSpPr>
         <p:spPr>
@@ -6338,9 +5951,9 @@
           </a:ln>
         </p:spPr>
         <p:txBody>
-          <a:bodyPr spcFirstLastPara="1" wrap="square" lIns="91425" tIns="91425" rIns="91425" bIns="91425" anchor="t" anchorCtr="0"/>
+          <a:bodyPr anchorCtr="0" anchor="t" bIns="91425" lIns="91425" spcFirstLastPara="1" rIns="91425" wrap="square" tIns="91425"/>
           <a:lstStyle>
-            <a:lvl1pPr marL="457200" lvl="0" indent="-342900">
+            <a:lvl1pPr indent="-342900" lvl="0" marL="457200">
               <a:lnSpc>
                 <a:spcPct val="115000"/>
               </a:lnSpc>
@@ -6366,7 +5979,7 @@
                 <a:sym typeface="Lato"/>
               </a:defRPr>
             </a:lvl1pPr>
-            <a:lvl2pPr marL="914400" lvl="1" indent="-317500">
+            <a:lvl2pPr indent="-317500" lvl="1" marL="914400">
               <a:lnSpc>
                 <a:spcPct val="115000"/>
               </a:lnSpc>
@@ -6392,7 +6005,7 @@
                 <a:sym typeface="Lato"/>
               </a:defRPr>
             </a:lvl2pPr>
-            <a:lvl3pPr marL="1371600" lvl="2" indent="-317500">
+            <a:lvl3pPr indent="-317500" lvl="2" marL="1371600">
               <a:lnSpc>
                 <a:spcPct val="115000"/>
               </a:lnSpc>
@@ -6418,7 +6031,7 @@
                 <a:sym typeface="Lato"/>
               </a:defRPr>
             </a:lvl3pPr>
-            <a:lvl4pPr marL="1828800" lvl="3" indent="-317500">
+            <a:lvl4pPr indent="-317500" lvl="3" marL="1828800">
               <a:lnSpc>
                 <a:spcPct val="115000"/>
               </a:lnSpc>
@@ -6444,7 +6057,7 @@
                 <a:sym typeface="Lato"/>
               </a:defRPr>
             </a:lvl4pPr>
-            <a:lvl5pPr marL="2286000" lvl="4" indent="-317500">
+            <a:lvl5pPr indent="-317500" lvl="4" marL="2286000">
               <a:lnSpc>
                 <a:spcPct val="115000"/>
               </a:lnSpc>
@@ -6470,7 +6083,7 @@
                 <a:sym typeface="Lato"/>
               </a:defRPr>
             </a:lvl5pPr>
-            <a:lvl6pPr marL="2743200" lvl="5" indent="-317500">
+            <a:lvl6pPr indent="-317500" lvl="5" marL="2743200">
               <a:lnSpc>
                 <a:spcPct val="115000"/>
               </a:lnSpc>
@@ -6496,7 +6109,7 @@
                 <a:sym typeface="Lato"/>
               </a:defRPr>
             </a:lvl6pPr>
-            <a:lvl7pPr marL="3200400" lvl="6" indent="-317500">
+            <a:lvl7pPr indent="-317500" lvl="6" marL="3200400">
               <a:lnSpc>
                 <a:spcPct val="115000"/>
               </a:lnSpc>
@@ -6522,7 +6135,7 @@
                 <a:sym typeface="Lato"/>
               </a:defRPr>
             </a:lvl7pPr>
-            <a:lvl8pPr marL="3657600" lvl="7" indent="-317500">
+            <a:lvl8pPr indent="-317500" lvl="7" marL="3657600">
               <a:lnSpc>
                 <a:spcPct val="115000"/>
               </a:lnSpc>
@@ -6548,7 +6161,7 @@
                 <a:sym typeface="Lato"/>
               </a:defRPr>
             </a:lvl8pPr>
-            <a:lvl9pPr marL="4114800" lvl="8" indent="-317500">
+            <a:lvl9pPr indent="-317500" lvl="8" marL="4114800">
               <a:lnSpc>
                 <a:spcPct val="115000"/>
               </a:lnSpc>
@@ -6575,19 +6188,15 @@
               </a:defRPr>
             </a:lvl9pPr>
           </a:lstStyle>
-          <a:p>
-            <a:endParaRPr/>
-          </a:p>
+          <a:p/>
         </p:txBody>
       </p:sp>
       <p:sp>
         <p:nvSpPr>
           <p:cNvPr id="8" name="Google Shape;8;p1"/>
-          <p:cNvSpPr txBox="1">
-            <a:spLocks noGrp="1"/>
-          </p:cNvSpPr>
+          <p:cNvSpPr txBox="1"/>
           <p:nvPr>
-            <p:ph type="sldNum" idx="12"/>
+            <p:ph idx="12" type="sldNum"/>
           </p:nvPr>
         </p:nvSpPr>
         <p:spPr>
@@ -6604,7 +6213,7 @@
           </a:ln>
         </p:spPr>
         <p:txBody>
-          <a:bodyPr spcFirstLastPara="1" wrap="square" lIns="91425" tIns="91425" rIns="91425" bIns="91425" anchor="ctr" anchorCtr="0">
+          <a:bodyPr anchorCtr="0" anchor="ctr" bIns="91425" lIns="91425" spcFirstLastPara="1" rIns="91425" wrap="square" tIns="91425">
             <a:noAutofit/>
           </a:bodyPr>
           <a:lstStyle>
@@ -6718,7 +6327,7 @@
             </a:lvl9pPr>
           </a:lstStyle>
           <a:p>
-            <a:pPr marL="0" lvl="0" indent="0" algn="r" rtl="0">
+            <a:pPr indent="0" lvl="0" marL="0" rtl="0" algn="r">
               <a:spcBef>
                 <a:spcPts val="0"/>
               </a:spcBef>
@@ -6737,7 +6346,7 @@
       </p:sp>
     </p:spTree>
   </p:cSld>
-  <p:clrMap bg1="lt1" tx1="dk1" bg2="dk2" tx2="lt2" accent1="accent1" accent2="accent2" accent3="accent3" accent4="accent4" accent5="accent5" accent6="accent6" hlink="hlink" folHlink="folHlink"/>
+  <p:clrMap accent1="accent1" accent2="accent2" accent3="accent3" accent4="accent4" accent5="accent5" accent6="accent6" bg1="lt1" bg2="dk2" tx1="dk1" tx2="lt2" folHlink="folHlink" hlink="hlink"/>
   <p:sldLayoutIdLst>
     <p:sldLayoutId id="2147483648" r:id="rId1"/>
     <p:sldLayoutId id="2147483649" r:id="rId2"/>
@@ -6751,10 +6360,10 @@
     <p:sldLayoutId id="2147483657" r:id="rId10"/>
     <p:sldLayoutId id="2147483658" r:id="rId11"/>
   </p:sldLayoutIdLst>
-  <p:hf sldNum="0" hdr="0" ftr="0" dt="0"/>
+  <p:hf dt="0" ftr="0" hdr="0" sldNum="0"/>
   <p:txStyles>
     <p:titleStyle>
-      <a:defPPr marR="0" lvl="0" algn="l" rtl="0">
+      <a:defPPr lvl="0" marR="0" rtl="0" algn="l">
         <a:lnSpc>
           <a:spcPct val="100000"/>
         </a:lnSpc>
@@ -6765,7 +6374,7 @@
           <a:spcPts val="0"/>
         </a:spcAft>
       </a:defPPr>
-      <a:lvl1pPr marR="0" lvl="0" algn="l" rtl="0">
+      <a:lvl1pPr lvl="0" marR="0" rtl="0" algn="l">
         <a:lnSpc>
           <a:spcPct val="100000"/>
         </a:lnSpc>
@@ -6779,7 +6388,7 @@
           <a:srgbClr val="000000"/>
         </a:buClr>
         <a:buFont typeface="Arial"/>
-        <a:defRPr sz="1400" b="0" i="0" u="none" strike="noStrike" cap="none">
+        <a:defRPr b="0" i="0" sz="1400" u="none" cap="none" strike="noStrike">
           <a:solidFill>
             <a:srgbClr val="000000"/>
           </a:solidFill>
@@ -6789,7 +6398,7 @@
           <a:sym typeface="Arial"/>
         </a:defRPr>
       </a:lvl1pPr>
-      <a:lvl2pPr marR="0" lvl="1" algn="l" rtl="0">
+      <a:lvl2pPr lvl="1" marR="0" rtl="0" algn="l">
         <a:lnSpc>
           <a:spcPct val="100000"/>
         </a:lnSpc>
@@ -6803,7 +6412,7 @@
           <a:srgbClr val="000000"/>
         </a:buClr>
         <a:buFont typeface="Arial"/>
-        <a:defRPr sz="1400" b="0" i="0" u="none" strike="noStrike" cap="none">
+        <a:defRPr b="0" i="0" sz="1400" u="none" cap="none" strike="noStrike">
           <a:solidFill>
             <a:srgbClr val="000000"/>
           </a:solidFill>
@@ -6813,7 +6422,7 @@
           <a:sym typeface="Arial"/>
         </a:defRPr>
       </a:lvl2pPr>
-      <a:lvl3pPr marR="0" lvl="2" algn="l" rtl="0">
+      <a:lvl3pPr lvl="2" marR="0" rtl="0" algn="l">
         <a:lnSpc>
           <a:spcPct val="100000"/>
         </a:lnSpc>
@@ -6827,7 +6436,7 @@
           <a:srgbClr val="000000"/>
         </a:buClr>
         <a:buFont typeface="Arial"/>
-        <a:defRPr sz="1400" b="0" i="0" u="none" strike="noStrike" cap="none">
+        <a:defRPr b="0" i="0" sz="1400" u="none" cap="none" strike="noStrike">
           <a:solidFill>
             <a:srgbClr val="000000"/>
           </a:solidFill>
@@ -6837,7 +6446,7 @@
           <a:sym typeface="Arial"/>
         </a:defRPr>
       </a:lvl3pPr>
-      <a:lvl4pPr marR="0" lvl="3" algn="l" rtl="0">
+      <a:lvl4pPr lvl="3" marR="0" rtl="0" algn="l">
         <a:lnSpc>
           <a:spcPct val="100000"/>
         </a:lnSpc>
@@ -6851,7 +6460,7 @@
           <a:srgbClr val="000000"/>
         </a:buClr>
         <a:buFont typeface="Arial"/>
-        <a:defRPr sz="1400" b="0" i="0" u="none" strike="noStrike" cap="none">
+        <a:defRPr b="0" i="0" sz="1400" u="none" cap="none" strike="noStrike">
           <a:solidFill>
             <a:srgbClr val="000000"/>
           </a:solidFill>
@@ -6861,7 +6470,7 @@
           <a:sym typeface="Arial"/>
         </a:defRPr>
       </a:lvl4pPr>
-      <a:lvl5pPr marR="0" lvl="4" algn="l" rtl="0">
+      <a:lvl5pPr lvl="4" marR="0" rtl="0" algn="l">
         <a:lnSpc>
           <a:spcPct val="100000"/>
         </a:lnSpc>
@@ -6875,7 +6484,7 @@
           <a:srgbClr val="000000"/>
         </a:buClr>
         <a:buFont typeface="Arial"/>
-        <a:defRPr sz="1400" b="0" i="0" u="none" strike="noStrike" cap="none">
+        <a:defRPr b="0" i="0" sz="1400" u="none" cap="none" strike="noStrike">
           <a:solidFill>
             <a:srgbClr val="000000"/>
           </a:solidFill>
@@ -6885,7 +6494,7 @@
           <a:sym typeface="Arial"/>
         </a:defRPr>
       </a:lvl5pPr>
-      <a:lvl6pPr marR="0" lvl="5" algn="l" rtl="0">
+      <a:lvl6pPr lvl="5" marR="0" rtl="0" algn="l">
         <a:lnSpc>
           <a:spcPct val="100000"/>
         </a:lnSpc>
@@ -6899,7 +6508,7 @@
           <a:srgbClr val="000000"/>
         </a:buClr>
         <a:buFont typeface="Arial"/>
-        <a:defRPr sz="1400" b="0" i="0" u="none" strike="noStrike" cap="none">
+        <a:defRPr b="0" i="0" sz="1400" u="none" cap="none" strike="noStrike">
           <a:solidFill>
             <a:srgbClr val="000000"/>
           </a:solidFill>
@@ -6909,7 +6518,7 @@
           <a:sym typeface="Arial"/>
         </a:defRPr>
       </a:lvl6pPr>
-      <a:lvl7pPr marR="0" lvl="6" algn="l" rtl="0">
+      <a:lvl7pPr lvl="6" marR="0" rtl="0" algn="l">
         <a:lnSpc>
           <a:spcPct val="100000"/>
         </a:lnSpc>
@@ -6923,7 +6532,7 @@
           <a:srgbClr val="000000"/>
         </a:buClr>
         <a:buFont typeface="Arial"/>
-        <a:defRPr sz="1400" b="0" i="0" u="none" strike="noStrike" cap="none">
+        <a:defRPr b="0" i="0" sz="1400" u="none" cap="none" strike="noStrike">
           <a:solidFill>
             <a:srgbClr val="000000"/>
           </a:solidFill>
@@ -6933,7 +6542,7 @@
           <a:sym typeface="Arial"/>
         </a:defRPr>
       </a:lvl7pPr>
-      <a:lvl8pPr marR="0" lvl="7" algn="l" rtl="0">
+      <a:lvl8pPr lvl="7" marR="0" rtl="0" algn="l">
         <a:lnSpc>
           <a:spcPct val="100000"/>
         </a:lnSpc>
@@ -6947,7 +6556,7 @@
           <a:srgbClr val="000000"/>
         </a:buClr>
         <a:buFont typeface="Arial"/>
-        <a:defRPr sz="1400" b="0" i="0" u="none" strike="noStrike" cap="none">
+        <a:defRPr b="0" i="0" sz="1400" u="none" cap="none" strike="noStrike">
           <a:solidFill>
             <a:srgbClr val="000000"/>
           </a:solidFill>
@@ -6957,7 +6566,7 @@
           <a:sym typeface="Arial"/>
         </a:defRPr>
       </a:lvl8pPr>
-      <a:lvl9pPr marR="0" lvl="8" algn="l" rtl="0">
+      <a:lvl9pPr lvl="8" marR="0" rtl="0" algn="l">
         <a:lnSpc>
           <a:spcPct val="100000"/>
         </a:lnSpc>
@@ -6971,7 +6580,7 @@
           <a:srgbClr val="000000"/>
         </a:buClr>
         <a:buFont typeface="Arial"/>
-        <a:defRPr sz="1400" b="0" i="0" u="none" strike="noStrike" cap="none">
+        <a:defRPr b="0" i="0" sz="1400" u="none" cap="none" strike="noStrike">
           <a:solidFill>
             <a:srgbClr val="000000"/>
           </a:solidFill>
@@ -6983,7 +6592,7 @@
       </a:lvl9pPr>
     </p:titleStyle>
     <p:bodyStyle>
-      <a:defPPr marR="0" lvl="0" algn="l" rtl="0">
+      <a:defPPr lvl="0" marR="0" rtl="0" algn="l">
         <a:lnSpc>
           <a:spcPct val="100000"/>
         </a:lnSpc>
@@ -6994,7 +6603,7 @@
           <a:spcPts val="0"/>
         </a:spcAft>
       </a:defPPr>
-      <a:lvl1pPr marR="0" lvl="0" algn="l" rtl="0">
+      <a:lvl1pPr lvl="0" marR="0" rtl="0" algn="l">
         <a:lnSpc>
           <a:spcPct val="100000"/>
         </a:lnSpc>
@@ -7008,7 +6617,7 @@
           <a:srgbClr val="000000"/>
         </a:buClr>
         <a:buFont typeface="Arial"/>
-        <a:defRPr sz="1400" b="0" i="0" u="none" strike="noStrike" cap="none">
+        <a:defRPr b="0" i="0" sz="1400" u="none" cap="none" strike="noStrike">
           <a:solidFill>
             <a:srgbClr val="000000"/>
           </a:solidFill>
@@ -7018,7 +6627,7 @@
           <a:sym typeface="Arial"/>
         </a:defRPr>
       </a:lvl1pPr>
-      <a:lvl2pPr marR="0" lvl="1" algn="l" rtl="0">
+      <a:lvl2pPr lvl="1" marR="0" rtl="0" algn="l">
         <a:lnSpc>
           <a:spcPct val="100000"/>
         </a:lnSpc>
@@ -7032,7 +6641,7 @@
           <a:srgbClr val="000000"/>
         </a:buClr>
         <a:buFont typeface="Arial"/>
-        <a:defRPr sz="1400" b="0" i="0" u="none" strike="noStrike" cap="none">
+        <a:defRPr b="0" i="0" sz="1400" u="none" cap="none" strike="noStrike">
           <a:solidFill>
             <a:srgbClr val="000000"/>
           </a:solidFill>
@@ -7042,7 +6651,7 @@
           <a:sym typeface="Arial"/>
         </a:defRPr>
       </a:lvl2pPr>
-      <a:lvl3pPr marR="0" lvl="2" algn="l" rtl="0">
+      <a:lvl3pPr lvl="2" marR="0" rtl="0" algn="l">
         <a:lnSpc>
           <a:spcPct val="100000"/>
         </a:lnSpc>
@@ -7056,7 +6665,7 @@
           <a:srgbClr val="000000"/>
         </a:buClr>
         <a:buFont typeface="Arial"/>
-        <a:defRPr sz="1400" b="0" i="0" u="none" strike="noStrike" cap="none">
+        <a:defRPr b="0" i="0" sz="1400" u="none" cap="none" strike="noStrike">
           <a:solidFill>
             <a:srgbClr val="000000"/>
           </a:solidFill>
@@ -7066,7 +6675,7 @@
           <a:sym typeface="Arial"/>
         </a:defRPr>
       </a:lvl3pPr>
-      <a:lvl4pPr marR="0" lvl="3" algn="l" rtl="0">
+      <a:lvl4pPr lvl="3" marR="0" rtl="0" algn="l">
         <a:lnSpc>
           <a:spcPct val="100000"/>
         </a:lnSpc>
@@ -7080,7 +6689,7 @@
           <a:srgbClr val="000000"/>
         </a:buClr>
         <a:buFont typeface="Arial"/>
-        <a:defRPr sz="1400" b="0" i="0" u="none" strike="noStrike" cap="none">
+        <a:defRPr b="0" i="0" sz="1400" u="none" cap="none" strike="noStrike">
           <a:solidFill>
             <a:srgbClr val="000000"/>
           </a:solidFill>
@@ -7090,7 +6699,7 @@
           <a:sym typeface="Arial"/>
         </a:defRPr>
       </a:lvl4pPr>
-      <a:lvl5pPr marR="0" lvl="4" algn="l" rtl="0">
+      <a:lvl5pPr lvl="4" marR="0" rtl="0" algn="l">
         <a:lnSpc>
           <a:spcPct val="100000"/>
         </a:lnSpc>
@@ -7104,7 +6713,7 @@
           <a:srgbClr val="000000"/>
         </a:buClr>
         <a:buFont typeface="Arial"/>
-        <a:defRPr sz="1400" b="0" i="0" u="none" strike="noStrike" cap="none">
+        <a:defRPr b="0" i="0" sz="1400" u="none" cap="none" strike="noStrike">
           <a:solidFill>
             <a:srgbClr val="000000"/>
           </a:solidFill>
@@ -7114,7 +6723,7 @@
           <a:sym typeface="Arial"/>
         </a:defRPr>
       </a:lvl5pPr>
-      <a:lvl6pPr marR="0" lvl="5" algn="l" rtl="0">
+      <a:lvl6pPr lvl="5" marR="0" rtl="0" algn="l">
         <a:lnSpc>
           <a:spcPct val="100000"/>
         </a:lnSpc>
@@ -7128,7 +6737,7 @@
           <a:srgbClr val="000000"/>
         </a:buClr>
         <a:buFont typeface="Arial"/>
-        <a:defRPr sz="1400" b="0" i="0" u="none" strike="noStrike" cap="none">
+        <a:defRPr b="0" i="0" sz="1400" u="none" cap="none" strike="noStrike">
           <a:solidFill>
             <a:srgbClr val="000000"/>
           </a:solidFill>
@@ -7138,7 +6747,7 @@
           <a:sym typeface="Arial"/>
         </a:defRPr>
       </a:lvl6pPr>
-      <a:lvl7pPr marR="0" lvl="6" algn="l" rtl="0">
+      <a:lvl7pPr lvl="6" marR="0" rtl="0" algn="l">
         <a:lnSpc>
           <a:spcPct val="100000"/>
         </a:lnSpc>
@@ -7152,7 +6761,7 @@
           <a:srgbClr val="000000"/>
         </a:buClr>
         <a:buFont typeface="Arial"/>
-        <a:defRPr sz="1400" b="0" i="0" u="none" strike="noStrike" cap="none">
+        <a:defRPr b="0" i="0" sz="1400" u="none" cap="none" strike="noStrike">
           <a:solidFill>
             <a:srgbClr val="000000"/>
           </a:solidFill>
@@ -7162,7 +6771,7 @@
           <a:sym typeface="Arial"/>
         </a:defRPr>
       </a:lvl7pPr>
-      <a:lvl8pPr marR="0" lvl="7" algn="l" rtl="0">
+      <a:lvl8pPr lvl="7" marR="0" rtl="0" algn="l">
         <a:lnSpc>
           <a:spcPct val="100000"/>
         </a:lnSpc>
@@ -7176,7 +6785,7 @@
           <a:srgbClr val="000000"/>
         </a:buClr>
         <a:buFont typeface="Arial"/>
-        <a:defRPr sz="1400" b="0" i="0" u="none" strike="noStrike" cap="none">
+        <a:defRPr b="0" i="0" sz="1400" u="none" cap="none" strike="noStrike">
           <a:solidFill>
             <a:srgbClr val="000000"/>
           </a:solidFill>
@@ -7186,7 +6795,7 @@
           <a:sym typeface="Arial"/>
         </a:defRPr>
       </a:lvl8pPr>
-      <a:lvl9pPr marR="0" lvl="8" algn="l" rtl="0">
+      <a:lvl9pPr lvl="8" marR="0" rtl="0" algn="l">
         <a:lnSpc>
           <a:spcPct val="100000"/>
         </a:lnSpc>
@@ -7200,7 +6809,7 @@
           <a:srgbClr val="000000"/>
         </a:buClr>
         <a:buFont typeface="Arial"/>
-        <a:defRPr sz="1400" b="0" i="0" u="none" strike="noStrike" cap="none">
+        <a:defRPr b="0" i="0" sz="1400" u="none" cap="none" strike="noStrike">
           <a:solidFill>
             <a:srgbClr val="000000"/>
           </a:solidFill>
@@ -7212,7 +6821,7 @@
       </a:lvl9pPr>
     </p:bodyStyle>
     <p:otherStyle>
-      <a:defPPr marR="0" lvl="0" algn="l" rtl="0">
+      <a:defPPr lvl="0" marR="0" rtl="0" algn="l">
         <a:lnSpc>
           <a:spcPct val="100000"/>
         </a:lnSpc>
@@ -7223,7 +6832,7 @@
           <a:spcPts val="0"/>
         </a:spcAft>
       </a:defPPr>
-      <a:lvl1pPr marR="0" lvl="0" algn="l" rtl="0">
+      <a:lvl1pPr lvl="0" marR="0" rtl="0" algn="l">
         <a:lnSpc>
           <a:spcPct val="100000"/>
         </a:lnSpc>
@@ -7237,7 +6846,7 @@
           <a:srgbClr val="000000"/>
         </a:buClr>
         <a:buFont typeface="Arial"/>
-        <a:defRPr sz="1400" b="0" i="0" u="none" strike="noStrike" cap="none">
+        <a:defRPr b="0" i="0" sz="1400" u="none" cap="none" strike="noStrike">
           <a:solidFill>
             <a:srgbClr val="000000"/>
           </a:solidFill>
@@ -7247,7 +6856,7 @@
           <a:sym typeface="Arial"/>
         </a:defRPr>
       </a:lvl1pPr>
-      <a:lvl2pPr marR="0" lvl="1" algn="l" rtl="0">
+      <a:lvl2pPr lvl="1" marR="0" rtl="0" algn="l">
         <a:lnSpc>
           <a:spcPct val="100000"/>
         </a:lnSpc>
@@ -7261,7 +6870,7 @@
           <a:srgbClr val="000000"/>
         </a:buClr>
         <a:buFont typeface="Arial"/>
-        <a:defRPr sz="1400" b="0" i="0" u="none" strike="noStrike" cap="none">
+        <a:defRPr b="0" i="0" sz="1400" u="none" cap="none" strike="noStrike">
           <a:solidFill>
             <a:srgbClr val="000000"/>
           </a:solidFill>
@@ -7271,7 +6880,7 @@
           <a:sym typeface="Arial"/>
         </a:defRPr>
       </a:lvl2pPr>
-      <a:lvl3pPr marR="0" lvl="2" algn="l" rtl="0">
+      <a:lvl3pPr lvl="2" marR="0" rtl="0" algn="l">
         <a:lnSpc>
           <a:spcPct val="100000"/>
         </a:lnSpc>
@@ -7285,7 +6894,7 @@
           <a:srgbClr val="000000"/>
         </a:buClr>
         <a:buFont typeface="Arial"/>
-        <a:defRPr sz="1400" b="0" i="0" u="none" strike="noStrike" cap="none">
+        <a:defRPr b="0" i="0" sz="1400" u="none" cap="none" strike="noStrike">
           <a:solidFill>
             <a:srgbClr val="000000"/>
           </a:solidFill>
@@ -7295,7 +6904,7 @@
           <a:sym typeface="Arial"/>
         </a:defRPr>
       </a:lvl3pPr>
-      <a:lvl4pPr marR="0" lvl="3" algn="l" rtl="0">
+      <a:lvl4pPr lvl="3" marR="0" rtl="0" algn="l">
         <a:lnSpc>
           <a:spcPct val="100000"/>
         </a:lnSpc>
@@ -7309,7 +6918,7 @@
           <a:srgbClr val="000000"/>
         </a:buClr>
         <a:buFont typeface="Arial"/>
-        <a:defRPr sz="1400" b="0" i="0" u="none" strike="noStrike" cap="none">
+        <a:defRPr b="0" i="0" sz="1400" u="none" cap="none" strike="noStrike">
           <a:solidFill>
             <a:srgbClr val="000000"/>
           </a:solidFill>
@@ -7319,7 +6928,7 @@
           <a:sym typeface="Arial"/>
         </a:defRPr>
       </a:lvl4pPr>
-      <a:lvl5pPr marR="0" lvl="4" algn="l" rtl="0">
+      <a:lvl5pPr lvl="4" marR="0" rtl="0" algn="l">
         <a:lnSpc>
           <a:spcPct val="100000"/>
         </a:lnSpc>
@@ -7333,7 +6942,7 @@
           <a:srgbClr val="000000"/>
         </a:buClr>
         <a:buFont typeface="Arial"/>
-        <a:defRPr sz="1400" b="0" i="0" u="none" strike="noStrike" cap="none">
+        <a:defRPr b="0" i="0" sz="1400" u="none" cap="none" strike="noStrike">
           <a:solidFill>
             <a:srgbClr val="000000"/>
           </a:solidFill>
@@ -7343,7 +6952,7 @@
           <a:sym typeface="Arial"/>
         </a:defRPr>
       </a:lvl5pPr>
-      <a:lvl6pPr marR="0" lvl="5" algn="l" rtl="0">
+      <a:lvl6pPr lvl="5" marR="0" rtl="0" algn="l">
         <a:lnSpc>
           <a:spcPct val="100000"/>
         </a:lnSpc>
@@ -7357,7 +6966,7 @@
           <a:srgbClr val="000000"/>
         </a:buClr>
         <a:buFont typeface="Arial"/>
-        <a:defRPr sz="1400" b="0" i="0" u="none" strike="noStrike" cap="none">
+        <a:defRPr b="0" i="0" sz="1400" u="none" cap="none" strike="noStrike">
           <a:solidFill>
             <a:srgbClr val="000000"/>
           </a:solidFill>
@@ -7367,7 +6976,7 @@
           <a:sym typeface="Arial"/>
         </a:defRPr>
       </a:lvl6pPr>
-      <a:lvl7pPr marR="0" lvl="6" algn="l" rtl="0">
+      <a:lvl7pPr lvl="6" marR="0" rtl="0" algn="l">
         <a:lnSpc>
           <a:spcPct val="100000"/>
         </a:lnSpc>
@@ -7381,7 +6990,7 @@
           <a:srgbClr val="000000"/>
         </a:buClr>
         <a:buFont typeface="Arial"/>
-        <a:defRPr sz="1400" b="0" i="0" u="none" strike="noStrike" cap="none">
+        <a:defRPr b="0" i="0" sz="1400" u="none" cap="none" strike="noStrike">
           <a:solidFill>
             <a:srgbClr val="000000"/>
           </a:solidFill>
@@ -7391,7 +7000,7 @@
           <a:sym typeface="Arial"/>
         </a:defRPr>
       </a:lvl7pPr>
-      <a:lvl8pPr marR="0" lvl="7" algn="l" rtl="0">
+      <a:lvl8pPr lvl="7" marR="0" rtl="0" algn="l">
         <a:lnSpc>
           <a:spcPct val="100000"/>
         </a:lnSpc>
@@ -7405,7 +7014,7 @@
           <a:srgbClr val="000000"/>
         </a:buClr>
         <a:buFont typeface="Arial"/>
-        <a:defRPr sz="1400" b="0" i="0" u="none" strike="noStrike" cap="none">
+        <a:defRPr b="0" i="0" sz="1400" u="none" cap="none" strike="noStrike">
           <a:solidFill>
             <a:srgbClr val="000000"/>
           </a:solidFill>
@@ -7415,7 +7024,7 @@
           <a:sym typeface="Arial"/>
         </a:defRPr>
       </a:lvl8pPr>
-      <a:lvl9pPr marR="0" lvl="8" algn="l" rtl="0">
+      <a:lvl9pPr lvl="8" marR="0" rtl="0" algn="l">
         <a:lnSpc>
           <a:spcPct val="100000"/>
         </a:lnSpc>
@@ -7429,7 +7038,7 @@
           <a:srgbClr val="000000"/>
         </a:buClr>
         <a:buFont typeface="Arial"/>
-        <a:defRPr sz="1400" b="0" i="0" u="none" strike="noStrike" cap="none">
+        <a:defRPr b="0" i="0" sz="1400" u="none" cap="none" strike="noStrike">
           <a:solidFill>
             <a:srgbClr val="000000"/>
           </a:solidFill>
@@ -7445,11 +7054,11 @@
 </file>
 
 <file path=ppt/slides/slide1.xml><?xml version="1.0" encoding="utf-8"?>
-<p:sld xmlns:a="http://schemas.openxmlformats.org/drawingml/2006/main" xmlns:r="http://schemas.openxmlformats.org/officeDocument/2006/relationships" xmlns:p="http://schemas.openxmlformats.org/presentationml/2006/main">
+<p:sld xmlns:a="http://schemas.openxmlformats.org/drawingml/2006/main" xmlns:r="http://schemas.openxmlformats.org/officeDocument/2006/relationships" xmlns:mc="http://schemas.openxmlformats.org/markup-compatibility/2006" xmlns:mv="urn:schemas-microsoft-com:mac:vml" xmlns:p="http://schemas.openxmlformats.org/presentationml/2006/main" xmlns:c="http://schemas.openxmlformats.org/drawingml/2006/chart" xmlns:dgm="http://schemas.openxmlformats.org/drawingml/2006/diagram" xmlns:o="urn:schemas-microsoft-com:office:office" xmlns:v="urn:schemas-microsoft-com:vml" xmlns:pvml="urn:schemas-microsoft-com:office:powerpoint" xmlns:com="http://schemas.openxmlformats.org/drawingml/2006/compatibility" xmlns:p14="http://schemas.microsoft.com/office/powerpoint/2010/main" xmlns:p15="http://schemas.microsoft.com/office/powerpoint/2012/main">
   <p:cSld>
     <p:spTree>
       <p:nvGrpSpPr>
-        <p:cNvPr id="1" name="Shape 71"/>
+        <p:cNvPr id="71" name="Shape 71"/>
         <p:cNvGrpSpPr/>
         <p:nvPr/>
       </p:nvGrpSpPr>
@@ -7464,9 +7073,7 @@
       <p:sp>
         <p:nvSpPr>
           <p:cNvPr id="72" name="Google Shape;72;p13"/>
-          <p:cNvSpPr txBox="1">
-            <a:spLocks noGrp="1"/>
-          </p:cNvSpPr>
+          <p:cNvSpPr txBox="1"/>
           <p:nvPr>
             <p:ph type="ctrTitle"/>
           </p:nvPr>
@@ -7481,12 +7088,12 @@
           </a:prstGeom>
         </p:spPr>
         <p:txBody>
-          <a:bodyPr spcFirstLastPara="1" wrap="square" lIns="91425" tIns="91425" rIns="91425" bIns="91425" anchor="t" anchorCtr="0">
+          <a:bodyPr anchorCtr="0" anchor="t" bIns="91425" lIns="91425" spcFirstLastPara="1" rIns="91425" wrap="square" tIns="91425">
             <a:noAutofit/>
           </a:bodyPr>
           <a:lstStyle/>
           <a:p>
-            <a:pPr marL="0" lvl="0" indent="0" algn="l" rtl="0">
+            <a:pPr indent="0" lvl="0" marL="0" rtl="0" algn="l">
               <a:spcBef>
                 <a:spcPts val="0"/>
               </a:spcBef>
@@ -7506,11 +7113,9 @@
       <p:sp>
         <p:nvSpPr>
           <p:cNvPr id="73" name="Google Shape;73;p13"/>
-          <p:cNvSpPr txBox="1">
-            <a:spLocks noGrp="1"/>
-          </p:cNvSpPr>
+          <p:cNvSpPr txBox="1"/>
           <p:nvPr>
-            <p:ph type="subTitle" idx="1"/>
+            <p:ph idx="1" type="subTitle"/>
           </p:nvPr>
         </p:nvSpPr>
         <p:spPr>
@@ -7523,12 +7128,12 @@
           </a:prstGeom>
         </p:spPr>
         <p:txBody>
-          <a:bodyPr spcFirstLastPara="1" wrap="square" lIns="91425" tIns="91425" rIns="91425" bIns="91425" anchor="b" anchorCtr="0">
+          <a:bodyPr anchorCtr="0" anchor="b" bIns="91425" lIns="91425" spcFirstLastPara="1" rIns="91425" wrap="square" tIns="91425">
             <a:noAutofit/>
           </a:bodyPr>
           <a:lstStyle/>
           <a:p>
-            <a:pPr marL="0" lvl="0" indent="0" algn="l" rtl="0">
+            <a:pPr indent="0" lvl="0" marL="0" rtl="0" algn="l">
               <a:spcBef>
                 <a:spcPts val="0"/>
               </a:spcBef>
@@ -7554,11 +7159,11 @@
 </file>
 
 <file path=ppt/slides/slide2.xml><?xml version="1.0" encoding="utf-8"?>
-<p:sld xmlns:a="http://schemas.openxmlformats.org/drawingml/2006/main" xmlns:r="http://schemas.openxmlformats.org/officeDocument/2006/relationships" xmlns:p="http://schemas.openxmlformats.org/presentationml/2006/main">
+<p:sld xmlns:a="http://schemas.openxmlformats.org/drawingml/2006/main" xmlns:r="http://schemas.openxmlformats.org/officeDocument/2006/relationships" xmlns:mc="http://schemas.openxmlformats.org/markup-compatibility/2006" xmlns:mv="urn:schemas-microsoft-com:mac:vml" xmlns:p="http://schemas.openxmlformats.org/presentationml/2006/main" xmlns:c="http://schemas.openxmlformats.org/drawingml/2006/chart" xmlns:dgm="http://schemas.openxmlformats.org/drawingml/2006/diagram" xmlns:o="urn:schemas-microsoft-com:office:office" xmlns:v="urn:schemas-microsoft-com:vml" xmlns:pvml="urn:schemas-microsoft-com:office:powerpoint" xmlns:com="http://schemas.openxmlformats.org/drawingml/2006/compatibility" xmlns:p14="http://schemas.microsoft.com/office/powerpoint/2010/main" xmlns:p15="http://schemas.microsoft.com/office/powerpoint/2012/main">
   <p:cSld>
     <p:spTree>
       <p:nvGrpSpPr>
-        <p:cNvPr id="1" name="Shape 77"/>
+        <p:cNvPr id="77" name="Shape 77"/>
         <p:cNvGrpSpPr/>
         <p:nvPr/>
       </p:nvGrpSpPr>
@@ -7573,11 +7178,9 @@
       <p:sp>
         <p:nvSpPr>
           <p:cNvPr id="78" name="Google Shape;78;p14"/>
-          <p:cNvSpPr txBox="1">
-            <a:spLocks noGrp="1"/>
-          </p:cNvSpPr>
+          <p:cNvSpPr txBox="1"/>
           <p:nvPr>
-            <p:ph type="body" idx="1"/>
+            <p:ph idx="1" type="body"/>
           </p:nvPr>
         </p:nvSpPr>
         <p:spPr>
@@ -7590,12 +7193,12 @@
           </a:prstGeom>
         </p:spPr>
         <p:txBody>
-          <a:bodyPr spcFirstLastPara="1" wrap="square" lIns="91425" tIns="91425" rIns="91425" bIns="91425" anchor="ctr" anchorCtr="0">
+          <a:bodyPr anchorCtr="0" anchor="ctr" bIns="91425" lIns="91425" spcFirstLastPara="1" rIns="91425" wrap="square" tIns="91425">
             <a:noAutofit/>
           </a:bodyPr>
           <a:lstStyle/>
           <a:p>
-            <a:pPr marL="0" lvl="0" indent="0" algn="l" rtl="0">
+            <a:pPr indent="0" lvl="0" marL="0" rtl="0" algn="l">
               <a:spcBef>
                 <a:spcPts val="0"/>
               </a:spcBef>
@@ -7649,203 +7252,11 @@
 </file>
 
 <file path=ppt/slides/slide3.xml><?xml version="1.0" encoding="utf-8"?>
-<p:sld xmlns:a="http://schemas.openxmlformats.org/drawingml/2006/main" xmlns:r="http://schemas.openxmlformats.org/officeDocument/2006/relationships" xmlns:p="http://schemas.openxmlformats.org/presentationml/2006/main">
+<p:sld xmlns:a="http://schemas.openxmlformats.org/drawingml/2006/main" xmlns:r="http://schemas.openxmlformats.org/officeDocument/2006/relationships" xmlns:mc="http://schemas.openxmlformats.org/markup-compatibility/2006" xmlns:mv="urn:schemas-microsoft-com:mac:vml" xmlns:p="http://schemas.openxmlformats.org/presentationml/2006/main" xmlns:c="http://schemas.openxmlformats.org/drawingml/2006/chart" xmlns:dgm="http://schemas.openxmlformats.org/drawingml/2006/diagram" xmlns:o="urn:schemas-microsoft-com:office:office" xmlns:v="urn:schemas-microsoft-com:vml" xmlns:pvml="urn:schemas-microsoft-com:office:powerpoint" xmlns:com="http://schemas.openxmlformats.org/drawingml/2006/compatibility" xmlns:p14="http://schemas.microsoft.com/office/powerpoint/2010/main" xmlns:p15="http://schemas.microsoft.com/office/powerpoint/2012/main">
   <p:cSld>
     <p:spTree>
       <p:nvGrpSpPr>
-        <p:cNvPr id="1" name="Shape 77"/>
-        <p:cNvGrpSpPr/>
-        <p:nvPr/>
-      </p:nvGrpSpPr>
-      <p:grpSpPr>
-        <a:xfrm>
-          <a:off x="0" y="0"/>
-          <a:ext cx="0" cy="0"/>
-          <a:chOff x="0" y="0"/>
-          <a:chExt cx="0" cy="0"/>
-        </a:xfrm>
-      </p:grpSpPr>
-      <p:sp>
-        <p:nvSpPr>
-          <p:cNvPr id="78" name="Google Shape;78;p14"/>
-          <p:cNvSpPr txBox="1">
-            <a:spLocks noGrp="1"/>
-          </p:cNvSpPr>
-          <p:nvPr>
-            <p:ph type="body" idx="1"/>
-          </p:nvPr>
-        </p:nvSpPr>
-        <p:spPr>
-          <a:xfrm>
-            <a:off x="2938420" y="559450"/>
-            <a:ext cx="3416100" cy="393600"/>
-          </a:xfrm>
-          <a:prstGeom prst="rect">
-            <a:avLst/>
-          </a:prstGeom>
-        </p:spPr>
-        <p:txBody>
-          <a:bodyPr spcFirstLastPara="1" wrap="square" lIns="91425" tIns="91425" rIns="91425" bIns="91425" anchor="ctr" anchorCtr="0">
-            <a:noAutofit/>
-          </a:bodyPr>
-          <a:lstStyle/>
-          <a:p>
-            <a:pPr marL="0" lvl="0" indent="0" algn="l" rtl="0">
-              <a:spcBef>
-                <a:spcPts val="0"/>
-              </a:spcBef>
-              <a:spcAft>
-                <a:spcPts val="0"/>
-              </a:spcAft>
-              <a:buNone/>
-            </a:pPr>
-            <a:r>
-              <a:rPr lang="es" sz="2400" dirty="0" smtClean="0"/>
-              <a:t>Programados</a:t>
-            </a:r>
-            <a:endParaRPr sz="2400" dirty="0"/>
-          </a:p>
-        </p:txBody>
-      </p:sp>
-      <p:pic>
-        <p:nvPicPr>
-          <p:cNvPr id="2" name="Picture 1"/>
-          <p:cNvPicPr>
-            <a:picLocks noChangeAspect="1"/>
-          </p:cNvPicPr>
-          <p:nvPr/>
-        </p:nvPicPr>
-        <p:blipFill>
-          <a:blip r:embed="rId3"/>
-          <a:stretch>
-            <a:fillRect/>
-          </a:stretch>
-        </p:blipFill>
-        <p:spPr>
-          <a:xfrm>
-            <a:off x="2143125" y="1195387"/>
-            <a:ext cx="4857750" cy="2752725"/>
-          </a:xfrm>
-          <a:prstGeom prst="rect">
-            <a:avLst/>
-          </a:prstGeom>
-        </p:spPr>
-      </p:pic>
-    </p:spTree>
-    <p:extLst>
-      <p:ext uri="{BB962C8B-B14F-4D97-AF65-F5344CB8AC3E}">
-        <p14:creationId xmlns:p14="http://schemas.microsoft.com/office/powerpoint/2010/main" val="1491470963"/>
-      </p:ext>
-    </p:extLst>
-  </p:cSld>
-  <p:clrMapOvr>
-    <a:masterClrMapping/>
-  </p:clrMapOvr>
-</p:sld>
-</file>
-
-<file path=ppt/slides/slide4.xml><?xml version="1.0" encoding="utf-8"?>
-<p:sld xmlns:a="http://schemas.openxmlformats.org/drawingml/2006/main" xmlns:r="http://schemas.openxmlformats.org/officeDocument/2006/relationships" xmlns:p="http://schemas.openxmlformats.org/presentationml/2006/main">
-  <p:cSld>
-    <p:spTree>
-      <p:nvGrpSpPr>
-        <p:cNvPr id="1" name="Shape 77"/>
-        <p:cNvGrpSpPr/>
-        <p:nvPr/>
-      </p:nvGrpSpPr>
-      <p:grpSpPr>
-        <a:xfrm>
-          <a:off x="0" y="0"/>
-          <a:ext cx="0" cy="0"/>
-          <a:chOff x="0" y="0"/>
-          <a:chExt cx="0" cy="0"/>
-        </a:xfrm>
-      </p:grpSpPr>
-      <p:sp>
-        <p:nvSpPr>
-          <p:cNvPr id="78" name="Google Shape;78;p14"/>
-          <p:cNvSpPr txBox="1">
-            <a:spLocks noGrp="1"/>
-          </p:cNvSpPr>
-          <p:nvPr>
-            <p:ph type="body" idx="1"/>
-          </p:nvPr>
-        </p:nvSpPr>
-        <p:spPr>
-          <a:xfrm>
-            <a:off x="2938420" y="559450"/>
-            <a:ext cx="3416100" cy="393600"/>
-          </a:xfrm>
-          <a:prstGeom prst="rect">
-            <a:avLst/>
-          </a:prstGeom>
-        </p:spPr>
-        <p:txBody>
-          <a:bodyPr spcFirstLastPara="1" wrap="square" lIns="91425" tIns="91425" rIns="91425" bIns="91425" anchor="ctr" anchorCtr="0">
-            <a:noAutofit/>
-          </a:bodyPr>
-          <a:lstStyle/>
-          <a:p>
-            <a:pPr marL="0" lvl="0" indent="0" algn="l" rtl="0">
-              <a:spcBef>
-                <a:spcPts val="0"/>
-              </a:spcBef>
-              <a:spcAft>
-                <a:spcPts val="0"/>
-              </a:spcAft>
-              <a:buNone/>
-            </a:pPr>
-            <a:r>
-              <a:rPr lang="es" sz="2400" dirty="0" smtClean="0"/>
-              <a:t>Probados y corregidos</a:t>
-            </a:r>
-            <a:endParaRPr sz="2400" dirty="0"/>
-          </a:p>
-        </p:txBody>
-      </p:sp>
-      <p:pic>
-        <p:nvPicPr>
-          <p:cNvPr id="3" name="Picture 2"/>
-          <p:cNvPicPr>
-            <a:picLocks noChangeAspect="1"/>
-          </p:cNvPicPr>
-          <p:nvPr/>
-        </p:nvPicPr>
-        <p:blipFill>
-          <a:blip r:embed="rId3"/>
-          <a:stretch>
-            <a:fillRect/>
-          </a:stretch>
-        </p:blipFill>
-        <p:spPr>
-          <a:xfrm>
-            <a:off x="2128837" y="1204912"/>
-            <a:ext cx="4886325" cy="2733675"/>
-          </a:xfrm>
-          <a:prstGeom prst="rect">
-            <a:avLst/>
-          </a:prstGeom>
-        </p:spPr>
-      </p:pic>
-    </p:spTree>
-    <p:extLst>
-      <p:ext uri="{BB962C8B-B14F-4D97-AF65-F5344CB8AC3E}">
-        <p14:creationId xmlns:p14="http://schemas.microsoft.com/office/powerpoint/2010/main" val="36879418"/>
-      </p:ext>
-    </p:extLst>
-  </p:cSld>
-  <p:clrMapOvr>
-    <a:masterClrMapping/>
-  </p:clrMapOvr>
-</p:sld>
-</file>
-
-<file path=ppt/slides/slide5.xml><?xml version="1.0" encoding="utf-8"?>
-<p:sld xmlns:a="http://schemas.openxmlformats.org/drawingml/2006/main" xmlns:r="http://schemas.openxmlformats.org/officeDocument/2006/relationships" xmlns:p="http://schemas.openxmlformats.org/presentationml/2006/main">
-  <p:cSld>
-    <p:spTree>
-      <p:nvGrpSpPr>
-        <p:cNvPr id="1" name="Shape 83"/>
+        <p:cNvPr id="83" name="Shape 83"/>
         <p:cNvGrpSpPr/>
         <p:nvPr/>
       </p:nvGrpSpPr>
@@ -7860,11 +7271,9 @@
       <p:sp>
         <p:nvSpPr>
           <p:cNvPr id="84" name="Google Shape;84;p15"/>
-          <p:cNvSpPr txBox="1">
-            <a:spLocks noGrp="1"/>
-          </p:cNvSpPr>
+          <p:cNvSpPr txBox="1"/>
           <p:nvPr>
-            <p:ph type="body" idx="1"/>
+            <p:ph idx="1" type="body"/>
           </p:nvPr>
         </p:nvSpPr>
         <p:spPr>
@@ -7877,12 +7286,12 @@
           </a:prstGeom>
         </p:spPr>
         <p:txBody>
-          <a:bodyPr spcFirstLastPara="1" wrap="square" lIns="91425" tIns="91425" rIns="91425" bIns="91425" anchor="ctr" anchorCtr="0">
+          <a:bodyPr anchorCtr="0" anchor="ctr" bIns="91425" lIns="91425" spcFirstLastPara="1" rIns="91425" wrap="square" tIns="91425">
             <a:noAutofit/>
           </a:bodyPr>
           <a:lstStyle/>
           <a:p>
-            <a:pPr marL="0" lvl="0" indent="0" algn="l" rtl="0">
+            <a:pPr indent="0" lvl="0" marL="0" rtl="0" algn="l">
               <a:spcBef>
                 <a:spcPts val="0"/>
               </a:spcBef>
@@ -7919,12 +7328,12 @@
           </a:ln>
         </p:spPr>
         <p:txBody>
-          <a:bodyPr spcFirstLastPara="1" wrap="square" lIns="91425" tIns="91425" rIns="91425" bIns="91425" anchor="t" anchorCtr="0">
+          <a:bodyPr anchorCtr="0" anchor="t" bIns="91425" lIns="91425" spcFirstLastPara="1" rIns="91425" wrap="square" tIns="91425">
             <a:noAutofit/>
           </a:bodyPr>
           <a:lstStyle/>
           <a:p>
-            <a:pPr marL="0" lvl="0" indent="0" algn="l" rtl="0">
+            <a:pPr indent="0" lvl="0" marL="0" rtl="0" algn="l">
               <a:spcBef>
                 <a:spcPts val="0"/>
               </a:spcBef>
@@ -7933,6 +7342,9 @@
               </a:spcAft>
               <a:buNone/>
             </a:pPr>
+            <a:r>
+              <a:t/>
+            </a:r>
             <a:endParaRPr>
               <a:latin typeface="Lato"/>
               <a:ea typeface="Lato"/>
@@ -7962,12 +7374,12 @@
           </a:ln>
         </p:spPr>
         <p:txBody>
-          <a:bodyPr spcFirstLastPara="1" wrap="square" lIns="91425" tIns="91425" rIns="91425" bIns="91425" anchor="t" anchorCtr="0">
+          <a:bodyPr anchorCtr="0" anchor="t" bIns="91425" lIns="91425" spcFirstLastPara="1" rIns="91425" wrap="square" tIns="91425">
             <a:noAutofit/>
           </a:bodyPr>
           <a:lstStyle/>
           <a:p>
-            <a:pPr marL="0" lvl="0" indent="0" algn="l" rtl="0">
+            <a:pPr indent="0" lvl="0" marL="0" rtl="0" algn="l">
               <a:spcBef>
                 <a:spcPts val="0"/>
               </a:spcBef>
@@ -7993,7 +7405,7 @@
             </a:endParaRPr>
           </a:p>
           <a:p>
-            <a:pPr marL="0" lvl="0" indent="0" algn="l" rtl="0">
+            <a:pPr indent="0" lvl="0" marL="0" rtl="0" algn="l">
               <a:spcBef>
                 <a:spcPts val="0"/>
               </a:spcBef>
@@ -8002,6 +7414,9 @@
               </a:spcAft>
               <a:buNone/>
             </a:pPr>
+            <a:r>
+              <a:t/>
+            </a:r>
             <a:endParaRPr>
               <a:latin typeface="Lato"/>
               <a:ea typeface="Lato"/>
@@ -8010,7 +7425,7 @@
             </a:endParaRPr>
           </a:p>
           <a:p>
-            <a:pPr marL="457200" lvl="0" indent="-317500" algn="l" rtl="0">
+            <a:pPr indent="-317500" lvl="0" marL="457200" rtl="0" algn="l">
               <a:spcBef>
                 <a:spcPts val="0"/>
               </a:spcBef>
@@ -8028,7 +7443,25 @@
                 <a:cs typeface="Lato"/>
                 <a:sym typeface="Lato"/>
               </a:rPr>
-              <a:t>Plan de comunicación actualizado</a:t>
+              <a:t>Plan de </a:t>
+            </a:r>
+            <a:r>
+              <a:rPr lang="es">
+                <a:latin typeface="Lato"/>
+                <a:ea typeface="Lato"/>
+                <a:cs typeface="Lato"/>
+                <a:sym typeface="Lato"/>
+              </a:rPr>
+              <a:t>comunicación</a:t>
+            </a:r>
+            <a:r>
+              <a:rPr lang="es">
+                <a:latin typeface="Lato"/>
+                <a:ea typeface="Lato"/>
+                <a:cs typeface="Lato"/>
+                <a:sym typeface="Lato"/>
+              </a:rPr>
+              <a:t> actualizado</a:t>
             </a:r>
             <a:endParaRPr>
               <a:latin typeface="Lato"/>
@@ -8038,7 +7471,7 @@
             </a:endParaRPr>
           </a:p>
           <a:p>
-            <a:pPr marL="457200" lvl="0" indent="-317500" algn="l" rtl="0">
+            <a:pPr indent="-317500" lvl="0" marL="457200" rtl="0" algn="l">
               <a:spcBef>
                 <a:spcPts val="0"/>
               </a:spcBef>
@@ -8056,7 +7489,16 @@
                 <a:cs typeface="Lato"/>
                 <a:sym typeface="Lato"/>
               </a:rPr>
-              <a:t>Porcentaje del proyecto en cuanto a valor</a:t>
+              <a:t>Porcentaje</a:t>
+            </a:r>
+            <a:r>
+              <a:rPr lang="es">
+                <a:latin typeface="Lato"/>
+                <a:ea typeface="Lato"/>
+                <a:cs typeface="Lato"/>
+                <a:sym typeface="Lato"/>
+              </a:rPr>
+              <a:t> del proyecto en cuanto a valor</a:t>
             </a:r>
             <a:endParaRPr>
               <a:latin typeface="Lato"/>
@@ -8075,12 +7517,12 @@
 </p:sld>
 </file>
 
-<file path=ppt/slides/slide6.xml><?xml version="1.0" encoding="utf-8"?>
-<p:sld xmlns:a="http://schemas.openxmlformats.org/drawingml/2006/main" xmlns:r="http://schemas.openxmlformats.org/officeDocument/2006/relationships" xmlns:p="http://schemas.openxmlformats.org/presentationml/2006/main">
+<file path=ppt/slides/slide4.xml><?xml version="1.0" encoding="utf-8"?>
+<p:sld xmlns:a="http://schemas.openxmlformats.org/drawingml/2006/main" xmlns:r="http://schemas.openxmlformats.org/officeDocument/2006/relationships" xmlns:mc="http://schemas.openxmlformats.org/markup-compatibility/2006" xmlns:mv="urn:schemas-microsoft-com:mac:vml" xmlns:p="http://schemas.openxmlformats.org/presentationml/2006/main" xmlns:c="http://schemas.openxmlformats.org/drawingml/2006/chart" xmlns:dgm="http://schemas.openxmlformats.org/drawingml/2006/diagram" xmlns:o="urn:schemas-microsoft-com:office:office" xmlns:v="urn:schemas-microsoft-com:vml" xmlns:pvml="urn:schemas-microsoft-com:office:powerpoint" xmlns:com="http://schemas.openxmlformats.org/drawingml/2006/compatibility" xmlns:p14="http://schemas.microsoft.com/office/powerpoint/2010/main" xmlns:p15="http://schemas.microsoft.com/office/powerpoint/2012/main">
   <p:cSld>
     <p:spTree>
       <p:nvGrpSpPr>
-        <p:cNvPr id="1" name="Shape 90"/>
+        <p:cNvPr id="90" name="Shape 90"/>
         <p:cNvGrpSpPr/>
         <p:nvPr/>
       </p:nvGrpSpPr>
@@ -8095,11 +7537,9 @@
       <p:sp>
         <p:nvSpPr>
           <p:cNvPr id="91" name="Google Shape;91;p16"/>
-          <p:cNvSpPr txBox="1">
-            <a:spLocks noGrp="1"/>
-          </p:cNvSpPr>
+          <p:cNvSpPr txBox="1"/>
           <p:nvPr>
-            <p:ph type="body" idx="1"/>
+            <p:ph idx="1" type="body"/>
           </p:nvPr>
         </p:nvSpPr>
         <p:spPr>
@@ -8112,12 +7552,12 @@
           </a:prstGeom>
         </p:spPr>
         <p:txBody>
-          <a:bodyPr spcFirstLastPara="1" wrap="square" lIns="91425" tIns="91425" rIns="91425" bIns="91425" anchor="ctr" anchorCtr="0">
+          <a:bodyPr anchorCtr="0" anchor="ctr" bIns="91425" lIns="91425" spcFirstLastPara="1" rIns="91425" wrap="square" tIns="91425">
             <a:noAutofit/>
           </a:bodyPr>
           <a:lstStyle/>
           <a:p>
-            <a:pPr marL="0" lvl="0" indent="0" algn="l" rtl="0">
+            <a:pPr indent="0" lvl="0" marL="0" rtl="0" algn="l">
               <a:spcBef>
                 <a:spcPts val="0"/>
               </a:spcBef>
@@ -8128,7 +7568,11 @@
             </a:pPr>
             <a:r>
               <a:rPr lang="es" sz="2400"/>
-              <a:t>Principales funcionalidades faltantes</a:t>
+              <a:t>Principales funcionalidades</a:t>
+            </a:r>
+            <a:r>
+              <a:rPr lang="es" sz="2400"/>
+              <a:t> faltantes</a:t>
             </a:r>
             <a:endParaRPr sz="2400"/>
           </a:p>
@@ -8154,12 +7598,12 @@
           </a:ln>
         </p:spPr>
         <p:txBody>
-          <a:bodyPr spcFirstLastPara="1" wrap="square" lIns="91425" tIns="91425" rIns="91425" bIns="91425" anchor="t" anchorCtr="0">
+          <a:bodyPr anchorCtr="0" anchor="t" bIns="91425" lIns="91425" spcFirstLastPara="1" rIns="91425" wrap="square" tIns="91425">
             <a:noAutofit/>
           </a:bodyPr>
           <a:lstStyle/>
           <a:p>
-            <a:pPr marL="0" lvl="0" indent="0" algn="l" rtl="0">
+            <a:pPr indent="0" lvl="0" marL="0" rtl="0" algn="l">
               <a:spcBef>
                 <a:spcPts val="0"/>
               </a:spcBef>
@@ -8175,7 +7619,34 @@
                 <a:cs typeface="Lato"/>
                 <a:sym typeface="Lato"/>
               </a:rPr>
-              <a:t>Cambio y recuperación de contraseña</a:t>
+              <a:t>Cambio y </a:t>
+            </a:r>
+            <a:r>
+              <a:rPr lang="es">
+                <a:latin typeface="Lato"/>
+                <a:ea typeface="Lato"/>
+                <a:cs typeface="Lato"/>
+                <a:sym typeface="Lato"/>
+              </a:rPr>
+              <a:t>recuperación</a:t>
+            </a:r>
+            <a:r>
+              <a:rPr lang="es">
+                <a:latin typeface="Lato"/>
+                <a:ea typeface="Lato"/>
+                <a:cs typeface="Lato"/>
+                <a:sym typeface="Lato"/>
+              </a:rPr>
+              <a:t> de </a:t>
+            </a:r>
+            <a:r>
+              <a:rPr lang="es">
+                <a:latin typeface="Lato"/>
+                <a:ea typeface="Lato"/>
+                <a:cs typeface="Lato"/>
+                <a:sym typeface="Lato"/>
+              </a:rPr>
+              <a:t>contraseña</a:t>
             </a:r>
             <a:endParaRPr>
               <a:latin typeface="Lato"/>
@@ -8185,7 +7656,7 @@
             </a:endParaRPr>
           </a:p>
           <a:p>
-            <a:pPr marL="0" lvl="0" indent="0" algn="l" rtl="0">
+            <a:pPr indent="0" lvl="0" marL="0" rtl="0" algn="l">
               <a:spcBef>
                 <a:spcPts val="0"/>
               </a:spcBef>
@@ -8211,7 +7682,7 @@
             </a:endParaRPr>
           </a:p>
           <a:p>
-            <a:pPr marL="0" lvl="0" indent="0" algn="l" rtl="0">
+            <a:pPr indent="0" lvl="0" marL="0" rtl="0" algn="l">
               <a:spcBef>
                 <a:spcPts val="0"/>
               </a:spcBef>
@@ -8237,7 +7708,7 @@
             </a:endParaRPr>
           </a:p>
           <a:p>
-            <a:pPr marL="0" lvl="0" indent="0" algn="l" rtl="0">
+            <a:pPr indent="0" lvl="0" marL="0" rtl="0" algn="l">
               <a:spcBef>
                 <a:spcPts val="0"/>
               </a:spcBef>
@@ -8263,7 +7734,7 @@
             </a:endParaRPr>
           </a:p>
           <a:p>
-            <a:pPr marL="0" lvl="0" indent="0" algn="l" rtl="0">
+            <a:pPr indent="0" lvl="0" marL="0" rtl="0" algn="l">
               <a:spcBef>
                 <a:spcPts val="0"/>
               </a:spcBef>
@@ -8298,12 +7769,12 @@
 </p:sld>
 </file>
 
-<file path=ppt/slides/slide7.xml><?xml version="1.0" encoding="utf-8"?>
-<p:sld xmlns:a="http://schemas.openxmlformats.org/drawingml/2006/main" xmlns:r="http://schemas.openxmlformats.org/officeDocument/2006/relationships" xmlns:p="http://schemas.openxmlformats.org/presentationml/2006/main">
+<file path=ppt/slides/slide5.xml><?xml version="1.0" encoding="utf-8"?>
+<p:sld xmlns:a="http://schemas.openxmlformats.org/drawingml/2006/main" xmlns:r="http://schemas.openxmlformats.org/officeDocument/2006/relationships" xmlns:mc="http://schemas.openxmlformats.org/markup-compatibility/2006" xmlns:mv="urn:schemas-microsoft-com:mac:vml" xmlns:p="http://schemas.openxmlformats.org/presentationml/2006/main" xmlns:c="http://schemas.openxmlformats.org/drawingml/2006/chart" xmlns:dgm="http://schemas.openxmlformats.org/drawingml/2006/diagram" xmlns:o="urn:schemas-microsoft-com:office:office" xmlns:v="urn:schemas-microsoft-com:vml" xmlns:pvml="urn:schemas-microsoft-com:office:powerpoint" xmlns:com="http://schemas.openxmlformats.org/drawingml/2006/compatibility" xmlns:p14="http://schemas.microsoft.com/office/powerpoint/2010/main" xmlns:p15="http://schemas.microsoft.com/office/powerpoint/2012/main">
   <p:cSld>
     <p:spTree>
       <p:nvGrpSpPr>
-        <p:cNvPr id="1" name="Shape 96"/>
+        <p:cNvPr id="96" name="Shape 96"/>
         <p:cNvGrpSpPr/>
         <p:nvPr/>
       </p:nvGrpSpPr>
@@ -8318,11 +7789,9 @@
       <p:sp>
         <p:nvSpPr>
           <p:cNvPr id="97" name="Google Shape;97;p17"/>
-          <p:cNvSpPr txBox="1">
-            <a:spLocks noGrp="1"/>
-          </p:cNvSpPr>
+          <p:cNvSpPr txBox="1"/>
           <p:nvPr>
-            <p:ph type="body" idx="1"/>
+            <p:ph idx="1" type="body"/>
           </p:nvPr>
         </p:nvSpPr>
         <p:spPr>
@@ -8335,12 +7804,12 @@
           </a:prstGeom>
         </p:spPr>
         <p:txBody>
-          <a:bodyPr spcFirstLastPara="1" wrap="square" lIns="91425" tIns="91425" rIns="91425" bIns="91425" anchor="ctr" anchorCtr="0">
+          <a:bodyPr anchorCtr="0" anchor="ctr" bIns="91425" lIns="91425" spcFirstLastPara="1" rIns="91425" wrap="square" tIns="91425">
             <a:noAutofit/>
           </a:bodyPr>
           <a:lstStyle/>
           <a:p>
-            <a:pPr marL="0" lvl="0" indent="0" algn="ctr" rtl="0">
+            <a:pPr indent="0" lvl="0" marL="0" rtl="0" algn="ctr">
               <a:spcBef>
                 <a:spcPts val="0"/>
               </a:spcBef>
@@ -8377,12 +7846,12 @@
           </a:ln>
         </p:spPr>
         <p:txBody>
-          <a:bodyPr spcFirstLastPara="1" wrap="square" lIns="91425" tIns="91425" rIns="91425" bIns="91425" anchor="t" anchorCtr="0">
+          <a:bodyPr anchorCtr="0" anchor="t" bIns="91425" lIns="91425" spcFirstLastPara="1" rIns="91425" wrap="square" tIns="91425">
             <a:noAutofit/>
           </a:bodyPr>
           <a:lstStyle/>
           <a:p>
-            <a:pPr marL="0" lvl="0" indent="0" algn="ctr" rtl="0">
+            <a:pPr indent="0" lvl="0" marL="0" rtl="0" algn="ctr">
               <a:spcBef>
                 <a:spcPts val="0"/>
               </a:spcBef>
@@ -8418,7 +7887,7 @@
 </file>
 
 <file path=ppt/theme/theme1.xml><?xml version="1.0" encoding="utf-8"?>
-<a:theme xmlns:a="http://schemas.openxmlformats.org/drawingml/2006/main" name="Swiss">
+<a:theme xmlns:a="http://schemas.openxmlformats.org/drawingml/2006/main" xmlns:r="http://schemas.openxmlformats.org/officeDocument/2006/relationships" name="Swiss">
   <a:themeElements>
     <a:clrScheme name="Swiss">
       <a:dk1>
@@ -8693,13 +8162,11 @@
       </a:bgFillStyleLst>
     </a:fmtScheme>
   </a:themeElements>
-  <a:objectDefaults/>
-  <a:extraClrSchemeLst/>
 </a:theme>
 </file>
 
 <file path=ppt/theme/theme2.xml><?xml version="1.0" encoding="utf-8"?>
-<a:theme xmlns:a="http://schemas.openxmlformats.org/drawingml/2006/main">
+<a:theme xmlns:a="http://schemas.openxmlformats.org/drawingml/2006/main" xmlns:r="http://schemas.openxmlformats.org/officeDocument/2006/relationships">
   <a:themeElements>
     <a:clrScheme name="Default">
       <a:dk1>
@@ -8974,7 +8441,5 @@
       </a:bgFillStyleLst>
     </a:fmtScheme>
   </a:themeElements>
-  <a:objectDefaults/>
-  <a:extraClrSchemeLst/>
 </a:theme>
 </file>
</xml_diff>